<commit_message>
Small edits to a few powerpoint slides
</commit_message>
<xml_diff>
--- a/presentation/Attribute Learning System Presentation.pptx
+++ b/presentation/Attribute Learning System Presentation.pptx
@@ -11,15 +11,13 @@
     <p:sldId id="271" r:id="rId5"/>
     <p:sldId id="268" r:id="rId6"/>
     <p:sldId id="269" r:id="rId7"/>
-    <p:sldId id="263" r:id="rId8"/>
-    <p:sldId id="260" r:id="rId9"/>
-    <p:sldId id="259" r:id="rId10"/>
-    <p:sldId id="261" r:id="rId11"/>
-    <p:sldId id="264" r:id="rId12"/>
-    <p:sldId id="262" r:id="rId13"/>
-    <p:sldId id="270" r:id="rId14"/>
-    <p:sldId id="257" r:id="rId15"/>
-    <p:sldId id="258" r:id="rId16"/>
+    <p:sldId id="260" r:id="rId8"/>
+    <p:sldId id="261" r:id="rId9"/>
+    <p:sldId id="264" r:id="rId10"/>
+    <p:sldId id="262" r:id="rId11"/>
+    <p:sldId id="270" r:id="rId12"/>
+    <p:sldId id="257" r:id="rId13"/>
+    <p:sldId id="258" r:id="rId14"/>
   </p:sldIdLst>
   <p:sldSz cx="12192000" cy="6858000"/>
   <p:notesSz cx="6858000" cy="9144000"/>
@@ -120,7 +118,7 @@
   </p:defaultTextStyle>
   <p:extLst>
     <p:ext uri="{EFAFB233-063F-42B5-8137-9DF3F51BA10A}">
-      <p15:sldGuideLst xmlns:p15="http://schemas.microsoft.com/office/powerpoint/2012/main"/>
+      <p15:sldGuideLst xmlns:p15="http://schemas.microsoft.com/office/powerpoint/2012/main" xmlns=""/>
     </p:ext>
   </p:extLst>
 </p:presentation>
@@ -3996,6 +3994,13 @@
         </dgm:presLayoutVars>
       </dgm:prSet>
       <dgm:spPr/>
+      <dgm:t>
+        <a:bodyPr/>
+        <a:lstStyle/>
+        <a:p>
+          <a:endParaRPr lang="en-US"/>
+        </a:p>
+      </dgm:t>
     </dgm:pt>
     <dgm:pt modelId="{D6D52250-772E-4773-AEF1-DE89F18F723E}" type="pres">
       <dgm:prSet presAssocID="{297E3E90-9118-46D8-AFBD-823CAADAFE92}" presName="composite" presStyleCnt="0"/>
@@ -4046,6 +4051,13 @@
     <dgm:pt modelId="{C9C648E9-2AAF-42B8-84EB-0AB73F73F7D3}" type="pres">
       <dgm:prSet presAssocID="{87C99127-AF20-49AE-9B4B-FC9B692B521D}" presName="Accent1Text" presStyleLbl="node1" presStyleIdx="1" presStyleCnt="6" custAng="464211" custLinFactNeighborX="-32667" custLinFactNeighborY="5422"/>
       <dgm:spPr/>
+      <dgm:t>
+        <a:bodyPr/>
+        <a:lstStyle/>
+        <a:p>
+          <a:endParaRPr lang="en-US"/>
+        </a:p>
+      </dgm:t>
     </dgm:pt>
     <dgm:pt modelId="{636ACE84-079A-4AA9-9DC7-AF09BE5C668C}" type="pres">
       <dgm:prSet presAssocID="{87C99127-AF20-49AE-9B4B-FC9B692B521D}" presName="spaceBetweenRectangles" presStyleCnt="0"/>
@@ -4100,6 +4112,13 @@
     <dgm:pt modelId="{D34335B2-30BB-401C-B9C7-9827A269CD74}" type="pres">
       <dgm:prSet presAssocID="{FA460287-38FC-4AFD-A9CF-0A38D6E3A03E}" presName="Accent1Text" presStyleLbl="node1" presStyleIdx="3" presStyleCnt="6" custLinFactNeighborX="44517" custLinFactNeighborY="1850"/>
       <dgm:spPr/>
+      <dgm:t>
+        <a:bodyPr/>
+        <a:lstStyle/>
+        <a:p>
+          <a:endParaRPr lang="en-US"/>
+        </a:p>
+      </dgm:t>
     </dgm:pt>
     <dgm:pt modelId="{E1586217-BF6E-4F9D-B1DF-3F44110B4A2F}" type="pres">
       <dgm:prSet presAssocID="{FA460287-38FC-4AFD-A9CF-0A38D6E3A03E}" presName="spaceBetweenRectangles" presStyleCnt="0"/>
@@ -4154,6 +4173,13 @@
     <dgm:pt modelId="{D39EA7A9-F8EC-4C04-8A75-79F7D89D0699}" type="pres">
       <dgm:prSet presAssocID="{ACC98A97-CACE-4AA0-9C54-FC7006A67E85}" presName="Accent1Text" presStyleLbl="node1" presStyleIdx="5" presStyleCnt="6" custLinFactNeighborX="-19737" custLinFactNeighborY="-609"/>
       <dgm:spPr/>
+      <dgm:t>
+        <a:bodyPr/>
+        <a:lstStyle/>
+        <a:p>
+          <a:endParaRPr lang="en-US"/>
+        </a:p>
+      </dgm:t>
     </dgm:pt>
   </dgm:ptLst>
   <dgm:cxnLst>
@@ -4164,8 +4190,8 @@
     <dgm:cxn modelId="{ABE7D397-3799-4131-95CB-F240099BC297}" type="presOf" srcId="{FA460287-38FC-4AFD-A9CF-0A38D6E3A03E}" destId="{D34335B2-30BB-401C-B9C7-9827A269CD74}" srcOrd="0" destOrd="0" presId="urn:microsoft.com/office/officeart/2008/layout/AlternatingHexagons"/>
     <dgm:cxn modelId="{7556F2F2-C197-4DE4-BFAE-370984655A6E}" type="presOf" srcId="{297E3E90-9118-46D8-AFBD-823CAADAFE92}" destId="{373433D2-0F2B-41F5-BA94-67BE2B93662B}" srcOrd="0" destOrd="0" presId="urn:microsoft.com/office/officeart/2008/layout/AlternatingHexagons"/>
     <dgm:cxn modelId="{925B4DAA-96B9-48F3-B919-DF735C185345}" type="presOf" srcId="{ACC98A97-CACE-4AA0-9C54-FC7006A67E85}" destId="{D39EA7A9-F8EC-4C04-8A75-79F7D89D0699}" srcOrd="0" destOrd="0" presId="urn:microsoft.com/office/officeart/2008/layout/AlternatingHexagons"/>
+    <dgm:cxn modelId="{D5185CC0-D711-4868-9C86-D0AC317A4163}" type="presOf" srcId="{FBE0F82D-F3B0-47B8-84F4-039C87376656}" destId="{41E7AD60-532D-4159-901A-DA72FF241A90}" srcOrd="0" destOrd="0" presId="urn:microsoft.com/office/officeart/2008/layout/AlternatingHexagons"/>
     <dgm:cxn modelId="{8053E6C5-FE0E-4184-BDAC-2349EABB520E}" srcId="{0013736B-B955-4F3E-96EE-8A125299FFE9}" destId="{297E3E90-9118-46D8-AFBD-823CAADAFE92}" srcOrd="0" destOrd="0" parTransId="{95FB31FE-898E-47E0-A0FA-DBF9BB124552}" sibTransId="{87C99127-AF20-49AE-9B4B-FC9B692B521D}"/>
-    <dgm:cxn modelId="{D5185CC0-D711-4868-9C86-D0AC317A4163}" type="presOf" srcId="{FBE0F82D-F3B0-47B8-84F4-039C87376656}" destId="{41E7AD60-532D-4159-901A-DA72FF241A90}" srcOrd="0" destOrd="0" presId="urn:microsoft.com/office/officeart/2008/layout/AlternatingHexagons"/>
     <dgm:cxn modelId="{7743A919-CD7A-4E67-9FFA-961941C23A0D}" srcId="{0013736B-B955-4F3E-96EE-8A125299FFE9}" destId="{FBE0F82D-F3B0-47B8-84F4-039C87376656}" srcOrd="1" destOrd="0" parTransId="{3A98CA01-A125-4570-9775-879CCA1CC7CE}" sibTransId="{FA460287-38FC-4AFD-A9CF-0A38D6E3A03E}"/>
     <dgm:cxn modelId="{1ECA7BAA-B79A-4E72-BA6F-DCB90BF73101}" type="presParOf" srcId="{D5D6F422-1EBA-402A-8A86-685B047ED0D2}" destId="{D6D52250-772E-4773-AEF1-DE89F18F723E}" srcOrd="0" destOrd="0" presId="urn:microsoft.com/office/officeart/2008/layout/AlternatingHexagons"/>
     <dgm:cxn modelId="{B4CE13A3-AFCE-49DE-AB3E-20D97E3A0BDF}" type="presParOf" srcId="{D6D52250-772E-4773-AEF1-DE89F18F723E}" destId="{373433D2-0F2B-41F5-BA94-67BE2B93662B}" srcOrd="0" destOrd="0" presId="urn:microsoft.com/office/officeart/2008/layout/AlternatingHexagons"/>
@@ -4372,6 +4398,13 @@
         </dgm:presLayoutVars>
       </dgm:prSet>
       <dgm:spPr/>
+      <dgm:t>
+        <a:bodyPr/>
+        <a:lstStyle/>
+        <a:p>
+          <a:endParaRPr lang="en-US"/>
+        </a:p>
+      </dgm:t>
     </dgm:pt>
     <dgm:pt modelId="{7C5CB609-8E61-4A01-A759-61672585F9CA}" type="pres">
       <dgm:prSet presAssocID="{2A65FF3B-4FF7-4872-B0CE-AA57A0BB35D5}" presName="composite" presStyleCnt="0"/>
@@ -4426,6 +4459,13 @@
         </dgm:presLayoutVars>
       </dgm:prSet>
       <dgm:spPr/>
+      <dgm:t>
+        <a:bodyPr/>
+        <a:lstStyle/>
+        <a:p>
+          <a:endParaRPr lang="en-US"/>
+        </a:p>
+      </dgm:t>
     </dgm:pt>
     <dgm:pt modelId="{BA04B3C2-BC85-4C18-8859-97E74203571E}" type="pres">
       <dgm:prSet presAssocID="{73908983-8F35-421E-AE8A-018EE79C52A9}" presName="Child1Accent1" presStyleLbl="alignNode1" presStyleIdx="11" presStyleCnt="34"/>
@@ -4472,6 +4512,13 @@
         </dgm:presLayoutVars>
       </dgm:prSet>
       <dgm:spPr/>
+      <dgm:t>
+        <a:bodyPr/>
+        <a:lstStyle/>
+        <a:p>
+          <a:endParaRPr lang="en-US"/>
+        </a:p>
+      </dgm:t>
     </dgm:pt>
     <dgm:pt modelId="{E4D0B879-4DE3-476A-B474-9326D267A06D}" type="pres">
       <dgm:prSet presAssocID="{DD043312-6F4A-4152-AA74-E7CB3F0AB42E}" presName="Child2Accent1" presStyleLbl="alignNode1" presStyleIdx="20" presStyleCnt="34"/>
@@ -4510,6 +4557,13 @@
         </dgm:presLayoutVars>
       </dgm:prSet>
       <dgm:spPr/>
+      <dgm:t>
+        <a:bodyPr/>
+        <a:lstStyle/>
+        <a:p>
+          <a:endParaRPr lang="en-US"/>
+        </a:p>
+      </dgm:t>
     </dgm:pt>
     <dgm:pt modelId="{65621B3F-6623-46FF-9BD3-F988DD8B48AF}" type="pres">
       <dgm:prSet presAssocID="{EAC9FF6D-93A0-49A0-8221-6D8DA415626E}" presName="Child3Accent1" presStyleLbl="alignNode1" presStyleIdx="27" presStyleCnt="34"/>
@@ -4765,6 +4819,13 @@
     <dgm:pt modelId="{7AD642EC-3D62-4196-AA52-56855C27D084}" type="pres">
       <dgm:prSet presAssocID="{8A3ACE52-6E3C-4EF2-A6A3-C65F89AA3F2E}" presName="sibTrans" presStyleLbl="sibTrans2D1" presStyleIdx="0" presStyleCnt="2"/>
       <dgm:spPr/>
+      <dgm:t>
+        <a:bodyPr/>
+        <a:lstStyle/>
+        <a:p>
+          <a:endParaRPr lang="en-US"/>
+        </a:p>
+      </dgm:t>
     </dgm:pt>
     <dgm:pt modelId="{FA7FE93E-B6F3-4F3C-8171-452F77AE0BA0}" type="pres">
       <dgm:prSet presAssocID="{8A3ACE52-6E3C-4EF2-A6A3-C65F89AA3F2E}" presName="spacerR" presStyleCnt="0"/>
@@ -4777,6 +4838,13 @@
         </dgm:presLayoutVars>
       </dgm:prSet>
       <dgm:spPr/>
+      <dgm:t>
+        <a:bodyPr/>
+        <a:lstStyle/>
+        <a:p>
+          <a:endParaRPr lang="en-US"/>
+        </a:p>
+      </dgm:t>
     </dgm:pt>
     <dgm:pt modelId="{45E4D974-98B1-4DC5-B675-D8B99E3718FD}" type="pres">
       <dgm:prSet presAssocID="{FD65B6AF-1B9D-4E48-961E-18FB79AAB921}" presName="spacerL" presStyleCnt="0"/>
@@ -4785,6 +4853,13 @@
     <dgm:pt modelId="{71154503-70E1-4183-9AC2-F924E3127283}" type="pres">
       <dgm:prSet presAssocID="{FD65B6AF-1B9D-4E48-961E-18FB79AAB921}" presName="sibTrans" presStyleLbl="sibTrans2D1" presStyleIdx="1" presStyleCnt="2"/>
       <dgm:spPr/>
+      <dgm:t>
+        <a:bodyPr/>
+        <a:lstStyle/>
+        <a:p>
+          <a:endParaRPr lang="en-US"/>
+        </a:p>
+      </dgm:t>
     </dgm:pt>
     <dgm:pt modelId="{1EF06100-984B-408A-8D55-38E0AADAA6E5}" type="pres">
       <dgm:prSet presAssocID="{FD65B6AF-1B9D-4E48-961E-18FB79AAB921}" presName="spacerR" presStyleCnt="0"/>
@@ -4797,6 +4872,13 @@
         </dgm:presLayoutVars>
       </dgm:prSet>
       <dgm:spPr/>
+      <dgm:t>
+        <a:bodyPr/>
+        <a:lstStyle/>
+        <a:p>
+          <a:endParaRPr lang="en-US"/>
+        </a:p>
+      </dgm:t>
     </dgm:pt>
   </dgm:ptLst>
   <dgm:cxnLst>
@@ -4967,6 +5049,13 @@
         </dgm:presLayoutVars>
       </dgm:prSet>
       <dgm:spPr/>
+      <dgm:t>
+        <a:bodyPr/>
+        <a:lstStyle/>
+        <a:p>
+          <a:endParaRPr lang="en-US"/>
+        </a:p>
+      </dgm:t>
     </dgm:pt>
     <dgm:pt modelId="{5D96605F-62C0-4CFE-9B79-F7B02E6979AE}" type="pres">
       <dgm:prSet presAssocID="{02526F7E-5D76-4209-B807-3B1B39315844}" presName="spacerT" presStyleCnt="0"/>
@@ -4975,6 +5064,13 @@
     <dgm:pt modelId="{FBE3BFA0-3B92-4DE5-8E02-EAC1AF4AC9F6}" type="pres">
       <dgm:prSet presAssocID="{02526F7E-5D76-4209-B807-3B1B39315844}" presName="sibTrans" presStyleLbl="sibTrans2D1" presStyleIdx="0" presStyleCnt="2"/>
       <dgm:spPr/>
+      <dgm:t>
+        <a:bodyPr/>
+        <a:lstStyle/>
+        <a:p>
+          <a:endParaRPr lang="en-US"/>
+        </a:p>
+      </dgm:t>
     </dgm:pt>
     <dgm:pt modelId="{297E5215-68A6-45CA-9E5A-5063E53A0153}" type="pres">
       <dgm:prSet presAssocID="{02526F7E-5D76-4209-B807-3B1B39315844}" presName="spacerB" presStyleCnt="0"/>
@@ -4987,14 +5083,35 @@
         </dgm:presLayoutVars>
       </dgm:prSet>
       <dgm:spPr/>
+      <dgm:t>
+        <a:bodyPr/>
+        <a:lstStyle/>
+        <a:p>
+          <a:endParaRPr lang="en-US"/>
+        </a:p>
+      </dgm:t>
     </dgm:pt>
     <dgm:pt modelId="{C1ADA0F0-265D-419D-A249-F9FA2F8A0141}" type="pres">
       <dgm:prSet presAssocID="{8A303A92-A358-4254-9537-8514B391899B}" presName="sibTransLast" presStyleLbl="sibTrans2D1" presStyleIdx="1" presStyleCnt="2"/>
       <dgm:spPr/>
+      <dgm:t>
+        <a:bodyPr/>
+        <a:lstStyle/>
+        <a:p>
+          <a:endParaRPr lang="en-US"/>
+        </a:p>
+      </dgm:t>
     </dgm:pt>
     <dgm:pt modelId="{3ABE7F5A-ABF6-4034-801F-98A20B36A7C7}" type="pres">
       <dgm:prSet presAssocID="{8A303A92-A358-4254-9537-8514B391899B}" presName="connectorText" presStyleLbl="sibTrans2D1" presStyleIdx="1" presStyleCnt="2"/>
       <dgm:spPr/>
+      <dgm:t>
+        <a:bodyPr/>
+        <a:lstStyle/>
+        <a:p>
+          <a:endParaRPr lang="en-US"/>
+        </a:p>
+      </dgm:t>
     </dgm:pt>
     <dgm:pt modelId="{66E7A999-9302-4587-A714-674A545BF007}" type="pres">
       <dgm:prSet presAssocID="{8A303A92-A358-4254-9537-8514B391899B}" presName="lastNode" presStyleLbl="node1" presStyleIdx="2" presStyleCnt="3">
@@ -5003,6 +5120,13 @@
         </dgm:presLayoutVars>
       </dgm:prSet>
       <dgm:spPr/>
+      <dgm:t>
+        <a:bodyPr/>
+        <a:lstStyle/>
+        <a:p>
+          <a:endParaRPr lang="en-US"/>
+        </a:p>
+      </dgm:t>
     </dgm:pt>
   </dgm:ptLst>
   <dgm:cxnLst>
@@ -5207,6 +5331,13 @@
         </dgm:presLayoutVars>
       </dgm:prSet>
       <dgm:spPr/>
+      <dgm:t>
+        <a:bodyPr/>
+        <a:lstStyle/>
+        <a:p>
+          <a:endParaRPr lang="en-US"/>
+        </a:p>
+      </dgm:t>
     </dgm:pt>
     <dgm:pt modelId="{1C89778A-5C29-4166-A481-6BE43907D2F5}" type="pres">
       <dgm:prSet presAssocID="{1A20207D-4689-428F-BE4B-7E473FBF100A}" presName="linNode" presStyleCnt="0"/>
@@ -5220,6 +5351,13 @@
         </dgm:presLayoutVars>
       </dgm:prSet>
       <dgm:spPr/>
+      <dgm:t>
+        <a:bodyPr/>
+        <a:lstStyle/>
+        <a:p>
+          <a:endParaRPr lang="en-US"/>
+        </a:p>
+      </dgm:t>
     </dgm:pt>
     <dgm:pt modelId="{E7CC602C-43BA-453F-BCB7-72DCCACF75EB}" type="pres">
       <dgm:prSet presAssocID="{1A20207D-4689-428F-BE4B-7E473FBF100A}" presName="bracket" presStyleLbl="parChTrans1D1" presStyleIdx="0" presStyleCnt="2"/>
@@ -5236,6 +5374,13 @@
         </dgm:presLayoutVars>
       </dgm:prSet>
       <dgm:spPr/>
+      <dgm:t>
+        <a:bodyPr/>
+        <a:lstStyle/>
+        <a:p>
+          <a:endParaRPr lang="en-US"/>
+        </a:p>
+      </dgm:t>
     </dgm:pt>
     <dgm:pt modelId="{D68FB32E-3A0C-41DD-9F96-A894A71BD787}" type="pres">
       <dgm:prSet presAssocID="{A0302818-15BF-4117-9660-DC507BCD210C}" presName="spV" presStyleCnt="0"/>
@@ -5253,6 +5398,13 @@
         </dgm:presLayoutVars>
       </dgm:prSet>
       <dgm:spPr/>
+      <dgm:t>
+        <a:bodyPr/>
+        <a:lstStyle/>
+        <a:p>
+          <a:endParaRPr lang="en-US"/>
+        </a:p>
+      </dgm:t>
     </dgm:pt>
     <dgm:pt modelId="{8E9D926B-ED3C-40FA-9DFF-C91923AD4676}" type="pres">
       <dgm:prSet presAssocID="{18878E32-0B9B-45F4-8EDE-A4A4CB46A1D6}" presName="bracket" presStyleLbl="parChTrans1D1" presStyleIdx="1" presStyleCnt="2"/>
@@ -5269,6 +5421,13 @@
         </dgm:presLayoutVars>
       </dgm:prSet>
       <dgm:spPr/>
+      <dgm:t>
+        <a:bodyPr/>
+        <a:lstStyle/>
+        <a:p>
+          <a:endParaRPr lang="en-US"/>
+        </a:p>
+      </dgm:t>
     </dgm:pt>
   </dgm:ptLst>
   <dgm:cxnLst>
@@ -17336,8 +17495,8 @@
           </a:prstGeom>
           <a:noFill/>
           <a:extLst>
-            <a:ext uri="{909E8E84-426E-40dd-AFC4-6F175D3DCCD1}">
-              <a14:hiddenFill xmlns="" xmlns:a14="http://schemas.microsoft.com/office/drawing/2010/main">
+            <a:ext uri="{909E8E84-426E-40DD-AFC4-6F175D3DCCD1}">
+              <a14:hiddenFill xmlns:a14="http://schemas.microsoft.com/office/drawing/2010/main">
                 <a:solidFill>
                   <a:srgbClr val="FFFFFF"/>
                 </a:solidFill>
@@ -17395,8 +17554,8 @@
               <a:noFill/>
             </a:ln>
             <a:extLst>
-              <a:ext uri="{91240B29-F687-4f45-9708-019B960494DF}">
-                <a14:hiddenLine xmlns="" xmlns:a14="http://schemas.microsoft.com/office/drawing/2010/main" w="9525">
+              <a:ext uri="{91240B29-F687-4F45-9708-019B960494DF}">
+                <a14:hiddenLine xmlns:a14="http://schemas.microsoft.com/office/drawing/2010/main" w="9525">
                   <a:solidFill>
                     <a:srgbClr val="000000"/>
                   </a:solidFill>
@@ -17485,8 +17644,8 @@
               <a:noFill/>
             </a:ln>
             <a:extLst>
-              <a:ext uri="{91240B29-F687-4f45-9708-019B960494DF}">
-                <a14:hiddenLine xmlns="" xmlns:a14="http://schemas.microsoft.com/office/drawing/2010/main" w="9525">
+              <a:ext uri="{91240B29-F687-4F45-9708-019B960494DF}">
+                <a14:hiddenLine xmlns:a14="http://schemas.microsoft.com/office/drawing/2010/main" w="9525">
                   <a:solidFill>
                     <a:srgbClr val="000000"/>
                   </a:solidFill>
@@ -17575,8 +17734,8 @@
               <a:noFill/>
             </a:ln>
             <a:extLst>
-              <a:ext uri="{91240B29-F687-4f45-9708-019B960494DF}">
-                <a14:hiddenLine xmlns="" xmlns:a14="http://schemas.microsoft.com/office/drawing/2010/main" w="9525">
+              <a:ext uri="{91240B29-F687-4F45-9708-019B960494DF}">
+                <a14:hiddenLine xmlns:a14="http://schemas.microsoft.com/office/drawing/2010/main" w="9525">
                   <a:solidFill>
                     <a:srgbClr val="000000"/>
                   </a:solidFill>
@@ -17609,8 +17768,8 @@
               <a:noFill/>
             </a:ln>
             <a:extLst>
-              <a:ext uri="{91240B29-F687-4f45-9708-019B960494DF}">
-                <a14:hiddenLine xmlns="" xmlns:a14="http://schemas.microsoft.com/office/drawing/2010/main" w="9525">
+              <a:ext uri="{91240B29-F687-4F45-9708-019B960494DF}">
+                <a14:hiddenLine xmlns:a14="http://schemas.microsoft.com/office/drawing/2010/main" w="9525">
                   <a:solidFill>
                     <a:srgbClr val="000000"/>
                   </a:solidFill>
@@ -17699,8 +17858,8 @@
               <a:noFill/>
             </a:ln>
             <a:extLst>
-              <a:ext uri="{91240B29-F687-4f45-9708-019B960494DF}">
-                <a14:hiddenLine xmlns="" xmlns:a14="http://schemas.microsoft.com/office/drawing/2010/main" w="9525">
+              <a:ext uri="{91240B29-F687-4F45-9708-019B960494DF}">
+                <a14:hiddenLine xmlns:a14="http://schemas.microsoft.com/office/drawing/2010/main" w="9525">
                   <a:solidFill>
                     <a:srgbClr val="000000"/>
                   </a:solidFill>
@@ -17761,8 +17920,8 @@
               <a:noFill/>
             </a:ln>
             <a:extLst>
-              <a:ext uri="{91240B29-F687-4f45-9708-019B960494DF}">
-                <a14:hiddenLine xmlns="" xmlns:a14="http://schemas.microsoft.com/office/drawing/2010/main" w="9525">
+              <a:ext uri="{91240B29-F687-4F45-9708-019B960494DF}">
+                <a14:hiddenLine xmlns:a14="http://schemas.microsoft.com/office/drawing/2010/main" w="9525">
                   <a:solidFill>
                     <a:srgbClr val="000000"/>
                   </a:solidFill>
@@ -17823,8 +17982,8 @@
               <a:noFill/>
             </a:ln>
             <a:extLst>
-              <a:ext uri="{91240B29-F687-4f45-9708-019B960494DF}">
-                <a14:hiddenLine xmlns="" xmlns:a14="http://schemas.microsoft.com/office/drawing/2010/main" w="9525">
+              <a:ext uri="{91240B29-F687-4F45-9708-019B960494DF}">
+                <a14:hiddenLine xmlns:a14="http://schemas.microsoft.com/office/drawing/2010/main" w="9525">
                   <a:solidFill>
                     <a:srgbClr val="000000"/>
                   </a:solidFill>
@@ -17913,8 +18072,8 @@
               <a:noFill/>
             </a:ln>
             <a:extLst>
-              <a:ext uri="{91240B29-F687-4f45-9708-019B960494DF}">
-                <a14:hiddenLine xmlns="" xmlns:a14="http://schemas.microsoft.com/office/drawing/2010/main" w="9525">
+              <a:ext uri="{91240B29-F687-4F45-9708-019B960494DF}">
+                <a14:hiddenLine xmlns:a14="http://schemas.microsoft.com/office/drawing/2010/main" w="9525">
                   <a:solidFill>
                     <a:srgbClr val="000000"/>
                   </a:solidFill>
@@ -17975,8 +18134,8 @@
               <a:noFill/>
             </a:ln>
             <a:extLst>
-              <a:ext uri="{91240B29-F687-4f45-9708-019B960494DF}">
-                <a14:hiddenLine xmlns="" xmlns:a14="http://schemas.microsoft.com/office/drawing/2010/main" w="9525">
+              <a:ext uri="{91240B29-F687-4F45-9708-019B960494DF}">
+                <a14:hiddenLine xmlns:a14="http://schemas.microsoft.com/office/drawing/2010/main" w="9525">
                   <a:solidFill>
                     <a:srgbClr val="000000"/>
                   </a:solidFill>
@@ -18037,8 +18196,8 @@
               <a:noFill/>
             </a:ln>
             <a:extLst>
-              <a:ext uri="{91240B29-F687-4f45-9708-019B960494DF}">
-                <a14:hiddenLine xmlns="" xmlns:a14="http://schemas.microsoft.com/office/drawing/2010/main" w="9525">
+              <a:ext uri="{91240B29-F687-4F45-9708-019B960494DF}">
+                <a14:hiddenLine xmlns:a14="http://schemas.microsoft.com/office/drawing/2010/main" w="9525">
                   <a:solidFill>
                     <a:srgbClr val="000000"/>
                   </a:solidFill>
@@ -18127,8 +18286,8 @@
               <a:noFill/>
             </a:ln>
             <a:extLst>
-              <a:ext uri="{91240B29-F687-4f45-9708-019B960494DF}">
-                <a14:hiddenLine xmlns="" xmlns:a14="http://schemas.microsoft.com/office/drawing/2010/main" w="9525">
+              <a:ext uri="{91240B29-F687-4F45-9708-019B960494DF}">
+                <a14:hiddenLine xmlns:a14="http://schemas.microsoft.com/office/drawing/2010/main" w="9525">
                   <a:solidFill>
                     <a:srgbClr val="000000"/>
                   </a:solidFill>
@@ -18217,8 +18376,8 @@
               <a:noFill/>
             </a:ln>
             <a:extLst>
-              <a:ext uri="{91240B29-F687-4f45-9708-019B960494DF}">
-                <a14:hiddenLine xmlns="" xmlns:a14="http://schemas.microsoft.com/office/drawing/2010/main" w="9525">
+              <a:ext uri="{91240B29-F687-4F45-9708-019B960494DF}">
+                <a14:hiddenLine xmlns:a14="http://schemas.microsoft.com/office/drawing/2010/main" w="9525">
                   <a:solidFill>
                     <a:srgbClr val="000000"/>
                   </a:solidFill>
@@ -18279,8 +18438,8 @@
               <a:noFill/>
             </a:ln>
             <a:extLst>
-              <a:ext uri="{91240B29-F687-4f45-9708-019B960494DF}">
-                <a14:hiddenLine xmlns="" xmlns:a14="http://schemas.microsoft.com/office/drawing/2010/main" w="9525">
+              <a:ext uri="{91240B29-F687-4F45-9708-019B960494DF}">
+                <a14:hiddenLine xmlns:a14="http://schemas.microsoft.com/office/drawing/2010/main" w="9525">
                   <a:solidFill>
                     <a:srgbClr val="000000"/>
                   </a:solidFill>
@@ -18389,8 +18548,8 @@
               <a:noFill/>
             </a:ln>
             <a:extLst>
-              <a:ext uri="{91240B29-F687-4f45-9708-019B960494DF}">
-                <a14:hiddenLine xmlns="" xmlns:a14="http://schemas.microsoft.com/office/drawing/2010/main" w="9525">
+              <a:ext uri="{91240B29-F687-4F45-9708-019B960494DF}">
+                <a14:hiddenLine xmlns:a14="http://schemas.microsoft.com/office/drawing/2010/main" w="9525">
                   <a:solidFill>
                     <a:srgbClr val="000000"/>
                   </a:solidFill>
@@ -18451,8 +18610,8 @@
               <a:noFill/>
             </a:ln>
             <a:extLst>
-              <a:ext uri="{91240B29-F687-4f45-9708-019B960494DF}">
-                <a14:hiddenLine xmlns="" xmlns:a14="http://schemas.microsoft.com/office/drawing/2010/main" w="9525">
+              <a:ext uri="{91240B29-F687-4F45-9708-019B960494DF}">
+                <a14:hiddenLine xmlns:a14="http://schemas.microsoft.com/office/drawing/2010/main" w="9525">
                   <a:solidFill>
                     <a:srgbClr val="000000"/>
                   </a:solidFill>
@@ -18541,8 +18700,8 @@
               <a:noFill/>
             </a:ln>
             <a:extLst>
-              <a:ext uri="{91240B29-F687-4f45-9708-019B960494DF}">
-                <a14:hiddenLine xmlns="" xmlns:a14="http://schemas.microsoft.com/office/drawing/2010/main" w="9525">
+              <a:ext uri="{91240B29-F687-4F45-9708-019B960494DF}">
+                <a14:hiddenLine xmlns:a14="http://schemas.microsoft.com/office/drawing/2010/main" w="9525">
                   <a:solidFill>
                     <a:srgbClr val="000000"/>
                   </a:solidFill>
@@ -18631,8 +18790,8 @@
               <a:noFill/>
             </a:ln>
             <a:extLst>
-              <a:ext uri="{91240B29-F687-4f45-9708-019B960494DF}">
-                <a14:hiddenLine xmlns="" xmlns:a14="http://schemas.microsoft.com/office/drawing/2010/main" w="9525">
+              <a:ext uri="{91240B29-F687-4F45-9708-019B960494DF}">
+                <a14:hiddenLine xmlns:a14="http://schemas.microsoft.com/office/drawing/2010/main" w="9525">
                   <a:solidFill>
                     <a:srgbClr val="000000"/>
                   </a:solidFill>
@@ -18693,8 +18852,8 @@
               <a:noFill/>
             </a:ln>
             <a:extLst>
-              <a:ext uri="{91240B29-F687-4f45-9708-019B960494DF}">
-                <a14:hiddenLine xmlns="" xmlns:a14="http://schemas.microsoft.com/office/drawing/2010/main" w="9525">
+              <a:ext uri="{91240B29-F687-4F45-9708-019B960494DF}">
+                <a14:hiddenLine xmlns:a14="http://schemas.microsoft.com/office/drawing/2010/main" w="9525">
                   <a:solidFill>
                     <a:srgbClr val="000000"/>
                   </a:solidFill>
@@ -18783,8 +18942,8 @@
               <a:noFill/>
             </a:ln>
             <a:extLst>
-              <a:ext uri="{91240B29-F687-4f45-9708-019B960494DF}">
-                <a14:hiddenLine xmlns="" xmlns:a14="http://schemas.microsoft.com/office/drawing/2010/main" w="9525">
+              <a:ext uri="{91240B29-F687-4F45-9708-019B960494DF}">
+                <a14:hiddenLine xmlns:a14="http://schemas.microsoft.com/office/drawing/2010/main" w="9525">
                   <a:solidFill>
                     <a:srgbClr val="000000"/>
                   </a:solidFill>
@@ -18873,8 +19032,8 @@
               <a:noFill/>
             </a:ln>
             <a:extLst>
-              <a:ext uri="{91240B29-F687-4f45-9708-019B960494DF}">
-                <a14:hiddenLine xmlns="" xmlns:a14="http://schemas.microsoft.com/office/drawing/2010/main" w="9525">
+              <a:ext uri="{91240B29-F687-4F45-9708-019B960494DF}">
+                <a14:hiddenLine xmlns:a14="http://schemas.microsoft.com/office/drawing/2010/main" w="9525">
                   <a:solidFill>
                     <a:srgbClr val="000000"/>
                   </a:solidFill>
@@ -18929,8 +19088,8 @@
               <a:noFill/>
             </a:ln>
             <a:extLst>
-              <a:ext uri="{91240B29-F687-4f45-9708-019B960494DF}">
-                <a14:hiddenLine xmlns="" xmlns:a14="http://schemas.microsoft.com/office/drawing/2010/main" w="9525">
+              <a:ext uri="{91240B29-F687-4F45-9708-019B960494DF}">
+                <a14:hiddenLine xmlns:a14="http://schemas.microsoft.com/office/drawing/2010/main" w="9525">
                   <a:solidFill>
                     <a:srgbClr val="000000"/>
                   </a:solidFill>
@@ -19019,8 +19178,8 @@
               <a:noFill/>
             </a:ln>
             <a:extLst>
-              <a:ext uri="{91240B29-F687-4f45-9708-019B960494DF}">
-                <a14:hiddenLine xmlns="" xmlns:a14="http://schemas.microsoft.com/office/drawing/2010/main" w="9525">
+              <a:ext uri="{91240B29-F687-4F45-9708-019B960494DF}">
+                <a14:hiddenLine xmlns:a14="http://schemas.microsoft.com/office/drawing/2010/main" w="9525">
                   <a:solidFill>
                     <a:srgbClr val="000000"/>
                   </a:solidFill>
@@ -19075,8 +19234,8 @@
               <a:noFill/>
             </a:ln>
             <a:extLst>
-              <a:ext uri="{91240B29-F687-4f45-9708-019B960494DF}">
-                <a14:hiddenLine xmlns="" xmlns:a14="http://schemas.microsoft.com/office/drawing/2010/main" w="9525">
+              <a:ext uri="{91240B29-F687-4F45-9708-019B960494DF}">
+                <a14:hiddenLine xmlns:a14="http://schemas.microsoft.com/office/drawing/2010/main" w="9525">
                   <a:solidFill>
                     <a:srgbClr val="000000"/>
                   </a:solidFill>
@@ -19165,8 +19324,8 @@
               <a:noFill/>
             </a:ln>
             <a:extLst>
-              <a:ext uri="{91240B29-F687-4f45-9708-019B960494DF}">
-                <a14:hiddenLine xmlns="" xmlns:a14="http://schemas.microsoft.com/office/drawing/2010/main" w="9525">
+              <a:ext uri="{91240B29-F687-4F45-9708-019B960494DF}">
+                <a14:hiddenLine xmlns:a14="http://schemas.microsoft.com/office/drawing/2010/main" w="9525">
                   <a:solidFill>
                     <a:srgbClr val="000000"/>
                   </a:solidFill>
@@ -19233,8 +19392,8 @@
               <a:noFill/>
             </a:ln>
             <a:extLst>
-              <a:ext uri="{91240B29-F687-4f45-9708-019B960494DF}">
-                <a14:hiddenLine xmlns="" xmlns:a14="http://schemas.microsoft.com/office/drawing/2010/main" w="9525">
+              <a:ext uri="{91240B29-F687-4F45-9708-019B960494DF}">
+                <a14:hiddenLine xmlns:a14="http://schemas.microsoft.com/office/drawing/2010/main" w="9525">
                   <a:solidFill>
                     <a:srgbClr val="000000"/>
                   </a:solidFill>
@@ -19323,8 +19482,8 @@
               <a:noFill/>
             </a:ln>
             <a:extLst>
-              <a:ext uri="{91240B29-F687-4f45-9708-019B960494DF}">
-                <a14:hiddenLine xmlns="" xmlns:a14="http://schemas.microsoft.com/office/drawing/2010/main" w="9525">
+              <a:ext uri="{91240B29-F687-4F45-9708-019B960494DF}">
+                <a14:hiddenLine xmlns:a14="http://schemas.microsoft.com/office/drawing/2010/main" w="9525">
                   <a:solidFill>
                     <a:srgbClr val="000000"/>
                   </a:solidFill>
@@ -19391,8 +19550,8 @@
               <a:noFill/>
             </a:ln>
             <a:extLst>
-              <a:ext uri="{91240B29-F687-4f45-9708-019B960494DF}">
-                <a14:hiddenLine xmlns="" xmlns:a14="http://schemas.microsoft.com/office/drawing/2010/main" w="9525">
+              <a:ext uri="{91240B29-F687-4F45-9708-019B960494DF}">
+                <a14:hiddenLine xmlns:a14="http://schemas.microsoft.com/office/drawing/2010/main" w="9525">
                   <a:solidFill>
                     <a:srgbClr val="000000"/>
                   </a:solidFill>
@@ -19481,8 +19640,8 @@
               <a:noFill/>
             </a:ln>
             <a:extLst>
-              <a:ext uri="{91240B29-F687-4f45-9708-019B960494DF}">
-                <a14:hiddenLine xmlns="" xmlns:a14="http://schemas.microsoft.com/office/drawing/2010/main" w="9525">
+              <a:ext uri="{91240B29-F687-4F45-9708-019B960494DF}">
+                <a14:hiddenLine xmlns:a14="http://schemas.microsoft.com/office/drawing/2010/main" w="9525">
                   <a:solidFill>
                     <a:srgbClr val="000000"/>
                   </a:solidFill>
@@ -19515,8 +19674,8 @@
               <a:noFill/>
             </a:ln>
             <a:extLst>
-              <a:ext uri="{91240B29-F687-4f45-9708-019B960494DF}">
-                <a14:hiddenLine xmlns="" xmlns:a14="http://schemas.microsoft.com/office/drawing/2010/main" w="9525">
+              <a:ext uri="{91240B29-F687-4F45-9708-019B960494DF}">
+                <a14:hiddenLine xmlns:a14="http://schemas.microsoft.com/office/drawing/2010/main" w="9525">
                   <a:solidFill>
                     <a:srgbClr val="000000"/>
                   </a:solidFill>
@@ -19605,8 +19764,8 @@
               <a:noFill/>
             </a:ln>
             <a:extLst>
-              <a:ext uri="{91240B29-F687-4f45-9708-019B960494DF}">
-                <a14:hiddenLine xmlns="" xmlns:a14="http://schemas.microsoft.com/office/drawing/2010/main" w="9525">
+              <a:ext uri="{91240B29-F687-4F45-9708-019B960494DF}">
+                <a14:hiddenLine xmlns:a14="http://schemas.microsoft.com/office/drawing/2010/main" w="9525">
                   <a:solidFill>
                     <a:srgbClr val="000000"/>
                   </a:solidFill>
@@ -19667,8 +19826,8 @@
               <a:noFill/>
             </a:ln>
             <a:extLst>
-              <a:ext uri="{91240B29-F687-4f45-9708-019B960494DF}">
-                <a14:hiddenLine xmlns="" xmlns:a14="http://schemas.microsoft.com/office/drawing/2010/main" w="9525">
+              <a:ext uri="{91240B29-F687-4F45-9708-019B960494DF}">
+                <a14:hiddenLine xmlns:a14="http://schemas.microsoft.com/office/drawing/2010/main" w="9525">
                   <a:solidFill>
                     <a:srgbClr val="000000"/>
                   </a:solidFill>
@@ -19729,8 +19888,8 @@
               <a:noFill/>
             </a:ln>
             <a:extLst>
-              <a:ext uri="{91240B29-F687-4f45-9708-019B960494DF}">
-                <a14:hiddenLine xmlns="" xmlns:a14="http://schemas.microsoft.com/office/drawing/2010/main" w="9525">
+              <a:ext uri="{91240B29-F687-4F45-9708-019B960494DF}">
+                <a14:hiddenLine xmlns:a14="http://schemas.microsoft.com/office/drawing/2010/main" w="9525">
                   <a:solidFill>
                     <a:srgbClr val="000000"/>
                   </a:solidFill>
@@ -19819,8 +19978,8 @@
               <a:noFill/>
             </a:ln>
             <a:extLst>
-              <a:ext uri="{91240B29-F687-4f45-9708-019B960494DF}">
-                <a14:hiddenLine xmlns="" xmlns:a14="http://schemas.microsoft.com/office/drawing/2010/main" w="9525">
+              <a:ext uri="{91240B29-F687-4F45-9708-019B960494DF}">
+                <a14:hiddenLine xmlns:a14="http://schemas.microsoft.com/office/drawing/2010/main" w="9525">
                   <a:solidFill>
                     <a:srgbClr val="000000"/>
                   </a:solidFill>
@@ -19887,8 +20046,8 @@
               <a:noFill/>
             </a:ln>
             <a:extLst>
-              <a:ext uri="{91240B29-F687-4f45-9708-019B960494DF}">
-                <a14:hiddenLine xmlns="" xmlns:a14="http://schemas.microsoft.com/office/drawing/2010/main" w="9525">
+              <a:ext uri="{91240B29-F687-4F45-9708-019B960494DF}">
+                <a14:hiddenLine xmlns:a14="http://schemas.microsoft.com/office/drawing/2010/main" w="9525">
                   <a:solidFill>
                     <a:srgbClr val="000000"/>
                   </a:solidFill>
@@ -19949,8 +20108,8 @@
               <a:noFill/>
             </a:ln>
             <a:extLst>
-              <a:ext uri="{91240B29-F687-4f45-9708-019B960494DF}">
-                <a14:hiddenLine xmlns="" xmlns:a14="http://schemas.microsoft.com/office/drawing/2010/main" w="9525">
+              <a:ext uri="{91240B29-F687-4F45-9708-019B960494DF}">
+                <a14:hiddenLine xmlns:a14="http://schemas.microsoft.com/office/drawing/2010/main" w="9525">
                   <a:solidFill>
                     <a:srgbClr val="000000"/>
                   </a:solidFill>
@@ -20039,8 +20198,8 @@
               <a:noFill/>
             </a:ln>
             <a:extLst>
-              <a:ext uri="{91240B29-F687-4f45-9708-019B960494DF}">
-                <a14:hiddenLine xmlns="" xmlns:a14="http://schemas.microsoft.com/office/drawing/2010/main" w="9525">
+              <a:ext uri="{91240B29-F687-4F45-9708-019B960494DF}">
+                <a14:hiddenLine xmlns:a14="http://schemas.microsoft.com/office/drawing/2010/main" w="9525">
                   <a:solidFill>
                     <a:srgbClr val="000000"/>
                   </a:solidFill>
@@ -20101,8 +20260,8 @@
               <a:noFill/>
             </a:ln>
             <a:extLst>
-              <a:ext uri="{91240B29-F687-4f45-9708-019B960494DF}">
-                <a14:hiddenLine xmlns="" xmlns:a14="http://schemas.microsoft.com/office/drawing/2010/main" w="9525">
+              <a:ext uri="{91240B29-F687-4F45-9708-019B960494DF}">
+                <a14:hiddenLine xmlns:a14="http://schemas.microsoft.com/office/drawing/2010/main" w="9525">
                   <a:solidFill>
                     <a:srgbClr val="000000"/>
                   </a:solidFill>
@@ -20191,8 +20350,8 @@
               <a:noFill/>
             </a:ln>
             <a:extLst>
-              <a:ext uri="{91240B29-F687-4f45-9708-019B960494DF}">
-                <a14:hiddenLine xmlns="" xmlns:a14="http://schemas.microsoft.com/office/drawing/2010/main" w="9525">
+              <a:ext uri="{91240B29-F687-4F45-9708-019B960494DF}">
+                <a14:hiddenLine xmlns:a14="http://schemas.microsoft.com/office/drawing/2010/main" w="9525">
                   <a:solidFill>
                     <a:srgbClr val="000000"/>
                   </a:solidFill>
@@ -20253,8 +20412,8 @@
               <a:noFill/>
             </a:ln>
             <a:extLst>
-              <a:ext uri="{91240B29-F687-4f45-9708-019B960494DF}">
-                <a14:hiddenLine xmlns="" xmlns:a14="http://schemas.microsoft.com/office/drawing/2010/main" w="9525">
+              <a:ext uri="{91240B29-F687-4F45-9708-019B960494DF}">
+                <a14:hiddenLine xmlns:a14="http://schemas.microsoft.com/office/drawing/2010/main" w="9525">
                   <a:solidFill>
                     <a:srgbClr val="000000"/>
                   </a:solidFill>
@@ -20343,8 +20502,8 @@
               <a:noFill/>
             </a:ln>
             <a:extLst>
-              <a:ext uri="{91240B29-F687-4f45-9708-019B960494DF}">
-                <a14:hiddenLine xmlns="" xmlns:a14="http://schemas.microsoft.com/office/drawing/2010/main" w="9525">
+              <a:ext uri="{91240B29-F687-4F45-9708-019B960494DF}">
+                <a14:hiddenLine xmlns:a14="http://schemas.microsoft.com/office/drawing/2010/main" w="9525">
                   <a:solidFill>
                     <a:srgbClr val="000000"/>
                   </a:solidFill>
@@ -20377,8 +20536,8 @@
               <a:noFill/>
             </a:ln>
             <a:extLst>
-              <a:ext uri="{91240B29-F687-4f45-9708-019B960494DF}">
-                <a14:hiddenLine xmlns="" xmlns:a14="http://schemas.microsoft.com/office/drawing/2010/main" w="9525">
+              <a:ext uri="{91240B29-F687-4F45-9708-019B960494DF}">
+                <a14:hiddenLine xmlns:a14="http://schemas.microsoft.com/office/drawing/2010/main" w="9525">
                   <a:solidFill>
                     <a:srgbClr val="000000"/>
                   </a:solidFill>
@@ -20442,8 +20601,8 @@
               <a:noFill/>
             </a:ln>
             <a:extLst>
-              <a:ext uri="{91240B29-F687-4f45-9708-019B960494DF}">
-                <a14:hiddenLine xmlns="" xmlns:a14="http://schemas.microsoft.com/office/drawing/2010/main" w="9525">
+              <a:ext uri="{91240B29-F687-4F45-9708-019B960494DF}">
+                <a14:hiddenLine xmlns:a14="http://schemas.microsoft.com/office/drawing/2010/main" w="9525">
                   <a:solidFill>
                     <a:srgbClr val="000000"/>
                   </a:solidFill>
@@ -20532,8 +20691,8 @@
               <a:noFill/>
             </a:ln>
             <a:extLst>
-              <a:ext uri="{91240B29-F687-4f45-9708-019B960494DF}">
-                <a14:hiddenLine xmlns="" xmlns:a14="http://schemas.microsoft.com/office/drawing/2010/main" w="9525">
+              <a:ext uri="{91240B29-F687-4F45-9708-019B960494DF}">
+                <a14:hiddenLine xmlns:a14="http://schemas.microsoft.com/office/drawing/2010/main" w="9525">
                   <a:solidFill>
                     <a:srgbClr val="000000"/>
                   </a:solidFill>
@@ -20594,8 +20753,8 @@
               <a:noFill/>
             </a:ln>
             <a:extLst>
-              <a:ext uri="{91240B29-F687-4f45-9708-019B960494DF}">
-                <a14:hiddenLine xmlns="" xmlns:a14="http://schemas.microsoft.com/office/drawing/2010/main" w="9525">
+              <a:ext uri="{91240B29-F687-4F45-9708-019B960494DF}">
+                <a14:hiddenLine xmlns:a14="http://schemas.microsoft.com/office/drawing/2010/main" w="9525">
                   <a:solidFill>
                     <a:srgbClr val="000000"/>
                   </a:solidFill>
@@ -20684,8 +20843,8 @@
               <a:noFill/>
             </a:ln>
             <a:extLst>
-              <a:ext uri="{91240B29-F687-4f45-9708-019B960494DF}">
-                <a14:hiddenLine xmlns="" xmlns:a14="http://schemas.microsoft.com/office/drawing/2010/main" w="9525">
+              <a:ext uri="{91240B29-F687-4F45-9708-019B960494DF}">
+                <a14:hiddenLine xmlns:a14="http://schemas.microsoft.com/office/drawing/2010/main" w="9525">
                   <a:solidFill>
                     <a:srgbClr val="000000"/>
                   </a:solidFill>
@@ -20774,8 +20933,8 @@
               <a:noFill/>
             </a:ln>
             <a:extLst>
-              <a:ext uri="{91240B29-F687-4f45-9708-019B960494DF}">
-                <a14:hiddenLine xmlns="" xmlns:a14="http://schemas.microsoft.com/office/drawing/2010/main" w="9525">
+              <a:ext uri="{91240B29-F687-4F45-9708-019B960494DF}">
+                <a14:hiddenLine xmlns:a14="http://schemas.microsoft.com/office/drawing/2010/main" w="9525">
                   <a:solidFill>
                     <a:srgbClr val="000000"/>
                   </a:solidFill>
@@ -20839,8 +20998,8 @@
               <a:noFill/>
             </a:ln>
             <a:extLst>
-              <a:ext uri="{91240B29-F687-4f45-9708-019B960494DF}">
-                <a14:hiddenLine xmlns="" xmlns:a14="http://schemas.microsoft.com/office/drawing/2010/main" w="9525">
+              <a:ext uri="{91240B29-F687-4F45-9708-019B960494DF}">
+                <a14:hiddenLine xmlns:a14="http://schemas.microsoft.com/office/drawing/2010/main" w="9525">
                   <a:solidFill>
                     <a:srgbClr val="000000"/>
                   </a:solidFill>
@@ -20901,8 +21060,8 @@
               <a:noFill/>
             </a:ln>
             <a:extLst>
-              <a:ext uri="{91240B29-F687-4f45-9708-019B960494DF}">
-                <a14:hiddenLine xmlns="" xmlns:a14="http://schemas.microsoft.com/office/drawing/2010/main" w="9525">
+              <a:ext uri="{91240B29-F687-4F45-9708-019B960494DF}">
+                <a14:hiddenLine xmlns:a14="http://schemas.microsoft.com/office/drawing/2010/main" w="9525">
                   <a:solidFill>
                     <a:srgbClr val="000000"/>
                   </a:solidFill>
@@ -20991,8 +21150,8 @@
               <a:noFill/>
             </a:ln>
             <a:extLst>
-              <a:ext uri="{91240B29-F687-4f45-9708-019B960494DF}">
-                <a14:hiddenLine xmlns="" xmlns:a14="http://schemas.microsoft.com/office/drawing/2010/main" w="9525">
+              <a:ext uri="{91240B29-F687-4F45-9708-019B960494DF}">
+                <a14:hiddenLine xmlns:a14="http://schemas.microsoft.com/office/drawing/2010/main" w="9525">
                   <a:solidFill>
                     <a:srgbClr val="000000"/>
                   </a:solidFill>
@@ -21081,8 +21240,8 @@
               <a:noFill/>
             </a:ln>
             <a:extLst>
-              <a:ext uri="{91240B29-F687-4f45-9708-019B960494DF}">
-                <a14:hiddenLine xmlns="" xmlns:a14="http://schemas.microsoft.com/office/drawing/2010/main" w="9525">
+              <a:ext uri="{91240B29-F687-4F45-9708-019B960494DF}">
+                <a14:hiddenLine xmlns:a14="http://schemas.microsoft.com/office/drawing/2010/main" w="9525">
                   <a:solidFill>
                     <a:srgbClr val="000000"/>
                   </a:solidFill>
@@ -21143,8 +21302,8 @@
               <a:noFill/>
             </a:ln>
             <a:extLst>
-              <a:ext uri="{91240B29-F687-4f45-9708-019B960494DF}">
-                <a14:hiddenLine xmlns="" xmlns:a14="http://schemas.microsoft.com/office/drawing/2010/main" w="9525">
+              <a:ext uri="{91240B29-F687-4F45-9708-019B960494DF}">
+                <a14:hiddenLine xmlns:a14="http://schemas.microsoft.com/office/drawing/2010/main" w="9525">
                   <a:solidFill>
                     <a:srgbClr val="000000"/>
                   </a:solidFill>
@@ -21263,8 +21422,8 @@
               <a:noFill/>
             </a:ln>
             <a:extLst>
-              <a:ext uri="{91240B29-F687-4f45-9708-019B960494DF}">
-                <a14:hiddenLine xmlns="" xmlns:a14="http://schemas.microsoft.com/office/drawing/2010/main" w="9525">
+              <a:ext uri="{91240B29-F687-4F45-9708-019B960494DF}">
+                <a14:hiddenLine xmlns:a14="http://schemas.microsoft.com/office/drawing/2010/main" w="9525">
                   <a:solidFill>
                     <a:srgbClr val="000000"/>
                   </a:solidFill>
@@ -21331,8 +21490,8 @@
               <a:noFill/>
             </a:ln>
             <a:extLst>
-              <a:ext uri="{91240B29-F687-4f45-9708-019B960494DF}">
-                <a14:hiddenLine xmlns="" xmlns:a14="http://schemas.microsoft.com/office/drawing/2010/main" w="9525">
+              <a:ext uri="{91240B29-F687-4F45-9708-019B960494DF}">
+                <a14:hiddenLine xmlns:a14="http://schemas.microsoft.com/office/drawing/2010/main" w="9525">
                   <a:solidFill>
                     <a:srgbClr val="000000"/>
                   </a:solidFill>
@@ -21421,8 +21580,8 @@
               <a:noFill/>
             </a:ln>
             <a:extLst>
-              <a:ext uri="{91240B29-F687-4f45-9708-019B960494DF}">
-                <a14:hiddenLine xmlns="" xmlns:a14="http://schemas.microsoft.com/office/drawing/2010/main" w="9525">
+              <a:ext uri="{91240B29-F687-4F45-9708-019B960494DF}">
+                <a14:hiddenLine xmlns:a14="http://schemas.microsoft.com/office/drawing/2010/main" w="9525">
                   <a:solidFill>
                     <a:srgbClr val="000000"/>
                   </a:solidFill>
@@ -21562,7 +21721,7 @@
           <a:p>
             <a:fld id="{48A87A34-81AB-432B-8DAE-1953F412C126}" type="datetimeFigureOut">
               <a:rPr lang="en-US" smtClean="0"/>
-              <a:t>5/3/2013</a:t>
+              <a:t>5/6/2013</a:t>
             </a:fld>
             <a:endParaRPr lang="en-US" dirty="0"/>
           </a:p>
@@ -21829,7 +21988,7 @@
           <a:p>
             <a:fld id="{48A87A34-81AB-432B-8DAE-1953F412C126}" type="datetimeFigureOut">
               <a:rPr lang="en-US" smtClean="0"/>
-              <a:t>5/3/2013</a:t>
+              <a:t>5/6/2013</a:t>
             </a:fld>
             <a:endParaRPr lang="en-US" dirty="0"/>
           </a:p>
@@ -22025,7 +22184,7 @@
           <a:p>
             <a:fld id="{48A87A34-81AB-432B-8DAE-1953F412C126}" type="datetimeFigureOut">
               <a:rPr lang="en-US" smtClean="0"/>
-              <a:t>5/3/2013</a:t>
+              <a:t>5/6/2013</a:t>
             </a:fld>
             <a:endParaRPr lang="en-US" dirty="0"/>
           </a:p>
@@ -22288,7 +22447,7 @@
           <a:p>
             <a:fld id="{48A87A34-81AB-432B-8DAE-1953F412C126}" type="datetimeFigureOut">
               <a:rPr lang="en-US" smtClean="0"/>
-              <a:t>5/3/2013</a:t>
+              <a:t>5/6/2013</a:t>
             </a:fld>
             <a:endParaRPr lang="en-US" dirty="0"/>
           </a:p>
@@ -22722,7 +22881,7 @@
           <a:p>
             <a:fld id="{48A87A34-81AB-432B-8DAE-1953F412C126}" type="datetimeFigureOut">
               <a:rPr lang="en-US" smtClean="0"/>
-              <a:t>5/3/2013</a:t>
+              <a:t>5/6/2013</a:t>
             </a:fld>
             <a:endParaRPr lang="en-US" dirty="0"/>
           </a:p>
@@ -23268,7 +23427,7 @@
           <a:p>
             <a:fld id="{48A87A34-81AB-432B-8DAE-1953F412C126}" type="datetimeFigureOut">
               <a:rPr lang="en-US" smtClean="0"/>
-              <a:t>5/3/2013</a:t>
+              <a:t>5/6/2013</a:t>
             </a:fld>
             <a:endParaRPr lang="en-US" dirty="0"/>
           </a:p>
@@ -23988,7 +24147,7 @@
           <a:p>
             <a:fld id="{48A87A34-81AB-432B-8DAE-1953F412C126}" type="datetimeFigureOut">
               <a:rPr lang="en-US" smtClean="0"/>
-              <a:t>5/3/2013</a:t>
+              <a:t>5/6/2013</a:t>
             </a:fld>
             <a:endParaRPr lang="en-US" dirty="0"/>
           </a:p>
@@ -24158,7 +24317,7 @@
           <a:p>
             <a:fld id="{48A87A34-81AB-432B-8DAE-1953F412C126}" type="datetimeFigureOut">
               <a:rPr lang="en-US" smtClean="0"/>
-              <a:t>5/3/2013</a:t>
+              <a:t>5/6/2013</a:t>
             </a:fld>
             <a:endParaRPr lang="en-US" dirty="0"/>
           </a:p>
@@ -24338,7 +24497,7 @@
           <a:p>
             <a:fld id="{48A87A34-81AB-432B-8DAE-1953F412C126}" type="datetimeFigureOut">
               <a:rPr lang="en-US" smtClean="0"/>
-              <a:t>5/3/2013</a:t>
+              <a:t>5/6/2013</a:t>
             </a:fld>
             <a:endParaRPr lang="en-US" dirty="0"/>
           </a:p>
@@ -24508,7 +24667,7 @@
           <a:p>
             <a:fld id="{48A87A34-81AB-432B-8DAE-1953F412C126}" type="datetimeFigureOut">
               <a:rPr lang="en-US" smtClean="0"/>
-              <a:t>5/3/2013</a:t>
+              <a:t>5/6/2013</a:t>
             </a:fld>
             <a:endParaRPr lang="en-US" dirty="0"/>
           </a:p>
@@ -24758,7 +24917,7 @@
           <a:p>
             <a:fld id="{48A87A34-81AB-432B-8DAE-1953F412C126}" type="datetimeFigureOut">
               <a:rPr lang="en-US" smtClean="0"/>
-              <a:t>5/3/2013</a:t>
+              <a:t>5/6/2013</a:t>
             </a:fld>
             <a:endParaRPr lang="en-US" dirty="0"/>
           </a:p>
@@ -24990,7 +25149,7 @@
           <a:p>
             <a:fld id="{48A87A34-81AB-432B-8DAE-1953F412C126}" type="datetimeFigureOut">
               <a:rPr lang="en-US" smtClean="0"/>
-              <a:t>5/3/2013</a:t>
+              <a:t>5/6/2013</a:t>
             </a:fld>
             <a:endParaRPr lang="en-US" dirty="0"/>
           </a:p>
@@ -25371,7 +25530,7 @@
           <a:p>
             <a:fld id="{48A87A34-81AB-432B-8DAE-1953F412C126}" type="datetimeFigureOut">
               <a:rPr lang="en-US" smtClean="0"/>
-              <a:t>5/3/2013</a:t>
+              <a:t>5/6/2013</a:t>
             </a:fld>
             <a:endParaRPr lang="en-US" dirty="0"/>
           </a:p>
@@ -25489,7 +25648,7 @@
           <a:p>
             <a:fld id="{48A87A34-81AB-432B-8DAE-1953F412C126}" type="datetimeFigureOut">
               <a:rPr lang="en-US" smtClean="0"/>
-              <a:t>5/3/2013</a:t>
+              <a:t>5/6/2013</a:t>
             </a:fld>
             <a:endParaRPr lang="en-US" dirty="0"/>
           </a:p>
@@ -25584,7 +25743,7 @@
           <a:p>
             <a:fld id="{48A87A34-81AB-432B-8DAE-1953F412C126}" type="datetimeFigureOut">
               <a:rPr lang="en-US" smtClean="0"/>
-              <a:t>5/3/2013</a:t>
+              <a:t>5/6/2013</a:t>
             </a:fld>
             <a:endParaRPr lang="en-US" dirty="0"/>
           </a:p>
@@ -25833,7 +25992,7 @@
           <a:p>
             <a:fld id="{48A87A34-81AB-432B-8DAE-1953F412C126}" type="datetimeFigureOut">
               <a:rPr lang="en-US" smtClean="0"/>
-              <a:t>5/3/2013</a:t>
+              <a:t>5/6/2013</a:t>
             </a:fld>
             <a:endParaRPr lang="en-US" dirty="0"/>
           </a:p>
@@ -26113,7 +26272,7 @@
           <a:p>
             <a:fld id="{48A87A34-81AB-432B-8DAE-1953F412C126}" type="datetimeFigureOut">
               <a:rPr lang="en-US" smtClean="0"/>
-              <a:t>5/3/2013</a:t>
+              <a:t>5/6/2013</a:t>
             </a:fld>
             <a:endParaRPr lang="en-US" dirty="0"/>
           </a:p>
@@ -26235,8 +26394,8 @@
           </a:prstGeom>
           <a:noFill/>
           <a:extLst>
-            <a:ext uri="{909E8E84-426E-40dd-AFC4-6F175D3DCCD1}">
-              <a14:hiddenFill xmlns="" xmlns:a14="http://schemas.microsoft.com/office/drawing/2010/main">
+            <a:ext uri="{909E8E84-426E-40DD-AFC4-6F175D3DCCD1}">
+              <a14:hiddenFill xmlns:a14="http://schemas.microsoft.com/office/drawing/2010/main">
                 <a:solidFill>
                   <a:srgbClr val="FFFFFF"/>
                 </a:solidFill>
@@ -26309,8 +26468,8 @@
                 <a:noFill/>
               </a:ln>
               <a:extLst>
-                <a:ext uri="{91240B29-F687-4f45-9708-019B960494DF}">
-                  <a14:hiddenLine xmlns="" xmlns:a14="http://schemas.microsoft.com/office/drawing/2010/main" w="9525">
+                <a:ext uri="{91240B29-F687-4F45-9708-019B960494DF}">
+                  <a14:hiddenLine xmlns:a14="http://schemas.microsoft.com/office/drawing/2010/main" w="9525">
                     <a:solidFill>
                       <a:srgbClr val="000000"/>
                     </a:solidFill>
@@ -26399,8 +26558,8 @@
                 <a:noFill/>
               </a:ln>
               <a:extLst>
-                <a:ext uri="{91240B29-F687-4f45-9708-019B960494DF}">
-                  <a14:hiddenLine xmlns="" xmlns:a14="http://schemas.microsoft.com/office/drawing/2010/main" w="9525">
+                <a:ext uri="{91240B29-F687-4F45-9708-019B960494DF}">
+                  <a14:hiddenLine xmlns:a14="http://schemas.microsoft.com/office/drawing/2010/main" w="9525">
                     <a:solidFill>
                       <a:srgbClr val="000000"/>
                     </a:solidFill>
@@ -26489,8 +26648,8 @@
                 <a:noFill/>
               </a:ln>
               <a:extLst>
-                <a:ext uri="{91240B29-F687-4f45-9708-019B960494DF}">
-                  <a14:hiddenLine xmlns="" xmlns:a14="http://schemas.microsoft.com/office/drawing/2010/main" w="9525">
+                <a:ext uri="{91240B29-F687-4F45-9708-019B960494DF}">
+                  <a14:hiddenLine xmlns:a14="http://schemas.microsoft.com/office/drawing/2010/main" w="9525">
                     <a:solidFill>
                       <a:srgbClr val="000000"/>
                     </a:solidFill>
@@ -26551,8 +26710,8 @@
                 <a:noFill/>
               </a:ln>
               <a:extLst>
-                <a:ext uri="{91240B29-F687-4f45-9708-019B960494DF}">
-                  <a14:hiddenLine xmlns="" xmlns:a14="http://schemas.microsoft.com/office/drawing/2010/main" w="9525">
+                <a:ext uri="{91240B29-F687-4F45-9708-019B960494DF}">
+                  <a14:hiddenLine xmlns:a14="http://schemas.microsoft.com/office/drawing/2010/main" w="9525">
                     <a:solidFill>
                       <a:srgbClr val="000000"/>
                     </a:solidFill>
@@ -26641,8 +26800,8 @@
                 <a:noFill/>
               </a:ln>
               <a:extLst>
-                <a:ext uri="{91240B29-F687-4f45-9708-019B960494DF}">
-                  <a14:hiddenLine xmlns="" xmlns:a14="http://schemas.microsoft.com/office/drawing/2010/main" w="9525">
+                <a:ext uri="{91240B29-F687-4F45-9708-019B960494DF}">
+                  <a14:hiddenLine xmlns:a14="http://schemas.microsoft.com/office/drawing/2010/main" w="9525">
                     <a:solidFill>
                       <a:srgbClr val="000000"/>
                     </a:solidFill>
@@ -26703,8 +26862,8 @@
                 <a:noFill/>
               </a:ln>
               <a:extLst>
-                <a:ext uri="{91240B29-F687-4f45-9708-019B960494DF}">
-                  <a14:hiddenLine xmlns="" xmlns:a14="http://schemas.microsoft.com/office/drawing/2010/main" w="9525">
+                <a:ext uri="{91240B29-F687-4F45-9708-019B960494DF}">
+                  <a14:hiddenLine xmlns:a14="http://schemas.microsoft.com/office/drawing/2010/main" w="9525">
                     <a:solidFill>
                       <a:srgbClr val="000000"/>
                     </a:solidFill>
@@ -26765,8 +26924,8 @@
                 <a:noFill/>
               </a:ln>
               <a:extLst>
-                <a:ext uri="{91240B29-F687-4f45-9708-019B960494DF}">
-                  <a14:hiddenLine xmlns="" xmlns:a14="http://schemas.microsoft.com/office/drawing/2010/main" w="9525">
+                <a:ext uri="{91240B29-F687-4F45-9708-019B960494DF}">
+                  <a14:hiddenLine xmlns:a14="http://schemas.microsoft.com/office/drawing/2010/main" w="9525">
                     <a:solidFill>
                       <a:srgbClr val="000000"/>
                     </a:solidFill>
@@ -26855,8 +27014,8 @@
                 <a:noFill/>
               </a:ln>
               <a:extLst>
-                <a:ext uri="{91240B29-F687-4f45-9708-019B960494DF}">
-                  <a14:hiddenLine xmlns="" xmlns:a14="http://schemas.microsoft.com/office/drawing/2010/main" w="9525">
+                <a:ext uri="{91240B29-F687-4F45-9708-019B960494DF}">
+                  <a14:hiddenLine xmlns:a14="http://schemas.microsoft.com/office/drawing/2010/main" w="9525">
                     <a:solidFill>
                       <a:srgbClr val="000000"/>
                     </a:solidFill>
@@ -26945,8 +27104,8 @@
                 <a:noFill/>
               </a:ln>
               <a:extLst>
-                <a:ext uri="{91240B29-F687-4f45-9708-019B960494DF}">
-                  <a14:hiddenLine xmlns="" xmlns:a14="http://schemas.microsoft.com/office/drawing/2010/main" w="9525">
+                <a:ext uri="{91240B29-F687-4F45-9708-019B960494DF}">
+                  <a14:hiddenLine xmlns:a14="http://schemas.microsoft.com/office/drawing/2010/main" w="9525">
                     <a:solidFill>
                       <a:srgbClr val="000000"/>
                     </a:solidFill>
@@ -27007,8 +27166,8 @@
                 <a:noFill/>
               </a:ln>
               <a:extLst>
-                <a:ext uri="{91240B29-F687-4f45-9708-019B960494DF}">
-                  <a14:hiddenLine xmlns="" xmlns:a14="http://schemas.microsoft.com/office/drawing/2010/main" w="9525">
+                <a:ext uri="{91240B29-F687-4F45-9708-019B960494DF}">
+                  <a14:hiddenLine xmlns:a14="http://schemas.microsoft.com/office/drawing/2010/main" w="9525">
                     <a:solidFill>
                       <a:srgbClr val="000000"/>
                     </a:solidFill>
@@ -27117,8 +27276,8 @@
                 <a:noFill/>
               </a:ln>
               <a:extLst>
-                <a:ext uri="{91240B29-F687-4f45-9708-019B960494DF}">
-                  <a14:hiddenLine xmlns="" xmlns:a14="http://schemas.microsoft.com/office/drawing/2010/main" w="9525">
+                <a:ext uri="{91240B29-F687-4F45-9708-019B960494DF}">
+                  <a14:hiddenLine xmlns:a14="http://schemas.microsoft.com/office/drawing/2010/main" w="9525">
                     <a:solidFill>
                       <a:srgbClr val="000000"/>
                     </a:solidFill>
@@ -27201,8 +27360,8 @@
                 <a:noFill/>
               </a:ln>
               <a:extLst>
-                <a:ext uri="{91240B29-F687-4f45-9708-019B960494DF}">
-                  <a14:hiddenLine xmlns="" xmlns:a14="http://schemas.microsoft.com/office/drawing/2010/main" w="9525">
+                <a:ext uri="{91240B29-F687-4F45-9708-019B960494DF}">
+                  <a14:hiddenLine xmlns:a14="http://schemas.microsoft.com/office/drawing/2010/main" w="9525">
                     <a:solidFill>
                       <a:srgbClr val="000000"/>
                     </a:solidFill>
@@ -27263,8 +27422,8 @@
                 <a:noFill/>
               </a:ln>
               <a:extLst>
-                <a:ext uri="{91240B29-F687-4f45-9708-019B960494DF}">
-                  <a14:hiddenLine xmlns="" xmlns:a14="http://schemas.microsoft.com/office/drawing/2010/main" w="9525">
+                <a:ext uri="{91240B29-F687-4F45-9708-019B960494DF}">
+                  <a14:hiddenLine xmlns:a14="http://schemas.microsoft.com/office/drawing/2010/main" w="9525">
                     <a:solidFill>
                       <a:srgbClr val="000000"/>
                     </a:solidFill>
@@ -27325,8 +27484,8 @@
                 <a:noFill/>
               </a:ln>
               <a:extLst>
-                <a:ext uri="{91240B29-F687-4f45-9708-019B960494DF}">
-                  <a14:hiddenLine xmlns="" xmlns:a14="http://schemas.microsoft.com/office/drawing/2010/main" w="9525">
+                <a:ext uri="{91240B29-F687-4F45-9708-019B960494DF}">
+                  <a14:hiddenLine xmlns:a14="http://schemas.microsoft.com/office/drawing/2010/main" w="9525">
                     <a:solidFill>
                       <a:srgbClr val="000000"/>
                     </a:solidFill>
@@ -27415,8 +27574,8 @@
                 <a:noFill/>
               </a:ln>
               <a:extLst>
-                <a:ext uri="{91240B29-F687-4f45-9708-019B960494DF}">
-                  <a14:hiddenLine xmlns="" xmlns:a14="http://schemas.microsoft.com/office/drawing/2010/main" w="9525">
+                <a:ext uri="{91240B29-F687-4F45-9708-019B960494DF}">
+                  <a14:hiddenLine xmlns:a14="http://schemas.microsoft.com/office/drawing/2010/main" w="9525">
                     <a:solidFill>
                       <a:srgbClr val="000000"/>
                     </a:solidFill>
@@ -27449,8 +27608,8 @@
                 <a:noFill/>
               </a:ln>
               <a:extLst>
-                <a:ext uri="{91240B29-F687-4f45-9708-019B960494DF}">
-                  <a14:hiddenLine xmlns="" xmlns:a14="http://schemas.microsoft.com/office/drawing/2010/main" w="9525">
+                <a:ext uri="{91240B29-F687-4F45-9708-019B960494DF}">
+                  <a14:hiddenLine xmlns:a14="http://schemas.microsoft.com/office/drawing/2010/main" w="9525">
                     <a:solidFill>
                       <a:srgbClr val="000000"/>
                     </a:solidFill>
@@ -27514,8 +27673,8 @@
                 <a:noFill/>
               </a:ln>
               <a:extLst>
-                <a:ext uri="{91240B29-F687-4f45-9708-019B960494DF}">
-                  <a14:hiddenLine xmlns="" xmlns:a14="http://schemas.microsoft.com/office/drawing/2010/main" w="9525">
+                <a:ext uri="{91240B29-F687-4F45-9708-019B960494DF}">
+                  <a14:hiddenLine xmlns:a14="http://schemas.microsoft.com/office/drawing/2010/main" w="9525">
                     <a:solidFill>
                       <a:srgbClr val="000000"/>
                     </a:solidFill>
@@ -27604,8 +27763,8 @@
                 <a:noFill/>
               </a:ln>
               <a:extLst>
-                <a:ext uri="{91240B29-F687-4f45-9708-019B960494DF}">
-                  <a14:hiddenLine xmlns="" xmlns:a14="http://schemas.microsoft.com/office/drawing/2010/main" w="9525">
+                <a:ext uri="{91240B29-F687-4F45-9708-019B960494DF}">
+                  <a14:hiddenLine xmlns:a14="http://schemas.microsoft.com/office/drawing/2010/main" w="9525">
                     <a:solidFill>
                       <a:srgbClr val="000000"/>
                     </a:solidFill>
@@ -27666,8 +27825,8 @@
                 <a:noFill/>
               </a:ln>
               <a:extLst>
-                <a:ext uri="{91240B29-F687-4f45-9708-019B960494DF}">
-                  <a14:hiddenLine xmlns="" xmlns:a14="http://schemas.microsoft.com/office/drawing/2010/main" w="9525">
+                <a:ext uri="{91240B29-F687-4F45-9708-019B960494DF}">
+                  <a14:hiddenLine xmlns:a14="http://schemas.microsoft.com/office/drawing/2010/main" w="9525">
                     <a:solidFill>
                       <a:srgbClr val="000000"/>
                     </a:solidFill>
@@ -27756,8 +27915,8 @@
                 <a:noFill/>
               </a:ln>
               <a:extLst>
-                <a:ext uri="{91240B29-F687-4f45-9708-019B960494DF}">
-                  <a14:hiddenLine xmlns="" xmlns:a14="http://schemas.microsoft.com/office/drawing/2010/main" w="9525">
+                <a:ext uri="{91240B29-F687-4F45-9708-019B960494DF}">
+                  <a14:hiddenLine xmlns:a14="http://schemas.microsoft.com/office/drawing/2010/main" w="9525">
                     <a:solidFill>
                       <a:srgbClr val="000000"/>
                     </a:solidFill>
@@ -27821,8 +27980,8 @@
                 <a:noFill/>
               </a:ln>
               <a:extLst>
-                <a:ext uri="{91240B29-F687-4f45-9708-019B960494DF}">
-                  <a14:hiddenLine xmlns="" xmlns:a14="http://schemas.microsoft.com/office/drawing/2010/main" w="9525">
+                <a:ext uri="{91240B29-F687-4F45-9708-019B960494DF}">
+                  <a14:hiddenLine xmlns:a14="http://schemas.microsoft.com/office/drawing/2010/main" w="9525">
                     <a:solidFill>
                       <a:srgbClr val="000000"/>
                     </a:solidFill>
@@ -27883,8 +28042,8 @@
                 <a:noFill/>
               </a:ln>
               <a:extLst>
-                <a:ext uri="{91240B29-F687-4f45-9708-019B960494DF}">
-                  <a14:hiddenLine xmlns="" xmlns:a14="http://schemas.microsoft.com/office/drawing/2010/main" w="9525">
+                <a:ext uri="{91240B29-F687-4F45-9708-019B960494DF}">
+                  <a14:hiddenLine xmlns:a14="http://schemas.microsoft.com/office/drawing/2010/main" w="9525">
                     <a:solidFill>
                       <a:srgbClr val="000000"/>
                     </a:solidFill>
@@ -27973,8 +28132,8 @@
                 <a:noFill/>
               </a:ln>
               <a:extLst>
-                <a:ext uri="{91240B29-F687-4f45-9708-019B960494DF}">
-                  <a14:hiddenLine xmlns="" xmlns:a14="http://schemas.microsoft.com/office/drawing/2010/main" w="9525">
+                <a:ext uri="{91240B29-F687-4F45-9708-019B960494DF}">
+                  <a14:hiddenLine xmlns:a14="http://schemas.microsoft.com/office/drawing/2010/main" w="9525">
                     <a:solidFill>
                       <a:srgbClr val="000000"/>
                     </a:solidFill>
@@ -28063,8 +28222,8 @@
                 <a:noFill/>
               </a:ln>
               <a:extLst>
-                <a:ext uri="{91240B29-F687-4f45-9708-019B960494DF}">
-                  <a14:hiddenLine xmlns="" xmlns:a14="http://schemas.microsoft.com/office/drawing/2010/main" w="9525">
+                <a:ext uri="{91240B29-F687-4F45-9708-019B960494DF}">
+                  <a14:hiddenLine xmlns:a14="http://schemas.microsoft.com/office/drawing/2010/main" w="9525">
                     <a:solidFill>
                       <a:srgbClr val="000000"/>
                     </a:solidFill>
@@ -28128,8 +28287,8 @@
                 <a:noFill/>
               </a:ln>
               <a:extLst>
-                <a:ext uri="{91240B29-F687-4f45-9708-019B960494DF}">
-                  <a14:hiddenLine xmlns="" xmlns:a14="http://schemas.microsoft.com/office/drawing/2010/main" w="9525">
+                <a:ext uri="{91240B29-F687-4F45-9708-019B960494DF}">
+                  <a14:hiddenLine xmlns:a14="http://schemas.microsoft.com/office/drawing/2010/main" w="9525">
                     <a:solidFill>
                       <a:srgbClr val="000000"/>
                     </a:solidFill>
@@ -28248,8 +28407,8 @@
                 <a:noFill/>
               </a:ln>
               <a:extLst>
-                <a:ext uri="{91240B29-F687-4f45-9708-019B960494DF}">
-                  <a14:hiddenLine xmlns="" xmlns:a14="http://schemas.microsoft.com/office/drawing/2010/main" w="9525">
+                <a:ext uri="{91240B29-F687-4F45-9708-019B960494DF}">
+                  <a14:hiddenLine xmlns:a14="http://schemas.microsoft.com/office/drawing/2010/main" w="9525">
                     <a:solidFill>
                       <a:srgbClr val="000000"/>
                     </a:solidFill>
@@ -28329,8 +28488,8 @@
                 <a:noFill/>
               </a:ln>
               <a:extLst>
-                <a:ext uri="{91240B29-F687-4f45-9708-019B960494DF}">
-                  <a14:hiddenLine xmlns="" xmlns:a14="http://schemas.microsoft.com/office/drawing/2010/main" w="9525">
+                <a:ext uri="{91240B29-F687-4F45-9708-019B960494DF}">
+                  <a14:hiddenLine xmlns:a14="http://schemas.microsoft.com/office/drawing/2010/main" w="9525">
                     <a:solidFill>
                       <a:srgbClr val="000000"/>
                     </a:solidFill>
@@ -28444,8 +28603,8 @@
                 <a:noFill/>
               </a:ln>
               <a:extLst>
-                <a:ext uri="{91240B29-F687-4f45-9708-019B960494DF}">
-                  <a14:hiddenLine xmlns="" xmlns:a14="http://schemas.microsoft.com/office/drawing/2010/main" w="9525">
+                <a:ext uri="{91240B29-F687-4F45-9708-019B960494DF}">
+                  <a14:hiddenLine xmlns:a14="http://schemas.microsoft.com/office/drawing/2010/main" w="9525">
                     <a:solidFill>
                       <a:srgbClr val="000000"/>
                     </a:solidFill>
@@ -28534,8 +28693,8 @@
                 <a:noFill/>
               </a:ln>
               <a:extLst>
-                <a:ext uri="{91240B29-F687-4f45-9708-019B960494DF}">
-                  <a14:hiddenLine xmlns="" xmlns:a14="http://schemas.microsoft.com/office/drawing/2010/main" w="9525">
+                <a:ext uri="{91240B29-F687-4F45-9708-019B960494DF}">
+                  <a14:hiddenLine xmlns:a14="http://schemas.microsoft.com/office/drawing/2010/main" w="9525">
                     <a:solidFill>
                       <a:srgbClr val="000000"/>
                     </a:solidFill>
@@ -28599,8 +28758,8 @@
                 <a:noFill/>
               </a:ln>
               <a:extLst>
-                <a:ext uri="{91240B29-F687-4f45-9708-019B960494DF}">
-                  <a14:hiddenLine xmlns="" xmlns:a14="http://schemas.microsoft.com/office/drawing/2010/main" w="9525">
+                <a:ext uri="{91240B29-F687-4F45-9708-019B960494DF}">
+                  <a14:hiddenLine xmlns:a14="http://schemas.microsoft.com/office/drawing/2010/main" w="9525">
                     <a:solidFill>
                       <a:srgbClr val="000000"/>
                     </a:solidFill>
@@ -28689,8 +28848,8 @@
                 <a:noFill/>
               </a:ln>
               <a:extLst>
-                <a:ext uri="{91240B29-F687-4f45-9708-019B960494DF}">
-                  <a14:hiddenLine xmlns="" xmlns:a14="http://schemas.microsoft.com/office/drawing/2010/main" w="9525">
+                <a:ext uri="{91240B29-F687-4F45-9708-019B960494DF}">
+                  <a14:hiddenLine xmlns:a14="http://schemas.microsoft.com/office/drawing/2010/main" w="9525">
                     <a:solidFill>
                       <a:srgbClr val="000000"/>
                     </a:solidFill>
@@ -28757,8 +28916,8 @@
                 <a:noFill/>
               </a:ln>
               <a:extLst>
-                <a:ext uri="{91240B29-F687-4f45-9708-019B960494DF}">
-                  <a14:hiddenLine xmlns="" xmlns:a14="http://schemas.microsoft.com/office/drawing/2010/main" w="9525">
+                <a:ext uri="{91240B29-F687-4F45-9708-019B960494DF}">
+                  <a14:hiddenLine xmlns:a14="http://schemas.microsoft.com/office/drawing/2010/main" w="9525">
                     <a:solidFill>
                       <a:srgbClr val="000000"/>
                     </a:solidFill>
@@ -28847,8 +29006,8 @@
                 <a:noFill/>
               </a:ln>
               <a:extLst>
-                <a:ext uri="{91240B29-F687-4f45-9708-019B960494DF}">
-                  <a14:hiddenLine xmlns="" xmlns:a14="http://schemas.microsoft.com/office/drawing/2010/main" w="9525">
+                <a:ext uri="{91240B29-F687-4F45-9708-019B960494DF}">
+                  <a14:hiddenLine xmlns:a14="http://schemas.microsoft.com/office/drawing/2010/main" w="9525">
                     <a:solidFill>
                       <a:srgbClr val="000000"/>
                     </a:solidFill>
@@ -28915,8 +29074,8 @@
                 <a:noFill/>
               </a:ln>
               <a:extLst>
-                <a:ext uri="{91240B29-F687-4f45-9708-019B960494DF}">
-                  <a14:hiddenLine xmlns="" xmlns:a14="http://schemas.microsoft.com/office/drawing/2010/main" w="9525">
+                <a:ext uri="{91240B29-F687-4F45-9708-019B960494DF}">
+                  <a14:hiddenLine xmlns:a14="http://schemas.microsoft.com/office/drawing/2010/main" w="9525">
                     <a:solidFill>
                       <a:srgbClr val="000000"/>
                     </a:solidFill>
@@ -29005,8 +29164,8 @@
                 <a:noFill/>
               </a:ln>
               <a:extLst>
-                <a:ext uri="{91240B29-F687-4f45-9708-019B960494DF}">
-                  <a14:hiddenLine xmlns="" xmlns:a14="http://schemas.microsoft.com/office/drawing/2010/main" w="9525">
+                <a:ext uri="{91240B29-F687-4F45-9708-019B960494DF}">
+                  <a14:hiddenLine xmlns:a14="http://schemas.microsoft.com/office/drawing/2010/main" w="9525">
                     <a:solidFill>
                       <a:srgbClr val="000000"/>
                     </a:solidFill>
@@ -29039,8 +29198,8 @@
                 <a:noFill/>
               </a:ln>
               <a:extLst>
-                <a:ext uri="{91240B29-F687-4f45-9708-019B960494DF}">
-                  <a14:hiddenLine xmlns="" xmlns:a14="http://schemas.microsoft.com/office/drawing/2010/main" w="9525">
+                <a:ext uri="{91240B29-F687-4F45-9708-019B960494DF}">
+                  <a14:hiddenLine xmlns:a14="http://schemas.microsoft.com/office/drawing/2010/main" w="9525">
                     <a:solidFill>
                       <a:srgbClr val="000000"/>
                     </a:solidFill>
@@ -29181,7 +29340,7 @@
             <a:fld id="{48A87A34-81AB-432B-8DAE-1953F412C126}" type="datetimeFigureOut">
               <a:rPr lang="en-US" smtClean="0"/>
               <a:pPr/>
-              <a:t>5/3/2013</a:t>
+              <a:t>5/6/2013</a:t>
             </a:fld>
             <a:endParaRPr lang="en-US" dirty="0"/>
           </a:p>
@@ -29704,186 +29863,6 @@
           <a:p>
             <a:r>
               <a:rPr lang="en-US" dirty="0" smtClean="0"/>
-              <a:t>Method 2 - Linear Transformations</a:t>
-            </a:r>
-            <a:endParaRPr lang="en-US" dirty="0"/>
-          </a:p>
-        </p:txBody>
-      </p:sp>
-      <p:sp>
-        <p:nvSpPr>
-          <p:cNvPr id="3" name="Content Placeholder 2"/>
-          <p:cNvSpPr>
-            <a:spLocks noGrp="1"/>
-          </p:cNvSpPr>
-          <p:nvPr>
-            <p:ph idx="1"/>
-          </p:nvPr>
-        </p:nvSpPr>
-        <p:spPr/>
-        <p:txBody>
-          <a:bodyPr/>
-          <a:lstStyle/>
-          <a:p>
-            <a:r>
-              <a:rPr lang="en-US" dirty="0" smtClean="0"/>
-              <a:t>VECTOR.MUTATION</a:t>
-            </a:r>
-          </a:p>
-          <a:p>
-            <a:pPr lvl="1"/>
-            <a:r>
-              <a:rPr lang="en-US" dirty="0" smtClean="0"/>
-              <a:t>Change the coefficient of a given attribute by some small amount</a:t>
-            </a:r>
-          </a:p>
-          <a:p>
-            <a:pPr lvl="1"/>
-            <a:r>
-              <a:rPr lang="en-US" dirty="0" smtClean="0"/>
-              <a:t>Allows for finer tuning and changes</a:t>
-            </a:r>
-            <a:endParaRPr lang="en-US" dirty="0" smtClean="0"/>
-          </a:p>
-          <a:p>
-            <a:r>
-              <a:rPr lang="en-US" dirty="0" smtClean="0"/>
-              <a:t>VECTOR.CROSS_OVER</a:t>
-            </a:r>
-          </a:p>
-          <a:p>
-            <a:pPr lvl="1"/>
-            <a:r>
-              <a:rPr lang="en-US" dirty="0" smtClean="0"/>
-              <a:t>Find the average of a coefficient given a shared modifier</a:t>
-            </a:r>
-            <a:endParaRPr lang="en-US" dirty="0" smtClean="0"/>
-          </a:p>
-          <a:p>
-            <a:pPr lvl="1"/>
-            <a:endParaRPr lang="en-US" dirty="0"/>
-          </a:p>
-        </p:txBody>
-      </p:sp>
-    </p:spTree>
-    <p:extLst>
-      <p:ext uri="{BB962C8B-B14F-4D97-AF65-F5344CB8AC3E}">
-        <p14:creationId xmlns:p14="http://schemas.microsoft.com/office/powerpoint/2010/main" val="2480964042"/>
-      </p:ext>
-    </p:extLst>
-  </p:cSld>
-  <p:clrMapOvr>
-    <a:masterClrMapping/>
-  </p:clrMapOvr>
-</p:sld>
-</file>
-
-<file path=ppt/slides/slide11.xml><?xml version="1.0" encoding="utf-8"?>
-<p:sld xmlns:a="http://schemas.openxmlformats.org/drawingml/2006/main" xmlns:r="http://schemas.openxmlformats.org/officeDocument/2006/relationships" xmlns:p="http://schemas.openxmlformats.org/presentationml/2006/main">
-  <p:cSld>
-    <p:spTree>
-      <p:nvGrpSpPr>
-        <p:cNvPr id="1" name=""/>
-        <p:cNvGrpSpPr/>
-        <p:nvPr/>
-      </p:nvGrpSpPr>
-      <p:grpSpPr>
-        <a:xfrm>
-          <a:off x="0" y="0"/>
-          <a:ext cx="0" cy="0"/>
-          <a:chOff x="0" y="0"/>
-          <a:chExt cx="0" cy="0"/>
-        </a:xfrm>
-      </p:grpSpPr>
-      <p:sp>
-        <p:nvSpPr>
-          <p:cNvPr id="2" name="Title 1"/>
-          <p:cNvSpPr>
-            <a:spLocks noGrp="1"/>
-          </p:cNvSpPr>
-          <p:nvPr>
-            <p:ph type="title"/>
-          </p:nvPr>
-        </p:nvSpPr>
-        <p:spPr/>
-        <p:txBody>
-          <a:bodyPr/>
-          <a:lstStyle/>
-          <a:p>
-            <a:r>
-              <a:rPr lang="en-US" dirty="0" smtClean="0"/>
-              <a:t>Final Discussion</a:t>
-            </a:r>
-            <a:endParaRPr lang="en-US" dirty="0"/>
-          </a:p>
-        </p:txBody>
-      </p:sp>
-      <p:sp>
-        <p:nvSpPr>
-          <p:cNvPr id="3" name="Content Placeholder 2"/>
-          <p:cNvSpPr>
-            <a:spLocks noGrp="1"/>
-          </p:cNvSpPr>
-          <p:nvPr>
-            <p:ph idx="1"/>
-          </p:nvPr>
-        </p:nvSpPr>
-        <p:spPr/>
-        <p:txBody>
-          <a:bodyPr/>
-          <a:lstStyle/>
-          <a:p>
-            <a:endParaRPr lang="en-US" dirty="0"/>
-          </a:p>
-        </p:txBody>
-      </p:sp>
-    </p:spTree>
-    <p:extLst>
-      <p:ext uri="{BB962C8B-B14F-4D97-AF65-F5344CB8AC3E}">
-        <p14:creationId xmlns:p14="http://schemas.microsoft.com/office/powerpoint/2010/main" val="4289662780"/>
-      </p:ext>
-    </p:extLst>
-  </p:cSld>
-  <p:clrMapOvr>
-    <a:masterClrMapping/>
-  </p:clrMapOvr>
-</p:sld>
-</file>
-
-<file path=ppt/slides/slide12.xml><?xml version="1.0" encoding="utf-8"?>
-<p:sld xmlns:a="http://schemas.openxmlformats.org/drawingml/2006/main" xmlns:r="http://schemas.openxmlformats.org/officeDocument/2006/relationships" xmlns:p="http://schemas.openxmlformats.org/presentationml/2006/main">
-  <p:cSld>
-    <p:spTree>
-      <p:nvGrpSpPr>
-        <p:cNvPr id="1" name=""/>
-        <p:cNvGrpSpPr/>
-        <p:nvPr/>
-      </p:nvGrpSpPr>
-      <p:grpSpPr>
-        <a:xfrm>
-          <a:off x="0" y="0"/>
-          <a:ext cx="0" cy="0"/>
-          <a:chOff x="0" y="0"/>
-          <a:chExt cx="0" cy="0"/>
-        </a:xfrm>
-      </p:grpSpPr>
-      <p:sp>
-        <p:nvSpPr>
-          <p:cNvPr id="2" name="Title 1"/>
-          <p:cNvSpPr>
-            <a:spLocks noGrp="1"/>
-          </p:cNvSpPr>
-          <p:nvPr>
-            <p:ph type="title"/>
-          </p:nvPr>
-        </p:nvSpPr>
-        <p:spPr/>
-        <p:txBody>
-          <a:bodyPr/>
-          <a:lstStyle/>
-          <a:p>
-            <a:r>
-              <a:rPr lang="en-US" dirty="0" smtClean="0"/>
               <a:t>Things That Did Not Work</a:t>
             </a:r>
             <a:endParaRPr lang="en-US" dirty="0"/>
@@ -29922,7 +29901,7 @@
 </p:sld>
 </file>
 
-<file path=ppt/slides/slide13.xml><?xml version="1.0" encoding="utf-8"?>
+<file path=ppt/slides/slide11.xml><?xml version="1.0" encoding="utf-8"?>
 <p:sld xmlns:a="http://schemas.openxmlformats.org/drawingml/2006/main" xmlns:r="http://schemas.openxmlformats.org/officeDocument/2006/relationships" xmlns:p="http://schemas.openxmlformats.org/presentationml/2006/main">
   <p:cSld>
     <p:spTree>
@@ -29980,7 +29959,7 @@
 </p:sld>
 </file>
 
-<file path=ppt/slides/slide14.xml><?xml version="1.0" encoding="utf-8"?>
+<file path=ppt/slides/slide12.xml><?xml version="1.0" encoding="utf-8"?>
 <p:sld xmlns:a="http://schemas.openxmlformats.org/drawingml/2006/main" xmlns:r="http://schemas.openxmlformats.org/officeDocument/2006/relationships" xmlns:p="http://schemas.openxmlformats.org/presentationml/2006/main">
   <p:cSld>
     <p:spTree>
@@ -30092,7 +30071,7 @@
 </p:sld>
 </file>
 
-<file path=ppt/slides/slide15.xml><?xml version="1.0" encoding="utf-8"?>
+<file path=ppt/slides/slide13.xml><?xml version="1.0" encoding="utf-8"?>
 <p:sld xmlns:a="http://schemas.openxmlformats.org/drawingml/2006/main" xmlns:r="http://schemas.openxmlformats.org/officeDocument/2006/relationships" xmlns:p="http://schemas.openxmlformats.org/presentationml/2006/main">
   <p:cSld>
     <p:spTree>
@@ -30640,22 +30619,103 @@
             <p:ph type="title"/>
           </p:nvPr>
         </p:nvSpPr>
-        <p:spPr/>
+        <p:spPr>
+          <a:xfrm>
+            <a:off x="1141413" y="443707"/>
+            <a:ext cx="9905998" cy="1478570"/>
+          </a:xfrm>
+        </p:spPr>
         <p:txBody>
           <a:bodyPr/>
           <a:lstStyle/>
           <a:p>
             <a:r>
               <a:rPr lang="en-US" dirty="0" smtClean="0"/>
-              <a:t>Method 1 - Function Trees</a:t>
+              <a:t>Method 1 –</a:t>
+            </a:r>
+            <a:br>
+              <a:rPr lang="en-US" dirty="0" smtClean="0"/>
+            </a:br>
+            <a:r>
+              <a:rPr lang="en-US" dirty="0" smtClean="0"/>
+              <a:t> function Tress</a:t>
             </a:r>
             <a:endParaRPr lang="en-US" dirty="0"/>
           </a:p>
         </p:txBody>
       </p:sp>
+      <p:pic>
+        <p:nvPicPr>
+          <p:cNvPr id="1026" name="Picture 2"/>
+          <p:cNvPicPr>
+            <a:picLocks noChangeAspect="1" noChangeArrowheads="1"/>
+          </p:cNvPicPr>
+          <p:nvPr/>
+        </p:nvPicPr>
+        <p:blipFill>
+          <a:blip r:embed="rId2">
+            <a:extLst>
+              <a:ext uri="{28A0092B-C50C-407E-A947-70E740481C1C}">
+                <a14:useLocalDpi xmlns:a14="http://schemas.microsoft.com/office/drawing/2010/main" val="0"/>
+              </a:ext>
+            </a:extLst>
+          </a:blip>
+          <a:srcRect/>
+          <a:stretch>
+            <a:fillRect/>
+          </a:stretch>
+        </p:blipFill>
+        <p:spPr bwMode="auto">
+          <a:xfrm>
+            <a:off x="6082553" y="475970"/>
+            <a:ext cx="4895850" cy="5610225"/>
+          </a:xfrm>
+          <a:prstGeom prst="rect">
+            <a:avLst/>
+          </a:prstGeom>
+          <a:ln>
+            <a:noFill/>
+          </a:ln>
+          <a:effectLst>
+            <a:outerShdw blurRad="292100" dist="139700" dir="2700000" algn="tl" rotWithShape="0">
+              <a:srgbClr val="333333">
+                <a:alpha val="65000"/>
+              </a:srgbClr>
+            </a:outerShdw>
+          </a:effectLst>
+          <a:extLst>
+            <a:ext uri="{909E8E84-426E-40DD-AFC4-6F175D3DCCD1}">
+              <a14:hiddenFill xmlns:a14="http://schemas.microsoft.com/office/drawing/2010/main">
+                <a:solidFill>
+                  <a:schemeClr val="accent1"/>
+                </a:solidFill>
+              </a14:hiddenFill>
+            </a:ext>
+            <a:ext uri="{91240B29-F687-4F45-9708-019B960494DF}">
+              <a14:hiddenLine xmlns:a14="http://schemas.microsoft.com/office/drawing/2010/main" w="9525">
+                <a:solidFill>
+                  <a:schemeClr val="tx1"/>
+                </a:solidFill>
+                <a:miter lim="800000"/>
+                <a:headEnd/>
+                <a:tailEnd/>
+              </a14:hiddenLine>
+            </a:ext>
+            <a:ext uri="{AF507438-7753-43E0-B8FC-AC1667EBCBE1}">
+              <a14:hiddenEffects xmlns:a14="http://schemas.microsoft.com/office/drawing/2010/main">
+                <a:effectLst>
+                  <a:outerShdw dist="35921" dir="2700000" algn="ctr" rotWithShape="0">
+                    <a:schemeClr val="bg2"/>
+                  </a:outerShdw>
+                </a:effectLst>
+              </a14:hiddenEffects>
+            </a:ext>
+          </a:extLst>
+        </p:spPr>
+      </p:pic>
       <p:sp>
         <p:nvSpPr>
-          <p:cNvPr id="3" name="Content Placeholder 2"/>
+          <p:cNvPr id="5" name="Content Placeholder 2"/>
           <p:cNvSpPr>
             <a:spLocks noGrp="1"/>
           </p:cNvSpPr>
@@ -30663,64 +30723,139 @@
             <p:ph idx="1"/>
           </p:nvPr>
         </p:nvSpPr>
-        <p:spPr/>
+        <p:spPr>
+          <a:xfrm>
+            <a:off x="1181754" y="1940206"/>
+            <a:ext cx="4291200" cy="3541714"/>
+          </a:xfrm>
+        </p:spPr>
         <p:txBody>
-          <a:bodyPr/>
+          <a:bodyPr>
+            <a:noAutofit/>
+          </a:bodyPr>
           <a:lstStyle/>
           <a:p>
             <a:r>
-              <a:rPr lang="en-US" dirty="0" smtClean="0"/>
+              <a:rPr lang="en-US" sz="2800" dirty="0" smtClean="0"/>
               <a:t>TREE.CROSS_OVER</a:t>
             </a:r>
-            <a:endParaRPr lang="en-US" dirty="0" smtClean="0"/>
-          </a:p>
-          <a:p>
-            <a:pPr lvl="1"/>
-            <a:r>
-              <a:rPr lang="en-US" dirty="0"/>
-              <a:t>Self-Configuring Genetic Programming Algorithm with Modified Uniform Crossover (2012</a:t>
-            </a:r>
-            <a:r>
-              <a:rPr lang="en-US" dirty="0" smtClean="0"/>
-              <a:t>) [this reference needs to be done properly]</a:t>
-            </a:r>
-            <a:endParaRPr lang="en-US" dirty="0"/>
           </a:p>
           <a:p>
             <a:pPr lvl="1"/>
             <a:r>
               <a:rPr lang="en-US" dirty="0" smtClean="0"/>
-              <a:t>Swap corresponding interior node of one tree with that of another tree</a:t>
+              <a:t>Swap </a:t>
+            </a:r>
+            <a:r>
+              <a:rPr lang="en-US" dirty="0" smtClean="0"/>
+              <a:t>corresponding interior node of one tree with that of another tree</a:t>
             </a:r>
           </a:p>
           <a:p>
             <a:r>
-              <a:rPr lang="en-US" dirty="0" smtClean="0"/>
+              <a:rPr lang="en-US" sz="2800" dirty="0" smtClean="0"/>
               <a:t>TREE.MUTATION</a:t>
             </a:r>
-            <a:endParaRPr lang="en-US" dirty="0" smtClean="0"/>
           </a:p>
           <a:p>
             <a:pPr lvl="1"/>
             <a:r>
               <a:rPr lang="en-US" dirty="0" smtClean="0"/>
-              <a:t>Mutate interior nodes of the tree, either by replacing a node with a child node or by replacing the node with a different type</a:t>
+              <a:t>Mutate </a:t>
             </a:r>
-          </a:p>
-          <a:p>
-            <a:pPr lvl="2"/>
             <a:r>
               <a:rPr lang="en-US" dirty="0" smtClean="0"/>
-              <a:t>Ex. change a subtraction node to an addition node</a:t>
+              <a:t>leaf nodes and parents of leaf nodes of </a:t>
             </a:r>
-            <a:endParaRPr lang="en-US" dirty="0"/>
+            <a:r>
+              <a:rPr lang="en-US" dirty="0" smtClean="0"/>
+              <a:t>the tree, either by replacing a node with a child node or by replacing the node with a different </a:t>
+            </a:r>
+            <a:r>
+              <a:rPr lang="en-US" dirty="0" smtClean="0"/>
+              <a:t>type.</a:t>
+            </a:r>
+            <a:endParaRPr lang="en-US" sz="1800" dirty="0"/>
+          </a:p>
+        </p:txBody>
+      </p:sp>
+      <p:sp>
+        <p:nvSpPr>
+          <p:cNvPr id="4" name="TextBox 3"/>
+          <p:cNvSpPr txBox="1"/>
+          <p:nvPr/>
+        </p:nvSpPr>
+        <p:spPr>
+          <a:xfrm>
+            <a:off x="5567083" y="6202478"/>
+            <a:ext cx="5957046" cy="600164"/>
+          </a:xfrm>
+          <a:prstGeom prst="rect">
+            <a:avLst/>
+          </a:prstGeom>
+          <a:noFill/>
+        </p:spPr>
+        <p:txBody>
+          <a:bodyPr wrap="square" rtlCol="0">
+            <a:spAutoFit/>
+          </a:bodyPr>
+          <a:lstStyle/>
+          <a:p>
+            <a:r>
+              <a:rPr lang="en-US" sz="1100" dirty="0" err="1"/>
+              <a:t>Poli</a:t>
+            </a:r>
+            <a:r>
+              <a:rPr lang="en-US" sz="1100" dirty="0"/>
+              <a:t> R., Langdon W.B. On the search properties of different crossover </a:t>
+            </a:r>
+            <a:r>
+              <a:rPr lang="en-US" sz="1100" dirty="0" smtClean="0"/>
+              <a:t>operators </a:t>
+            </a:r>
+            <a:r>
+              <a:rPr lang="en-US" sz="1100" dirty="0"/>
+              <a:t>in genetic programming. In J. R. </a:t>
+            </a:r>
+            <a:r>
+              <a:rPr lang="en-US" sz="1100" dirty="0" err="1"/>
+              <a:t>Koza</a:t>
+            </a:r>
+            <a:r>
+              <a:rPr lang="en-US" sz="1100" dirty="0"/>
+              <a:t>, et al., editors, Genetic </a:t>
+            </a:r>
+            <a:r>
+              <a:rPr lang="en-US" sz="1100" dirty="0" smtClean="0"/>
+              <a:t>Programming </a:t>
+            </a:r>
+            <a:r>
+              <a:rPr lang="en-US" sz="1100" dirty="0"/>
+              <a:t>1998:Proceedings of the Third Annual Conference, pages </a:t>
+            </a:r>
+            <a:r>
+              <a:rPr lang="en-US" sz="1100" dirty="0" smtClean="0"/>
+              <a:t>293-301</a:t>
+            </a:r>
+            <a:r>
+              <a:rPr lang="en-US" sz="1100" dirty="0"/>
+              <a:t>, University of Wisconsin, Madison, Wisconsin, USA, 22-25 </a:t>
+            </a:r>
+            <a:r>
+              <a:rPr lang="en-US" sz="1100" dirty="0" smtClean="0"/>
+              <a:t> </a:t>
+            </a:r>
+            <a:r>
+              <a:rPr lang="en-US" sz="1100" dirty="0"/>
+              <a:t>July 1998.</a:t>
+            </a:r>
           </a:p>
         </p:txBody>
       </p:sp>
     </p:spTree>
     <p:extLst>
       <p:ext uri="{BB962C8B-B14F-4D97-AF65-F5344CB8AC3E}">
-        <p14:creationId xmlns:p14="http://schemas.microsoft.com/office/powerpoint/2010/main" val="2643893412"/>
+        <p14:creationId xmlns:p14="http://schemas.microsoft.com/office/powerpoint/2010/main" val="1581083013"/>
       </p:ext>
     </p:extLst>
   </p:cSld>
@@ -30763,8 +30898,8 @@
           <a:lstStyle/>
           <a:p>
             <a:r>
-              <a:rPr lang="en-US" dirty="0" err="1"/>
-              <a:t>tree.cross_over</a:t>
+              <a:rPr lang="en-US" dirty="0" smtClean="0"/>
+              <a:t>Method 2 - Linear Transformations</a:t>
             </a:r>
             <a:endParaRPr lang="en-US" dirty="0"/>
           </a:p>
@@ -30785,6 +30920,40 @@
           <a:bodyPr/>
           <a:lstStyle/>
           <a:p>
+            <a:r>
+              <a:rPr lang="en-US" dirty="0" smtClean="0"/>
+              <a:t>VECTOR.MUTATION</a:t>
+            </a:r>
+          </a:p>
+          <a:p>
+            <a:pPr lvl="1"/>
+            <a:r>
+              <a:rPr lang="en-US" dirty="0" smtClean="0"/>
+              <a:t>Change the coefficient of a given attribute by some small amount</a:t>
+            </a:r>
+          </a:p>
+          <a:p>
+            <a:pPr lvl="1"/>
+            <a:r>
+              <a:rPr lang="en-US" dirty="0" smtClean="0"/>
+              <a:t>Allows for finer tuning and changes</a:t>
+            </a:r>
+          </a:p>
+          <a:p>
+            <a:r>
+              <a:rPr lang="en-US" dirty="0" smtClean="0"/>
+              <a:t>VECTOR.CROSS_OVER</a:t>
+            </a:r>
+          </a:p>
+          <a:p>
+            <a:pPr lvl="1"/>
+            <a:r>
+              <a:rPr lang="en-US" dirty="0" smtClean="0"/>
+              <a:t>Find the average of a coefficient given a shared modifier</a:t>
+            </a:r>
+          </a:p>
+          <a:p>
+            <a:pPr lvl="1"/>
             <a:endParaRPr lang="en-US" dirty="0"/>
           </a:p>
         </p:txBody>
@@ -30792,7 +30961,7 @@
     </p:spTree>
     <p:extLst>
       <p:ext uri="{BB962C8B-B14F-4D97-AF65-F5344CB8AC3E}">
-        <p14:creationId xmlns:p14="http://schemas.microsoft.com/office/powerpoint/2010/main" val="1581083013"/>
+        <p14:creationId xmlns:p14="http://schemas.microsoft.com/office/powerpoint/2010/main" val="2480964042"/>
       </p:ext>
     </p:extLst>
   </p:cSld>
@@ -30835,8 +31004,8 @@
           <a:lstStyle/>
           <a:p>
             <a:r>
-              <a:rPr lang="en-US" dirty="0" err="1"/>
-              <a:t>tree.mutation</a:t>
+              <a:rPr lang="en-US" dirty="0" smtClean="0"/>
+              <a:t>Final Discussion</a:t>
             </a:r>
             <a:endParaRPr lang="en-US" dirty="0"/>
           </a:p>
@@ -30844,7 +31013,7 @@
       </p:sp>
       <p:sp>
         <p:nvSpPr>
-          <p:cNvPr id="4" name="Content Placeholder 2"/>
+          <p:cNvPr id="3" name="Content Placeholder 2"/>
           <p:cNvSpPr>
             <a:spLocks noGrp="1"/>
           </p:cNvSpPr>
@@ -30864,7 +31033,7 @@
     </p:spTree>
     <p:extLst>
       <p:ext uri="{BB962C8B-B14F-4D97-AF65-F5344CB8AC3E}">
-        <p14:creationId xmlns:p14="http://schemas.microsoft.com/office/powerpoint/2010/main" val="1373048693"/>
+        <p14:creationId xmlns:p14="http://schemas.microsoft.com/office/powerpoint/2010/main" val="4289662780"/>
       </p:ext>
     </p:extLst>
   </p:cSld>
@@ -30917,7 +31086,7 @@
     </a:clrScheme>
     <a:fontScheme name="Circuit">
       <a:majorFont>
-        <a:latin typeface="Tw Cen MT" panose="020B0602020104020603"/>
+        <a:latin typeface="Tw Cen MT"/>
         <a:ea typeface=""/>
         <a:cs typeface=""/>
         <a:font script="Jpan" typeface="ＭＳ Ｐゴシック"/>
@@ -30952,7 +31121,7 @@
         <a:font script="Geor" typeface="Sylfaen"/>
       </a:majorFont>
       <a:minorFont>
-        <a:latin typeface="Tw Cen MT" panose="020B0602020104020603"/>
+        <a:latin typeface="Tw Cen MT"/>
         <a:ea typeface=""/>
         <a:cs typeface=""/>
         <a:font script="Jpan" typeface="ＭＳ Ｐゴシック"/>
@@ -31119,7 +31288,7 @@
   <a:extraClrSchemeLst/>
   <a:extLst>
     <a:ext uri="{05A4C25C-085E-4340-85A3-A5531E510DB2}">
-      <thm15:themeFamily xmlns:thm15="http://schemas.microsoft.com/office/thememl/2012/main" name="Circuit" id="{0AC2F7E7-15F5-431C-B2A2-456FE929F56C}" vid="{142578CA-DEC9-49C3-80AF-C113973CC9A9}"/>
+      <thm15:themeFamily xmlns:thm15="http://schemas.microsoft.com/office/thememl/2012/main" xmlns="" name="Circuit" id="{0AC2F7E7-15F5-431C-B2A2-456FE929F56C}" vid="{142578CA-DEC9-49C3-80AF-C113973CC9A9}"/>
     </a:ext>
   </a:extLst>
 </a:theme>

</xml_diff>

<commit_message>
updates to PP, changed to use CONFIG in project
</commit_message>
<xml_diff>
--- a/presentation/Attribute Learning System Presentation.pptx
+++ b/presentation/Attribute Learning System Presentation.pptx
@@ -118,7 +118,18 @@
   </p:defaultTextStyle>
   <p:extLst>
     <p:ext uri="{EFAFB233-063F-42B5-8137-9DF3F51BA10A}">
-      <p15:sldGuideLst xmlns:p15="http://schemas.microsoft.com/office/powerpoint/2012/main" xmlns=""/>
+      <p15:sldGuideLst xmlns:p15="http://schemas.microsoft.com/office/powerpoint/2012/main">
+        <p15:guide id="1" orient="horz" pos="2160">
+          <p15:clr>
+            <a:srgbClr val="A4A3A4"/>
+          </p15:clr>
+        </p15:guide>
+        <p15:guide id="2" pos="3840">
+          <p15:clr>
+            <a:srgbClr val="A4A3A4"/>
+          </p15:clr>
+        </p15:guide>
+      </p15:sldGuideLst>
     </p:ext>
   </p:extLst>
 </p:presentation>
@@ -3881,10 +3892,18 @@
         <a:lstStyle/>
         <a:p>
           <a:r>
-            <a:rPr lang="en-US" sz="2800" dirty="0" smtClean="0"/>
+            <a:rPr lang="en-US" sz="2800" dirty="0" smtClean="0">
+              <a:solidFill>
+                <a:schemeClr val="bg1"/>
+              </a:solidFill>
+            </a:rPr>
             <a:t>Time</a:t>
           </a:r>
-          <a:endParaRPr lang="en-US" sz="2800" dirty="0"/>
+          <a:endParaRPr lang="en-US" sz="2800" dirty="0">
+            <a:solidFill>
+              <a:schemeClr val="bg1"/>
+            </a:solidFill>
+          </a:endParaRPr>
         </a:p>
       </dgm:t>
     </dgm:pt>
@@ -3918,10 +3937,18 @@
         <a:lstStyle/>
         <a:p>
           <a:r>
-            <a:rPr lang="en-US" dirty="0" smtClean="0"/>
+            <a:rPr lang="en-US" dirty="0" smtClean="0">
+              <a:solidFill>
+                <a:schemeClr val="bg1"/>
+              </a:solidFill>
+            </a:rPr>
             <a:t>Inefficiency</a:t>
           </a:r>
-          <a:endParaRPr lang="en-US" dirty="0"/>
+          <a:endParaRPr lang="en-US" dirty="0">
+            <a:solidFill>
+              <a:schemeClr val="bg1"/>
+            </a:solidFill>
+          </a:endParaRPr>
         </a:p>
       </dgm:t>
     </dgm:pt>
@@ -3955,10 +3982,18 @@
         <a:lstStyle/>
         <a:p>
           <a:r>
-            <a:rPr lang="en-US" sz="2800" dirty="0" smtClean="0"/>
+            <a:rPr lang="en-US" sz="2800" dirty="0" smtClean="0">
+              <a:solidFill>
+                <a:schemeClr val="bg1"/>
+              </a:solidFill>
+            </a:rPr>
             <a:t>Tricky</a:t>
           </a:r>
-          <a:endParaRPr lang="en-US" sz="2800" dirty="0"/>
+          <a:endParaRPr lang="en-US" sz="2800" dirty="0">
+            <a:solidFill>
+              <a:schemeClr val="bg1"/>
+            </a:solidFill>
+          </a:endParaRPr>
         </a:p>
       </dgm:t>
     </dgm:pt>
@@ -4246,10 +4281,18 @@
         <a:lstStyle/>
         <a:p>
           <a:r>
-            <a:rPr lang="en-US" dirty="0" smtClean="0"/>
+            <a:rPr lang="en-US" dirty="0" smtClean="0">
+              <a:solidFill>
+                <a:schemeClr val="bg1"/>
+              </a:solidFill>
+            </a:rPr>
             <a:t>Modifiers</a:t>
           </a:r>
-          <a:endParaRPr lang="en-US" dirty="0"/>
+          <a:endParaRPr lang="en-US" dirty="0">
+            <a:solidFill>
+              <a:schemeClr val="bg1"/>
+            </a:solidFill>
+          </a:endParaRPr>
         </a:p>
       </dgm:t>
     </dgm:pt>
@@ -4685,10 +4728,18 @@
         <a:lstStyle/>
         <a:p>
           <a:r>
-            <a:rPr lang="en-US" dirty="0" smtClean="0"/>
+            <a:rPr lang="en-US" dirty="0" smtClean="0">
+              <a:solidFill>
+                <a:schemeClr val="bg1"/>
+              </a:solidFill>
+            </a:rPr>
             <a:t>Battle Victory</a:t>
           </a:r>
-          <a:endParaRPr lang="en-US" dirty="0"/>
+          <a:endParaRPr lang="en-US" dirty="0">
+            <a:solidFill>
+              <a:schemeClr val="bg1"/>
+            </a:solidFill>
+          </a:endParaRPr>
         </a:p>
       </dgm:t>
     </dgm:pt>
@@ -4722,10 +4773,18 @@
         <a:lstStyle/>
         <a:p>
           <a:r>
-            <a:rPr lang="en-US" dirty="0" smtClean="0"/>
+            <a:rPr lang="en-US" dirty="0" smtClean="0">
+              <a:solidFill>
+                <a:schemeClr val="bg1"/>
+              </a:solidFill>
+            </a:rPr>
             <a:t>Move Usage</a:t>
           </a:r>
-          <a:endParaRPr lang="en-US" dirty="0"/>
+          <a:endParaRPr lang="en-US" dirty="0">
+            <a:solidFill>
+              <a:schemeClr val="bg1"/>
+            </a:solidFill>
+          </a:endParaRPr>
         </a:p>
       </dgm:t>
     </dgm:pt>
@@ -4759,10 +4818,18 @@
         <a:lstStyle/>
         <a:p>
           <a:r>
-            <a:rPr lang="en-US" dirty="0" smtClean="0"/>
+            <a:rPr lang="en-US" dirty="0" smtClean="0">
+              <a:solidFill>
+                <a:schemeClr val="bg1"/>
+              </a:solidFill>
+            </a:rPr>
             <a:t>Move Utility</a:t>
           </a:r>
-          <a:endParaRPr lang="en-US" dirty="0"/>
+          <a:endParaRPr lang="en-US" dirty="0">
+            <a:solidFill>
+              <a:schemeClr val="bg1"/>
+            </a:solidFill>
+          </a:endParaRPr>
         </a:p>
       </dgm:t>
     </dgm:pt>
@@ -4926,10 +4993,18 @@
         <a:lstStyle/>
         <a:p>
           <a:r>
-            <a:rPr lang="en-US" dirty="0" smtClean="0"/>
+            <a:rPr lang="en-US" dirty="0" smtClean="0">
+              <a:solidFill>
+                <a:schemeClr val="bg1"/>
+              </a:solidFill>
+            </a:rPr>
             <a:t>Mutations</a:t>
           </a:r>
-          <a:endParaRPr lang="en-US" dirty="0"/>
+          <a:endParaRPr lang="en-US" dirty="0">
+            <a:solidFill>
+              <a:schemeClr val="bg1"/>
+            </a:solidFill>
+          </a:endParaRPr>
         </a:p>
       </dgm:t>
     </dgm:pt>
@@ -4963,10 +5038,18 @@
         <a:lstStyle/>
         <a:p>
           <a:r>
-            <a:rPr lang="en-US" dirty="0" smtClean="0"/>
+            <a:rPr lang="en-US" dirty="0" smtClean="0">
+              <a:solidFill>
+                <a:schemeClr val="bg1"/>
+              </a:solidFill>
+            </a:rPr>
             <a:t>Crossovers</a:t>
           </a:r>
-          <a:endParaRPr lang="en-US" dirty="0"/>
+          <a:endParaRPr lang="en-US" dirty="0">
+            <a:solidFill>
+              <a:schemeClr val="bg1"/>
+            </a:solidFill>
+          </a:endParaRPr>
         </a:p>
       </dgm:t>
     </dgm:pt>
@@ -5000,10 +5083,18 @@
         <a:lstStyle/>
         <a:p>
           <a:r>
-            <a:rPr lang="en-US" dirty="0" smtClean="0"/>
+            <a:rPr lang="en-US" dirty="0" smtClean="0">
+              <a:solidFill>
+                <a:schemeClr val="bg1"/>
+              </a:solidFill>
+            </a:rPr>
             <a:t>Genetic Algorithm</a:t>
           </a:r>
-          <a:endParaRPr lang="en-US" dirty="0"/>
+          <a:endParaRPr lang="en-US" dirty="0">
+            <a:solidFill>
+              <a:schemeClr val="bg1"/>
+            </a:solidFill>
+          </a:endParaRPr>
         </a:p>
       </dgm:t>
     </dgm:pt>
@@ -5219,10 +5310,18 @@
         <a:lstStyle/>
         <a:p>
           <a:r>
-            <a:rPr lang="en-US" dirty="0" smtClean="0"/>
+            <a:rPr lang="en-US" dirty="0" smtClean="0">
+              <a:solidFill>
+                <a:schemeClr val="bg1"/>
+              </a:solidFill>
+            </a:rPr>
             <a:t>Trees</a:t>
           </a:r>
-          <a:endParaRPr lang="en-US" dirty="0"/>
+          <a:endParaRPr lang="en-US" dirty="0">
+            <a:solidFill>
+              <a:schemeClr val="bg1"/>
+            </a:solidFill>
+          </a:endParaRPr>
         </a:p>
       </dgm:t>
     </dgm:pt>
@@ -5293,10 +5392,18 @@
         <a:lstStyle/>
         <a:p>
           <a:r>
-            <a:rPr lang="en-US" dirty="0" smtClean="0"/>
+            <a:rPr lang="en-US" dirty="0" smtClean="0">
+              <a:solidFill>
+                <a:schemeClr val="bg1"/>
+              </a:solidFill>
+            </a:rPr>
             <a:t>Vectors</a:t>
           </a:r>
-          <a:endParaRPr lang="en-US" dirty="0"/>
+          <a:endParaRPr lang="en-US" dirty="0">
+            <a:solidFill>
+              <a:schemeClr val="bg1"/>
+            </a:solidFill>
+          </a:endParaRPr>
         </a:p>
       </dgm:t>
     </dgm:pt>
@@ -5539,10 +5646,18 @@
             </a:spcAft>
           </a:pPr>
           <a:r>
-            <a:rPr lang="en-US" sz="2800" kern="1200" dirty="0" smtClean="0"/>
+            <a:rPr lang="en-US" sz="2800" kern="1200" dirty="0" smtClean="0">
+              <a:solidFill>
+                <a:schemeClr val="bg1"/>
+              </a:solidFill>
+            </a:rPr>
             <a:t>Time</a:t>
           </a:r>
-          <a:endParaRPr lang="en-US" sz="2800" kern="1200" dirty="0"/>
+          <a:endParaRPr lang="en-US" sz="2800" kern="1200" dirty="0">
+            <a:solidFill>
+              <a:schemeClr val="bg1"/>
+            </a:solidFill>
+          </a:endParaRPr>
         </a:p>
       </dsp:txBody>
       <dsp:txXfrm rot="-5400000">
@@ -5727,10 +5842,18 @@
             </a:spcAft>
           </a:pPr>
           <a:r>
-            <a:rPr lang="en-US" sz="2400" kern="1200" dirty="0" smtClean="0"/>
+            <a:rPr lang="en-US" sz="2400" kern="1200" dirty="0" smtClean="0">
+              <a:solidFill>
+                <a:schemeClr val="bg1"/>
+              </a:solidFill>
+            </a:rPr>
             <a:t>Inefficiency</a:t>
           </a:r>
-          <a:endParaRPr lang="en-US" sz="2400" kern="1200" dirty="0"/>
+          <a:endParaRPr lang="en-US" sz="2400" kern="1200" dirty="0">
+            <a:solidFill>
+              <a:schemeClr val="bg1"/>
+            </a:solidFill>
+          </a:endParaRPr>
         </a:p>
       </dsp:txBody>
       <dsp:txXfrm rot="-5400000">
@@ -5915,10 +6038,18 @@
             </a:spcAft>
           </a:pPr>
           <a:r>
-            <a:rPr lang="en-US" sz="2800" kern="1200" dirty="0" smtClean="0"/>
+            <a:rPr lang="en-US" sz="2800" kern="1200" dirty="0" smtClean="0">
+              <a:solidFill>
+                <a:schemeClr val="bg1"/>
+              </a:solidFill>
+            </a:rPr>
             <a:t>Tricky</a:t>
           </a:r>
-          <a:endParaRPr lang="en-US" sz="2800" kern="1200" dirty="0"/>
+          <a:endParaRPr lang="en-US" sz="2800" kern="1200" dirty="0">
+            <a:solidFill>
+              <a:schemeClr val="bg1"/>
+            </a:solidFill>
+          </a:endParaRPr>
         </a:p>
       </dsp:txBody>
       <dsp:txXfrm rot="-5400000">
@@ -6602,10 +6733,18 @@
             </a:spcAft>
           </a:pPr>
           <a:r>
-            <a:rPr lang="en-US" sz="3000" kern="1200" dirty="0" smtClean="0"/>
+            <a:rPr lang="en-US" sz="3000" kern="1200" dirty="0" smtClean="0">
+              <a:solidFill>
+                <a:schemeClr val="bg1"/>
+              </a:solidFill>
+            </a:rPr>
             <a:t>Modifiers</a:t>
           </a:r>
-          <a:endParaRPr lang="en-US" sz="3000" kern="1200" dirty="0"/>
+          <a:endParaRPr lang="en-US" sz="3000" kern="1200" dirty="0">
+            <a:solidFill>
+              <a:schemeClr val="bg1"/>
+            </a:solidFill>
+          </a:endParaRPr>
         </a:p>
       </dsp:txBody>
       <dsp:txXfrm>
@@ -7851,10 +7990,18 @@
             </a:spcAft>
           </a:pPr>
           <a:r>
-            <a:rPr lang="en-US" sz="4000" kern="1200" dirty="0" smtClean="0"/>
+            <a:rPr lang="en-US" sz="4000" kern="1200" dirty="0" smtClean="0">
+              <a:solidFill>
+                <a:schemeClr val="bg1"/>
+              </a:solidFill>
+            </a:rPr>
             <a:t>Battle Victory</a:t>
           </a:r>
-          <a:endParaRPr lang="en-US" sz="4000" kern="1200" dirty="0"/>
+          <a:endParaRPr lang="en-US" sz="4000" kern="1200" dirty="0">
+            <a:solidFill>
+              <a:schemeClr val="bg1"/>
+            </a:solidFill>
+          </a:endParaRPr>
         </a:p>
       </dsp:txBody>
       <dsp:txXfrm>
@@ -7994,10 +8141,18 @@
             </a:spcAft>
           </a:pPr>
           <a:r>
-            <a:rPr lang="en-US" sz="4000" kern="1200" dirty="0" smtClean="0"/>
+            <a:rPr lang="en-US" sz="4000" kern="1200" dirty="0" smtClean="0">
+              <a:solidFill>
+                <a:schemeClr val="bg1"/>
+              </a:solidFill>
+            </a:rPr>
             <a:t>Move Usage</a:t>
           </a:r>
-          <a:endParaRPr lang="en-US" sz="4000" kern="1200" dirty="0"/>
+          <a:endParaRPr lang="en-US" sz="4000" kern="1200" dirty="0">
+            <a:solidFill>
+              <a:schemeClr val="bg1"/>
+            </a:solidFill>
+          </a:endParaRPr>
         </a:p>
       </dsp:txBody>
       <dsp:txXfrm>
@@ -8137,10 +8292,18 @@
             </a:spcAft>
           </a:pPr>
           <a:r>
-            <a:rPr lang="en-US" sz="4000" kern="1200" dirty="0" smtClean="0"/>
+            <a:rPr lang="en-US" sz="4000" kern="1200" dirty="0" smtClean="0">
+              <a:solidFill>
+                <a:schemeClr val="bg1"/>
+              </a:solidFill>
+            </a:rPr>
             <a:t>Move Utility</a:t>
           </a:r>
-          <a:endParaRPr lang="en-US" sz="4000" kern="1200" dirty="0"/>
+          <a:endParaRPr lang="en-US" sz="4000" kern="1200" dirty="0">
+            <a:solidFill>
+              <a:schemeClr val="bg1"/>
+            </a:solidFill>
+          </a:endParaRPr>
         </a:p>
       </dsp:txBody>
       <dsp:txXfrm>
@@ -8226,10 +8389,18 @@
             </a:spcAft>
           </a:pPr>
           <a:r>
-            <a:rPr lang="en-US" sz="1600" kern="1200" dirty="0" smtClean="0"/>
+            <a:rPr lang="en-US" sz="1600" kern="1200" dirty="0" smtClean="0">
+              <a:solidFill>
+                <a:schemeClr val="bg1"/>
+              </a:solidFill>
+            </a:rPr>
             <a:t>Mutations</a:t>
           </a:r>
-          <a:endParaRPr lang="en-US" sz="1600" kern="1200" dirty="0"/>
+          <a:endParaRPr lang="en-US" sz="1600" kern="1200" dirty="0">
+            <a:solidFill>
+              <a:schemeClr val="bg1"/>
+            </a:solidFill>
+          </a:endParaRPr>
         </a:p>
       </dsp:txBody>
       <dsp:txXfrm>
@@ -8369,10 +8540,18 @@
             </a:spcAft>
           </a:pPr>
           <a:r>
-            <a:rPr lang="en-US" sz="1600" kern="1200" dirty="0" smtClean="0"/>
+            <a:rPr lang="en-US" sz="1600" kern="1200" dirty="0" smtClean="0">
+              <a:solidFill>
+                <a:schemeClr val="bg1"/>
+              </a:solidFill>
+            </a:rPr>
             <a:t>Crossovers</a:t>
           </a:r>
-          <a:endParaRPr lang="en-US" sz="1600" kern="1200" dirty="0"/>
+          <a:endParaRPr lang="en-US" sz="1600" kern="1200" dirty="0">
+            <a:solidFill>
+              <a:schemeClr val="bg1"/>
+            </a:solidFill>
+          </a:endParaRPr>
         </a:p>
       </dsp:txBody>
       <dsp:txXfrm>
@@ -8515,10 +8694,18 @@
             </a:spcAft>
           </a:pPr>
           <a:r>
-            <a:rPr lang="en-US" sz="3500" kern="1200" dirty="0" smtClean="0"/>
+            <a:rPr lang="en-US" sz="3500" kern="1200" dirty="0" smtClean="0">
+              <a:solidFill>
+                <a:schemeClr val="bg1"/>
+              </a:solidFill>
+            </a:rPr>
             <a:t>Genetic Algorithm</a:t>
           </a:r>
-          <a:endParaRPr lang="en-US" sz="3500" kern="1200" dirty="0"/>
+          <a:endParaRPr lang="en-US" sz="3500" kern="1200" dirty="0">
+            <a:solidFill>
+              <a:schemeClr val="bg1"/>
+            </a:solidFill>
+          </a:endParaRPr>
         </a:p>
       </dsp:txBody>
       <dsp:txXfrm>
@@ -8709,10 +8896,18 @@
             <a:buChar char="••"/>
           </a:pPr>
           <a:r>
-            <a:rPr lang="en-US" sz="4200" kern="1200" dirty="0" smtClean="0"/>
+            <a:rPr lang="en-US" sz="4200" kern="1200" dirty="0" smtClean="0">
+              <a:solidFill>
+                <a:schemeClr val="bg1"/>
+              </a:solidFill>
+            </a:rPr>
             <a:t>Trees</a:t>
           </a:r>
-          <a:endParaRPr lang="en-US" sz="4200" kern="1200" dirty="0"/>
+          <a:endParaRPr lang="en-US" sz="4200" kern="1200" dirty="0">
+            <a:solidFill>
+              <a:schemeClr val="bg1"/>
+            </a:solidFill>
+          </a:endParaRPr>
         </a:p>
       </dsp:txBody>
       <dsp:txXfrm>
@@ -8891,10 +9086,18 @@
             <a:buChar char="••"/>
           </a:pPr>
           <a:r>
-            <a:rPr lang="en-US" sz="4200" kern="1200" dirty="0" smtClean="0"/>
+            <a:rPr lang="en-US" sz="4200" kern="1200" dirty="0" smtClean="0">
+              <a:solidFill>
+                <a:schemeClr val="bg1"/>
+              </a:solidFill>
+            </a:rPr>
             <a:t>Vectors</a:t>
           </a:r>
-          <a:endParaRPr lang="en-US" sz="4200" kern="1200" dirty="0"/>
+          <a:endParaRPr lang="en-US" sz="4200" kern="1200" dirty="0">
+            <a:solidFill>
+              <a:schemeClr val="bg1"/>
+            </a:solidFill>
+          </a:endParaRPr>
         </a:p>
       </dsp:txBody>
       <dsp:txXfrm>
@@ -30248,7 +30451,7 @@
           <p:nvPr>
             <p:extLst>
               <p:ext uri="{D42A27DB-BD31-4B8C-83A1-F6EECF244321}">
-                <p14:modId xmlns:p14="http://schemas.microsoft.com/office/powerpoint/2010/main" val="3378251358"/>
+                <p14:modId xmlns:p14="http://schemas.microsoft.com/office/powerpoint/2010/main" val="2757381018"/>
               </p:ext>
             </p:extLst>
           </p:nvPr>
@@ -30325,7 +30528,7 @@
             <p:ph idx="1"/>
             <p:extLst>
               <p:ext uri="{D42A27DB-BD31-4B8C-83A1-F6EECF244321}">
-                <p14:modId xmlns:p14="http://schemas.microsoft.com/office/powerpoint/2010/main" val="175571412"/>
+                <p14:modId xmlns:p14="http://schemas.microsoft.com/office/powerpoint/2010/main" val="460731697"/>
               </p:ext>
             </p:extLst>
           </p:nvPr>
@@ -30403,7 +30606,7 @@
             <p:ph idx="1"/>
             <p:extLst>
               <p:ext uri="{D42A27DB-BD31-4B8C-83A1-F6EECF244321}">
-                <p14:modId xmlns:p14="http://schemas.microsoft.com/office/powerpoint/2010/main" val="3238999372"/>
+                <p14:modId xmlns:p14="http://schemas.microsoft.com/office/powerpoint/2010/main" val="2643862122"/>
               </p:ext>
             </p:extLst>
           </p:nvPr>
@@ -30486,7 +30689,7 @@
             <p:ph idx="1"/>
             <p:extLst>
               <p:ext uri="{D42A27DB-BD31-4B8C-83A1-F6EECF244321}">
-                <p14:modId xmlns:p14="http://schemas.microsoft.com/office/powerpoint/2010/main" val="3918734992"/>
+                <p14:modId xmlns:p14="http://schemas.microsoft.com/office/powerpoint/2010/main" val="2114145527"/>
               </p:ext>
             </p:extLst>
           </p:nvPr>
@@ -30564,7 +30767,7 @@
             <p:ph idx="1"/>
             <p:extLst>
               <p:ext uri="{D42A27DB-BD31-4B8C-83A1-F6EECF244321}">
-                <p14:modId xmlns:p14="http://schemas.microsoft.com/office/powerpoint/2010/main" val="4040978944"/>
+                <p14:modId xmlns:p14="http://schemas.microsoft.com/office/powerpoint/2010/main" val="118759689"/>
               </p:ext>
             </p:extLst>
           </p:nvPr>
@@ -30701,15 +30904,6 @@
                 <a:tailEnd/>
               </a14:hiddenLine>
             </a:ext>
-            <a:ext uri="{AF507438-7753-43E0-B8FC-AC1667EBCBE1}">
-              <a14:hiddenEffects xmlns:a14="http://schemas.microsoft.com/office/drawing/2010/main">
-                <a:effectLst>
-                  <a:outerShdw dist="35921" dir="2700000" algn="ctr" rotWithShape="0">
-                    <a:schemeClr val="bg2"/>
-                  </a:outerShdw>
-                </a:effectLst>
-              </a14:hiddenEffects>
-            </a:ext>
           </a:extLst>
         </p:spPr>
       </p:pic>
@@ -30744,11 +30938,7 @@
             <a:pPr lvl="1"/>
             <a:r>
               <a:rPr lang="en-US" dirty="0" smtClean="0"/>
-              <a:t>Swap </a:t>
-            </a:r>
-            <a:r>
-              <a:rPr lang="en-US" dirty="0" smtClean="0"/>
-              <a:t>corresponding interior node of one tree with that of another tree</a:t>
+              <a:t>Swap corresponding interior node of one tree with that of another tree</a:t>
             </a:r>
           </a:p>
           <a:p>
@@ -30761,19 +30951,7 @@
             <a:pPr lvl="1"/>
             <a:r>
               <a:rPr lang="en-US" dirty="0" smtClean="0"/>
-              <a:t>Mutate </a:t>
-            </a:r>
-            <a:r>
-              <a:rPr lang="en-US" dirty="0" smtClean="0"/>
-              <a:t>leaf nodes and parents of leaf nodes of </a:t>
-            </a:r>
-            <a:r>
-              <a:rPr lang="en-US" dirty="0" smtClean="0"/>
-              <a:t>the tree, either by replacing a node with a child node or by replacing the node with a different </a:t>
-            </a:r>
-            <a:r>
-              <a:rPr lang="en-US" dirty="0" smtClean="0"/>
-              <a:t>type.</a:t>
+              <a:t>Mutate leaf nodes and parents of leaf nodes of the tree, either by replacing a node with a child node or by replacing the node with a different type.</a:t>
             </a:r>
             <a:endParaRPr lang="en-US" sz="1800" dirty="0"/>
           </a:p>
@@ -31288,7 +31466,7 @@
   <a:extraClrSchemeLst/>
   <a:extLst>
     <a:ext uri="{05A4C25C-085E-4340-85A3-A5531E510DB2}">
-      <thm15:themeFamily xmlns:thm15="http://schemas.microsoft.com/office/thememl/2012/main" xmlns="" name="Circuit" id="{0AC2F7E7-15F5-431C-B2A2-456FE929F56C}" vid="{142578CA-DEC9-49C3-80AF-C113973CC9A9}"/>
+      <thm15:themeFamily xmlns:thm15="http://schemas.microsoft.com/office/thememl/2012/main" name="Circuit" id="{0AC2F7E7-15F5-431C-B2A2-456FE929F56C}" vid="{142578CA-DEC9-49C3-80AF-C113973CC9A9}"/>
     </a:ext>
   </a:extLst>
 </a:theme>

</xml_diff>

<commit_message>
Added genetic operator validation graphs to PP
</commit_message>
<xml_diff>
--- a/presentation/Attribute Learning System Presentation.pptx
+++ b/presentation/Attribute Learning System Presentation.pptx
@@ -13,11 +13,14 @@
     <p:sldId id="268" r:id="rId7"/>
     <p:sldId id="269" r:id="rId8"/>
     <p:sldId id="260" r:id="rId9"/>
-    <p:sldId id="272" r:id="rId10"/>
-    <p:sldId id="264" r:id="rId11"/>
-    <p:sldId id="262" r:id="rId12"/>
-    <p:sldId id="274" r:id="rId13"/>
-    <p:sldId id="270" r:id="rId14"/>
+    <p:sldId id="275" r:id="rId10"/>
+    <p:sldId id="276" r:id="rId11"/>
+    <p:sldId id="272" r:id="rId12"/>
+    <p:sldId id="277" r:id="rId13"/>
+    <p:sldId id="264" r:id="rId14"/>
+    <p:sldId id="262" r:id="rId15"/>
+    <p:sldId id="274" r:id="rId16"/>
+    <p:sldId id="270" r:id="rId17"/>
   </p:sldIdLst>
   <p:sldSz cx="12192000" cy="6858000"/>
   <p:notesSz cx="6858000" cy="9144000"/>
@@ -118,7 +121,7 @@
   </p:defaultTextStyle>
   <p:extLst>
     <p:ext uri="{EFAFB233-063F-42B5-8137-9DF3F51BA10A}">
-      <p15:sldGuideLst xmlns:p15="http://schemas.microsoft.com/office/powerpoint/2012/main" xmlns="">
+      <p15:sldGuideLst xmlns="" xmlns:p15="http://schemas.microsoft.com/office/powerpoint/2012/main">
         <p15:guide id="1" orient="horz" pos="2160">
           <p15:clr>
             <a:srgbClr val="A4A3A4"/>
@@ -7413,6 +7416,13 @@
         </dgm:presLayoutVars>
       </dgm:prSet>
       <dgm:spPr/>
+      <dgm:t>
+        <a:bodyPr/>
+        <a:lstStyle/>
+        <a:p>
+          <a:endParaRPr lang="en-US"/>
+        </a:p>
+      </dgm:t>
     </dgm:pt>
     <dgm:pt modelId="{2A69F853-E734-B645-9FDF-9ED2A73DB8B1}" type="pres">
       <dgm:prSet presAssocID="{5516CD4A-0553-8241-8D91-22873BC8687B}" presName="linNode" presStyleCnt="0"/>
@@ -7465,6 +7475,13 @@
         </dgm:presLayoutVars>
       </dgm:prSet>
       <dgm:spPr/>
+      <dgm:t>
+        <a:bodyPr/>
+        <a:lstStyle/>
+        <a:p>
+          <a:endParaRPr lang="en-US"/>
+        </a:p>
+      </dgm:t>
     </dgm:pt>
     <dgm:pt modelId="{D94893DD-3D19-8349-97BD-573207405177}" type="pres">
       <dgm:prSet presAssocID="{F5124A65-F567-FF4D-B549-B3AE05E5760C}" presName="descendantText" presStyleLbl="alignAccFollowNode1" presStyleIdx="1" presStyleCnt="2">
@@ -7473,20 +7490,27 @@
         </dgm:presLayoutVars>
       </dgm:prSet>
       <dgm:spPr/>
+      <dgm:t>
+        <a:bodyPr/>
+        <a:lstStyle/>
+        <a:p>
+          <a:endParaRPr lang="en-US"/>
+        </a:p>
+      </dgm:t>
     </dgm:pt>
   </dgm:ptLst>
   <dgm:cxnLst>
+    <dgm:cxn modelId="{6473B28C-BA8B-714C-8A32-792F1259440B}" type="presOf" srcId="{B165420C-639D-0B4A-9AA9-4D0DE8CB9309}" destId="{AE402DE7-82CF-3548-9E00-714B9A5BB6F6}" srcOrd="0" destOrd="0" presId="urn:microsoft.com/office/officeart/2005/8/layout/vList5"/>
+    <dgm:cxn modelId="{89859EC3-629B-894A-9AA0-725490E0A82F}" type="presOf" srcId="{72891A80-BFEA-3B48-84B8-3FCAB392053F}" destId="{D94893DD-3D19-8349-97BD-573207405177}" srcOrd="0" destOrd="0" presId="urn:microsoft.com/office/officeart/2005/8/layout/vList5"/>
+    <dgm:cxn modelId="{7D35C443-5B4E-F843-A342-6613A5EDB50C}" type="presOf" srcId="{41D479AB-01FD-124F-A455-2C0E149243EC}" destId="{296305DA-0422-2A46-8EAE-11D5547E45EC}" srcOrd="0" destOrd="0" presId="urn:microsoft.com/office/officeart/2005/8/layout/vList5"/>
+    <dgm:cxn modelId="{780F0E9F-69D3-C94E-B394-9A83C11B5D16}" srcId="{5516CD4A-0553-8241-8D91-22873BC8687B}" destId="{41D479AB-01FD-124F-A455-2C0E149243EC}" srcOrd="0" destOrd="0" parTransId="{CC1A6E72-2EE2-1941-A38B-B2C3884CE78B}" sibTransId="{DED4B428-ABB8-6044-B019-64F7BF22FDAE}"/>
+    <dgm:cxn modelId="{44B1B041-D303-434C-8569-0162816E4705}" srcId="{B165420C-639D-0B4A-9AA9-4D0DE8CB9309}" destId="{5516CD4A-0553-8241-8D91-22873BC8687B}" srcOrd="0" destOrd="0" parTransId="{E65FA12C-B04A-F04C-B28C-3C5A24B36CAD}" sibTransId="{A20DFE15-0B08-BE4A-A143-121F27E6B0E8}"/>
     <dgm:cxn modelId="{0F633A43-BAA1-B143-8F9E-7601D6DF0327}" srcId="{F5124A65-F567-FF4D-B549-B3AE05E5760C}" destId="{72891A80-BFEA-3B48-84B8-3FCAB392053F}" srcOrd="0" destOrd="0" parTransId="{71AF184B-934F-BE41-BA7F-02EB6D5F1C41}" sibTransId="{0402E6F8-5637-C54F-A9E7-40E2C3A813ED}"/>
+    <dgm:cxn modelId="{6BA9EEF6-2291-1845-B711-81F626D88288}" type="presOf" srcId="{14953552-4CF3-7F40-B9D0-529341A22BCE}" destId="{D94893DD-3D19-8349-97BD-573207405177}" srcOrd="0" destOrd="1" presId="urn:microsoft.com/office/officeart/2005/8/layout/vList5"/>
+    <dgm:cxn modelId="{66233F89-DC58-DB4F-AFB1-588DDF9F2068}" type="presOf" srcId="{F5124A65-F567-FF4D-B549-B3AE05E5760C}" destId="{6D5D67CC-8B0C-9D43-948E-7F27FD6D78BE}" srcOrd="0" destOrd="0" presId="urn:microsoft.com/office/officeart/2005/8/layout/vList5"/>
+    <dgm:cxn modelId="{B0B852AE-011A-2548-BF05-B14F69455DEB}" type="presOf" srcId="{5516CD4A-0553-8241-8D91-22873BC8687B}" destId="{E8B0B3FF-3815-0A4B-81B4-8EC25402DE43}" srcOrd="0" destOrd="0" presId="urn:microsoft.com/office/officeart/2005/8/layout/vList5"/>
+    <dgm:cxn modelId="{27902539-05E5-1945-BB87-9D34DD450619}" srcId="{F5124A65-F567-FF4D-B549-B3AE05E5760C}" destId="{14953552-4CF3-7F40-B9D0-529341A22BCE}" srcOrd="1" destOrd="0" parTransId="{80B75601-51CA-884F-8FD5-4955B5BE80E7}" sibTransId="{8F86241B-FE17-F648-8812-54ECAF6AFACE}"/>
     <dgm:cxn modelId="{14581004-AB10-3944-B5E6-6C1D8CBF2348}" srcId="{B165420C-639D-0B4A-9AA9-4D0DE8CB9309}" destId="{F5124A65-F567-FF4D-B549-B3AE05E5760C}" srcOrd="1" destOrd="0" parTransId="{55D159CA-08EC-FD41-B579-B7EF6A71E338}" sibTransId="{14323F9C-40E1-C54A-8E25-98ACAF662E17}"/>
-    <dgm:cxn modelId="{6473B28C-BA8B-714C-8A32-792F1259440B}" type="presOf" srcId="{B165420C-639D-0B4A-9AA9-4D0DE8CB9309}" destId="{AE402DE7-82CF-3548-9E00-714B9A5BB6F6}" srcOrd="0" destOrd="0" presId="urn:microsoft.com/office/officeart/2005/8/layout/vList5"/>
-    <dgm:cxn modelId="{44B1B041-D303-434C-8569-0162816E4705}" srcId="{B165420C-639D-0B4A-9AA9-4D0DE8CB9309}" destId="{5516CD4A-0553-8241-8D91-22873BC8687B}" srcOrd="0" destOrd="0" parTransId="{E65FA12C-B04A-F04C-B28C-3C5A24B36CAD}" sibTransId="{A20DFE15-0B08-BE4A-A143-121F27E6B0E8}"/>
-    <dgm:cxn modelId="{66233F89-DC58-DB4F-AFB1-588DDF9F2068}" type="presOf" srcId="{F5124A65-F567-FF4D-B549-B3AE05E5760C}" destId="{6D5D67CC-8B0C-9D43-948E-7F27FD6D78BE}" srcOrd="0" destOrd="0" presId="urn:microsoft.com/office/officeart/2005/8/layout/vList5"/>
-    <dgm:cxn modelId="{7D35C443-5B4E-F843-A342-6613A5EDB50C}" type="presOf" srcId="{41D479AB-01FD-124F-A455-2C0E149243EC}" destId="{296305DA-0422-2A46-8EAE-11D5547E45EC}" srcOrd="0" destOrd="0" presId="urn:microsoft.com/office/officeart/2005/8/layout/vList5"/>
-    <dgm:cxn modelId="{89859EC3-629B-894A-9AA0-725490E0A82F}" type="presOf" srcId="{72891A80-BFEA-3B48-84B8-3FCAB392053F}" destId="{D94893DD-3D19-8349-97BD-573207405177}" srcOrd="0" destOrd="0" presId="urn:microsoft.com/office/officeart/2005/8/layout/vList5"/>
-    <dgm:cxn modelId="{27902539-05E5-1945-BB87-9D34DD450619}" srcId="{F5124A65-F567-FF4D-B549-B3AE05E5760C}" destId="{14953552-4CF3-7F40-B9D0-529341A22BCE}" srcOrd="1" destOrd="0" parTransId="{80B75601-51CA-884F-8FD5-4955B5BE80E7}" sibTransId="{8F86241B-FE17-F648-8812-54ECAF6AFACE}"/>
-    <dgm:cxn modelId="{780F0E9F-69D3-C94E-B394-9A83C11B5D16}" srcId="{5516CD4A-0553-8241-8D91-22873BC8687B}" destId="{41D479AB-01FD-124F-A455-2C0E149243EC}" srcOrd="0" destOrd="0" parTransId="{CC1A6E72-2EE2-1941-A38B-B2C3884CE78B}" sibTransId="{DED4B428-ABB8-6044-B019-64F7BF22FDAE}"/>
-    <dgm:cxn modelId="{B0B852AE-011A-2548-BF05-B14F69455DEB}" type="presOf" srcId="{5516CD4A-0553-8241-8D91-22873BC8687B}" destId="{E8B0B3FF-3815-0A4B-81B4-8EC25402DE43}" srcOrd="0" destOrd="0" presId="urn:microsoft.com/office/officeart/2005/8/layout/vList5"/>
-    <dgm:cxn modelId="{6BA9EEF6-2291-1845-B711-81F626D88288}" type="presOf" srcId="{14953552-4CF3-7F40-B9D0-529341A22BCE}" destId="{D94893DD-3D19-8349-97BD-573207405177}" srcOrd="0" destOrd="1" presId="urn:microsoft.com/office/officeart/2005/8/layout/vList5"/>
     <dgm:cxn modelId="{7CD1D4FD-8E52-944A-A63C-519D5D2F5E46}" type="presParOf" srcId="{AE402DE7-82CF-3548-9E00-714B9A5BB6F6}" destId="{2A69F853-E734-B645-9FDF-9ED2A73DB8B1}" srcOrd="0" destOrd="0" presId="urn:microsoft.com/office/officeart/2005/8/layout/vList5"/>
     <dgm:cxn modelId="{7C4DB432-711F-624D-A6A6-08A4B70BC643}" type="presParOf" srcId="{2A69F853-E734-B645-9FDF-9ED2A73DB8B1}" destId="{E8B0B3FF-3815-0A4B-81B4-8EC25402DE43}" srcOrd="0" destOrd="0" presId="urn:microsoft.com/office/officeart/2005/8/layout/vList5"/>
     <dgm:cxn modelId="{50692F03-96FC-2A47-9E76-93310E14EFB2}" type="presParOf" srcId="{2A69F853-E734-B645-9FDF-9ED2A73DB8B1}" destId="{296305DA-0422-2A46-8EAE-11D5547E45EC}" srcOrd="1" destOrd="0" presId="urn:microsoft.com/office/officeart/2005/8/layout/vList5"/>
@@ -9881,6 +9905,13 @@
         </dgm:presLayoutVars>
       </dgm:prSet>
       <dgm:spPr/>
+      <dgm:t>
+        <a:bodyPr/>
+        <a:lstStyle/>
+        <a:p>
+          <a:endParaRPr lang="en-US"/>
+        </a:p>
+      </dgm:t>
     </dgm:pt>
     <dgm:pt modelId="{F57962A2-0320-3D4F-B361-F11EAE206643}" type="pres">
       <dgm:prSet presAssocID="{6783BD06-83D4-DB4E-9499-7C43E0AA64C7}" presName="parentText" presStyleLbl="node1" presStyleIdx="0" presStyleCnt="2">
@@ -9890,6 +9921,13 @@
         </dgm:presLayoutVars>
       </dgm:prSet>
       <dgm:spPr/>
+      <dgm:t>
+        <a:bodyPr/>
+        <a:lstStyle/>
+        <a:p>
+          <a:endParaRPr lang="en-US"/>
+        </a:p>
+      </dgm:t>
     </dgm:pt>
     <dgm:pt modelId="{7F072C46-BF5C-E74A-BDBA-A2316FA1CE02}" type="pres">
       <dgm:prSet presAssocID="{6783BD06-83D4-DB4E-9499-7C43E0AA64C7}" presName="childText" presStyleLbl="revTx" presStyleIdx="0" presStyleCnt="2">
@@ -9929,20 +9967,27 @@
         </dgm:presLayoutVars>
       </dgm:prSet>
       <dgm:spPr/>
+      <dgm:t>
+        <a:bodyPr/>
+        <a:lstStyle/>
+        <a:p>
+          <a:endParaRPr lang="en-US"/>
+        </a:p>
+      </dgm:t>
     </dgm:pt>
   </dgm:ptLst>
   <dgm:cxnLst>
+    <dgm:cxn modelId="{AEF3B3B9-D627-6D4A-B214-406C9624D6CF}" srcId="{7E040981-7CE3-774D-8C6F-2BC906473FAB}" destId="{6783BD06-83D4-DB4E-9499-7C43E0AA64C7}" srcOrd="0" destOrd="0" parTransId="{134D0CC3-1D33-B64C-A21E-9AA946744840}" sibTransId="{B2C80D16-7558-B440-8ED6-DFBE7449FA42}"/>
+    <dgm:cxn modelId="{9CA9D8AF-64BE-E041-94C5-59282579C544}" srcId="{6783BD06-83D4-DB4E-9499-7C43E0AA64C7}" destId="{232535A5-43C3-7A4C-8182-5EE8E311AF2A}" srcOrd="0" destOrd="0" parTransId="{D7E2F479-3B62-C748-8407-A4526B702630}" sibTransId="{AA215D0C-6C5C-5C42-899F-8E61F52C0156}"/>
     <dgm:cxn modelId="{49609C54-9BFC-F045-AC5F-3B3A1D563C99}" type="presOf" srcId="{EFFA916E-4F76-8048-A184-2BBA466BB661}" destId="{828E74BE-A4CA-DA48-94AF-69667114393F}" srcOrd="0" destOrd="0" presId="urn:microsoft.com/office/officeart/2005/8/layout/vList2"/>
-    <dgm:cxn modelId="{9CA9D8AF-64BE-E041-94C5-59282579C544}" srcId="{6783BD06-83D4-DB4E-9499-7C43E0AA64C7}" destId="{232535A5-43C3-7A4C-8182-5EE8E311AF2A}" srcOrd="0" destOrd="0" parTransId="{D7E2F479-3B62-C748-8407-A4526B702630}" sibTransId="{AA215D0C-6C5C-5C42-899F-8E61F52C0156}"/>
+    <dgm:cxn modelId="{3290FC1D-15CD-314E-BE15-2FBF5BEAD6FD}" type="presOf" srcId="{232535A5-43C3-7A4C-8182-5EE8E311AF2A}" destId="{7F072C46-BF5C-E74A-BDBA-A2316FA1CE02}" srcOrd="0" destOrd="0" presId="urn:microsoft.com/office/officeart/2005/8/layout/vList2"/>
     <dgm:cxn modelId="{C8230DF7-9FAA-8145-954E-4DE18C6E5962}" srcId="{CFCF1C09-80B6-9D43-9C3D-1BC2C3E510C9}" destId="{EFFA916E-4F76-8048-A184-2BBA466BB661}" srcOrd="0" destOrd="0" parTransId="{F12842DE-315F-D443-AC85-990609EEC187}" sibTransId="{6436388D-8658-F147-8348-EA3DD289011D}"/>
+    <dgm:cxn modelId="{878CBE81-C078-E64C-98BD-0336A78B9031}" type="presOf" srcId="{2F8811AE-3AB0-1648-A7CD-877961003617}" destId="{7F072C46-BF5C-E74A-BDBA-A2316FA1CE02}" srcOrd="0" destOrd="1" presId="urn:microsoft.com/office/officeart/2005/8/layout/vList2"/>
+    <dgm:cxn modelId="{93330E4C-0735-154C-B384-B86CC3BB6A40}" type="presOf" srcId="{6783BD06-83D4-DB4E-9499-7C43E0AA64C7}" destId="{F57962A2-0320-3D4F-B361-F11EAE206643}" srcOrd="0" destOrd="0" presId="urn:microsoft.com/office/officeart/2005/8/layout/vList2"/>
+    <dgm:cxn modelId="{F74B8BFB-6CB7-3144-8F7D-23014B4CF3D8}" type="presOf" srcId="{CFCF1C09-80B6-9D43-9C3D-1BC2C3E510C9}" destId="{2E506666-F2C7-594C-88A3-1989CAFB2CE9}" srcOrd="0" destOrd="0" presId="urn:microsoft.com/office/officeart/2005/8/layout/vList2"/>
     <dgm:cxn modelId="{53B1FC09-A894-454F-867A-510F9B7D2B89}" srcId="{6783BD06-83D4-DB4E-9499-7C43E0AA64C7}" destId="{2F8811AE-3AB0-1648-A7CD-877961003617}" srcOrd="1" destOrd="0" parTransId="{710D0221-55D0-6B40-BBFA-61AB8F210E01}" sibTransId="{7C95FB20-DBC0-2A47-8AB7-9BE78A187FDB}"/>
+    <dgm:cxn modelId="{74FE3A4F-6393-3F40-869C-57BBD44AA112}" type="presOf" srcId="{7E040981-7CE3-774D-8C6F-2BC906473FAB}" destId="{636379C9-8B6B-A640-8821-6D45637590C2}" srcOrd="0" destOrd="0" presId="urn:microsoft.com/office/officeart/2005/8/layout/vList2"/>
     <dgm:cxn modelId="{3C97EC6F-4544-624C-B51E-92D8D23E54F5}" srcId="{7E040981-7CE3-774D-8C6F-2BC906473FAB}" destId="{CFCF1C09-80B6-9D43-9C3D-1BC2C3E510C9}" srcOrd="1" destOrd="0" parTransId="{EBB1D5CB-3DDB-ED44-8722-1953E41A9E33}" sibTransId="{6FB62A41-4360-FA4C-B374-BB9ED8522367}"/>
-    <dgm:cxn modelId="{74FE3A4F-6393-3F40-869C-57BBD44AA112}" type="presOf" srcId="{7E040981-7CE3-774D-8C6F-2BC906473FAB}" destId="{636379C9-8B6B-A640-8821-6D45637590C2}" srcOrd="0" destOrd="0" presId="urn:microsoft.com/office/officeart/2005/8/layout/vList2"/>
-    <dgm:cxn modelId="{F74B8BFB-6CB7-3144-8F7D-23014B4CF3D8}" type="presOf" srcId="{CFCF1C09-80B6-9D43-9C3D-1BC2C3E510C9}" destId="{2E506666-F2C7-594C-88A3-1989CAFB2CE9}" srcOrd="0" destOrd="0" presId="urn:microsoft.com/office/officeart/2005/8/layout/vList2"/>
-    <dgm:cxn modelId="{3290FC1D-15CD-314E-BE15-2FBF5BEAD6FD}" type="presOf" srcId="{232535A5-43C3-7A4C-8182-5EE8E311AF2A}" destId="{7F072C46-BF5C-E74A-BDBA-A2316FA1CE02}" srcOrd="0" destOrd="0" presId="urn:microsoft.com/office/officeart/2005/8/layout/vList2"/>
-    <dgm:cxn modelId="{878CBE81-C078-E64C-98BD-0336A78B9031}" type="presOf" srcId="{2F8811AE-3AB0-1648-A7CD-877961003617}" destId="{7F072C46-BF5C-E74A-BDBA-A2316FA1CE02}" srcOrd="0" destOrd="1" presId="urn:microsoft.com/office/officeart/2005/8/layout/vList2"/>
-    <dgm:cxn modelId="{AEF3B3B9-D627-6D4A-B214-406C9624D6CF}" srcId="{7E040981-7CE3-774D-8C6F-2BC906473FAB}" destId="{6783BD06-83D4-DB4E-9499-7C43E0AA64C7}" srcOrd="0" destOrd="0" parTransId="{134D0CC3-1D33-B64C-A21E-9AA946744840}" sibTransId="{B2C80D16-7558-B440-8ED6-DFBE7449FA42}"/>
-    <dgm:cxn modelId="{93330E4C-0735-154C-B384-B86CC3BB6A40}" type="presOf" srcId="{6783BD06-83D4-DB4E-9499-7C43E0AA64C7}" destId="{F57962A2-0320-3D4F-B361-F11EAE206643}" srcOrd="0" destOrd="0" presId="urn:microsoft.com/office/officeart/2005/8/layout/vList2"/>
     <dgm:cxn modelId="{8D47B376-508C-4D46-91F5-6FCD9F007555}" type="presParOf" srcId="{636379C9-8B6B-A640-8821-6D45637590C2}" destId="{F57962A2-0320-3D4F-B361-F11EAE206643}" srcOrd="0" destOrd="0" presId="urn:microsoft.com/office/officeart/2005/8/layout/vList2"/>
     <dgm:cxn modelId="{AD26FD55-9E0F-194E-B084-E5349676E33B}" type="presParOf" srcId="{636379C9-8B6B-A640-8821-6D45637590C2}" destId="{7F072C46-BF5C-E74A-BDBA-A2316FA1CE02}" srcOrd="1" destOrd="0" presId="urn:microsoft.com/office/officeart/2005/8/layout/vList2"/>
     <dgm:cxn modelId="{C54AD420-B180-744B-9FFC-0B2F9C3A27AF}" type="presParOf" srcId="{636379C9-8B6B-A640-8821-6D45637590C2}" destId="{2E506666-F2C7-594C-88A3-1989CAFB2CE9}" srcOrd="2" destOrd="0" presId="urn:microsoft.com/office/officeart/2005/8/layout/vList2"/>
@@ -10617,12 +10662,12 @@
         <a:fontRef idx="minor"/>
       </dsp:style>
       <dsp:txBody>
-        <a:bodyPr spcFirstLastPara="0" vert="horz" wrap="square" lIns="110490" tIns="55245" rIns="110490" bIns="55245" numCol="1" spcCol="1270" anchor="ctr" anchorCtr="0">
+        <a:bodyPr spcFirstLastPara="0" vert="horz" wrap="square" lIns="114300" tIns="57150" rIns="114300" bIns="57150" numCol="1" spcCol="1270" anchor="ctr" anchorCtr="0">
           <a:noAutofit/>
         </a:bodyPr>
         <a:lstStyle/>
         <a:p>
-          <a:pPr marL="285750" lvl="1" indent="-285750" algn="l" defTabSz="1289050">
+          <a:pPr marL="285750" lvl="1" indent="-285750" algn="l" defTabSz="1333500">
             <a:lnSpc>
               <a:spcPct val="90000"/>
             </a:lnSpc>
@@ -10635,10 +10680,10 @@
             <a:buChar char="••"/>
           </a:pPr>
           <a:r>
-            <a:rPr lang="en-US" sz="2900" kern="1200" dirty="0" smtClean="0"/>
+            <a:rPr lang="en-US" sz="3000" kern="1200" dirty="0" smtClean="0"/>
             <a:t>A Temporal Data-Driven Player Model for Dynamic Difficulty Adjustment</a:t>
           </a:r>
-          <a:endParaRPr lang="en-US" sz="2900" kern="1200" dirty="0"/>
+          <a:endParaRPr lang="en-US" sz="3000" kern="1200" dirty="0"/>
         </a:p>
       </dsp:txBody>
       <dsp:txXfrm rot="-5400000">
@@ -10785,12 +10830,12 @@
         <a:fontRef idx="minor"/>
       </dsp:style>
       <dsp:txBody>
-        <a:bodyPr spcFirstLastPara="0" vert="horz" wrap="square" lIns="110490" tIns="55245" rIns="110490" bIns="55245" numCol="1" spcCol="1270" anchor="ctr" anchorCtr="0">
+        <a:bodyPr spcFirstLastPara="0" vert="horz" wrap="square" lIns="114300" tIns="57150" rIns="114300" bIns="57150" numCol="1" spcCol="1270" anchor="ctr" anchorCtr="0">
           <a:noAutofit/>
         </a:bodyPr>
         <a:lstStyle/>
         <a:p>
-          <a:pPr marL="285750" lvl="1" indent="-285750" algn="l" defTabSz="1289050">
+          <a:pPr marL="285750" lvl="1" indent="-285750" algn="l" defTabSz="1333500">
             <a:lnSpc>
               <a:spcPct val="90000"/>
             </a:lnSpc>
@@ -10803,13 +10848,13 @@
             <a:buChar char="••"/>
           </a:pPr>
           <a:r>
-            <a:rPr lang="en-US" sz="2900" kern="1200" dirty="0" err="1" smtClean="0"/>
+            <a:rPr lang="en-US" sz="3000" kern="1200" dirty="0" err="1" smtClean="0"/>
             <a:t>Pokemon</a:t>
           </a:r>
-          <a:endParaRPr lang="en-US" sz="2900" kern="1200" dirty="0"/>
+          <a:endParaRPr lang="en-US" sz="3000" kern="1200" dirty="0"/>
         </a:p>
         <a:p>
-          <a:pPr marL="285750" lvl="1" indent="-285750" algn="l" defTabSz="1289050">
+          <a:pPr marL="285750" lvl="1" indent="-285750" algn="l" defTabSz="1333500">
             <a:lnSpc>
               <a:spcPct val="90000"/>
             </a:lnSpc>
@@ -10822,10 +10867,10 @@
             <a:buChar char="••"/>
           </a:pPr>
           <a:r>
-            <a:rPr lang="en-US" sz="2900" kern="1200" dirty="0" smtClean="0"/>
+            <a:rPr lang="en-US" sz="3000" kern="1200" dirty="0" smtClean="0"/>
             <a:t>League of Legends</a:t>
           </a:r>
-          <a:endParaRPr lang="en-US" sz="2900" kern="1200" dirty="0"/>
+          <a:endParaRPr lang="en-US" sz="3000" kern="1200" dirty="0"/>
         </a:p>
       </dsp:txBody>
       <dsp:txXfrm rot="-5400000">
@@ -12812,7 +12857,7 @@
         </a:bodyPr>
         <a:lstStyle/>
         <a:p>
-          <a:pPr lvl="0" algn="ctr" defTabSz="933450">
+          <a:pPr lvl="0" algn="ctr" defTabSz="1066800">
             <a:lnSpc>
               <a:spcPct val="90000"/>
             </a:lnSpc>
@@ -12823,7 +12868,7 @@
               <a:spcPct val="35000"/>
             </a:spcAft>
           </a:pPr>
-          <a:endParaRPr lang="en-US" sz="2100" kern="1200"/>
+          <a:endParaRPr lang="en-US" sz="2400" kern="1200"/>
         </a:p>
       </dsp:txBody>
       <dsp:txXfrm>
@@ -13211,7 +13256,7 @@
         </a:bodyPr>
         <a:lstStyle/>
         <a:p>
-          <a:pPr lvl="0" algn="ctr" defTabSz="533400">
+          <a:pPr lvl="0" algn="ctr" defTabSz="577850">
             <a:lnSpc>
               <a:spcPct val="90000"/>
             </a:lnSpc>
@@ -13222,7 +13267,7 @@
               <a:spcPct val="35000"/>
             </a:spcAft>
           </a:pPr>
-          <a:endParaRPr lang="en-US" sz="1200" kern="1200"/>
+          <a:endParaRPr lang="en-US" sz="1300" kern="1200"/>
         </a:p>
       </dsp:txBody>
       <dsp:txXfrm>
@@ -13433,12 +13478,12 @@
         </a:fontRef>
       </dsp:style>
       <dsp:txBody>
-        <a:bodyPr spcFirstLastPara="0" vert="horz" wrap="square" lIns="45720" tIns="45720" rIns="45720" bIns="45720" numCol="1" spcCol="1270" anchor="ctr" anchorCtr="0">
+        <a:bodyPr spcFirstLastPara="0" vert="horz" wrap="square" lIns="44450" tIns="44450" rIns="44450" bIns="44450" numCol="1" spcCol="1270" anchor="ctr" anchorCtr="0">
           <a:noAutofit/>
         </a:bodyPr>
         <a:lstStyle/>
         <a:p>
-          <a:pPr lvl="0" algn="ctr" defTabSz="1600200">
+          <a:pPr lvl="0" algn="ctr" defTabSz="1555750">
             <a:lnSpc>
               <a:spcPct val="90000"/>
             </a:lnSpc>
@@ -13450,14 +13495,14 @@
             </a:spcAft>
           </a:pPr>
           <a:r>
-            <a:rPr lang="en-US" sz="3600" kern="1200" dirty="0" smtClean="0">
+            <a:rPr lang="en-US" sz="3500" kern="1200" dirty="0" smtClean="0">
               <a:solidFill>
                 <a:schemeClr val="bg1"/>
               </a:solidFill>
             </a:rPr>
             <a:t>Genetic Algorithm</a:t>
           </a:r>
-          <a:endParaRPr lang="en-US" sz="3600" kern="1200" dirty="0">
+          <a:endParaRPr lang="en-US" sz="3500" kern="1200" dirty="0">
             <a:solidFill>
               <a:schemeClr val="bg1"/>
             </a:solidFill>
@@ -13488,7 +13533,7 @@
       </dsp:nvSpPr>
       <dsp:spPr>
         <a:xfrm>
-          <a:off x="0" y="824674"/>
+          <a:off x="0" y="850662"/>
           <a:ext cx="2476500" cy="831600"/>
         </a:xfrm>
         <a:prstGeom prst="rect">
@@ -13537,7 +13582,7 @@
         </a:p>
       </dsp:txBody>
       <dsp:txXfrm>
-        <a:off x="0" y="824674"/>
+        <a:off x="0" y="850662"/>
         <a:ext cx="2476500" cy="831600"/>
       </dsp:txXfrm>
     </dsp:sp>
@@ -13548,8 +13593,8 @@
       </dsp:nvSpPr>
       <dsp:spPr>
         <a:xfrm>
-          <a:off x="2476499" y="785693"/>
-          <a:ext cx="495300" cy="909562"/>
+          <a:off x="2476499" y="837668"/>
+          <a:ext cx="495300" cy="857587"/>
         </a:xfrm>
         <a:prstGeom prst="leftBrace">
           <a:avLst>
@@ -13592,8 +13637,8 @@
       </dsp:nvSpPr>
       <dsp:spPr>
         <a:xfrm>
-          <a:off x="3169919" y="785693"/>
-          <a:ext cx="6736080" cy="909562"/>
+          <a:off x="3169919" y="837668"/>
+          <a:ext cx="6736080" cy="857587"/>
         </a:xfrm>
         <a:prstGeom prst="rect">
           <a:avLst/>
@@ -13667,8 +13712,8 @@
         </a:p>
       </dsp:txBody>
       <dsp:txXfrm>
-        <a:off x="3169919" y="785693"/>
-        <a:ext cx="6736080" cy="909562"/>
+        <a:off x="3169919" y="837668"/>
+        <a:ext cx="6736080" cy="857587"/>
       </dsp:txXfrm>
     </dsp:sp>
     <dsp:sp modelId="{69D26DB6-0A8F-40A4-BF46-6BC0D9481DB8}">
@@ -13678,7 +13723,7 @@
       </dsp:nvSpPr>
       <dsp:spPr>
         <a:xfrm>
-          <a:off x="0" y="1885437"/>
+          <a:off x="0" y="1859449"/>
           <a:ext cx="2476500" cy="831600"/>
         </a:xfrm>
         <a:prstGeom prst="rect">
@@ -13727,7 +13772,7 @@
         </a:p>
       </dsp:txBody>
       <dsp:txXfrm>
-        <a:off x="0" y="1885437"/>
+        <a:off x="0" y="1859449"/>
         <a:ext cx="2476500" cy="831600"/>
       </dsp:txXfrm>
     </dsp:sp>
@@ -13739,7 +13784,7 @@
       <dsp:spPr>
         <a:xfrm>
           <a:off x="2476499" y="1846456"/>
-          <a:ext cx="495300" cy="909562"/>
+          <a:ext cx="495300" cy="857587"/>
         </a:xfrm>
         <a:prstGeom prst="leftBrace">
           <a:avLst>
@@ -13783,7 +13828,7 @@
       <dsp:spPr>
         <a:xfrm>
           <a:off x="3169919" y="1846456"/>
-          <a:ext cx="6736080" cy="909562"/>
+          <a:ext cx="6736080" cy="857587"/>
         </a:xfrm>
         <a:prstGeom prst="rect">
           <a:avLst/>
@@ -13858,7 +13903,7 @@
       </dsp:txBody>
       <dsp:txXfrm>
         <a:off x="3169919" y="1846456"/>
-        <a:ext cx="6736080" cy="909562"/>
+        <a:ext cx="6736080" cy="857587"/>
       </dsp:txXfrm>
     </dsp:sp>
   </dsp:spTree>
@@ -13880,8 +13925,8 @@
       </dsp:nvSpPr>
       <dsp:spPr>
         <a:xfrm>
-          <a:off x="0" y="154905"/>
-          <a:ext cx="9906000" cy="671580"/>
+          <a:off x="0" y="240271"/>
+          <a:ext cx="9906000" cy="638819"/>
         </a:xfrm>
         <a:prstGeom prst="roundRect">
           <a:avLst/>
@@ -13954,8 +13999,8 @@
         </a:p>
       </dsp:txBody>
       <dsp:txXfrm>
-        <a:off x="32784" y="187689"/>
-        <a:ext cx="9840432" cy="606012"/>
+        <a:off x="31185" y="271456"/>
+        <a:ext cx="9843630" cy="576449"/>
       </dsp:txXfrm>
     </dsp:sp>
     <dsp:sp modelId="{89AF1101-C155-4C72-8F3E-0B4A7B231CFA}">
@@ -13965,8 +14010,8 @@
       </dsp:nvSpPr>
       <dsp:spPr>
         <a:xfrm>
-          <a:off x="0" y="826486"/>
-          <a:ext cx="9906000" cy="753480"/>
+          <a:off x="0" y="879091"/>
+          <a:ext cx="9906000" cy="681030"/>
         </a:xfrm>
         <a:prstGeom prst="rect">
           <a:avLst/>
@@ -14033,8 +14078,8 @@
         </a:p>
       </dsp:txBody>
       <dsp:txXfrm>
-        <a:off x="0" y="826486"/>
-        <a:ext cx="9906000" cy="753480"/>
+        <a:off x="0" y="879091"/>
+        <a:ext cx="9906000" cy="681030"/>
       </dsp:txXfrm>
     </dsp:sp>
     <dsp:sp modelId="{5A9A0F5B-CDD7-435F-876C-695E29093293}">
@@ -14044,8 +14089,8 @@
       </dsp:nvSpPr>
       <dsp:spPr>
         <a:xfrm>
-          <a:off x="0" y="1579966"/>
-          <a:ext cx="9906000" cy="671580"/>
+          <a:off x="0" y="1560120"/>
+          <a:ext cx="9906000" cy="638819"/>
         </a:xfrm>
         <a:prstGeom prst="roundRect">
           <a:avLst/>
@@ -14118,8 +14163,8 @@
         </a:p>
       </dsp:txBody>
       <dsp:txXfrm>
-        <a:off x="32784" y="1612750"/>
-        <a:ext cx="9840432" cy="606012"/>
+        <a:off x="31185" y="1591305"/>
+        <a:ext cx="9843630" cy="576449"/>
       </dsp:txXfrm>
     </dsp:sp>
     <dsp:sp modelId="{31039EFF-E573-415F-B91A-1B6232FF36DA}">
@@ -14129,7 +14174,7 @@
       </dsp:nvSpPr>
       <dsp:spPr>
         <a:xfrm>
-          <a:off x="0" y="2251546"/>
+          <a:off x="0" y="2198940"/>
           <a:ext cx="9906000" cy="463680"/>
         </a:xfrm>
         <a:prstGeom prst="rect">
@@ -14179,7 +14224,7 @@
         </a:p>
       </dsp:txBody>
       <dsp:txXfrm>
-        <a:off x="0" y="2251546"/>
+        <a:off x="0" y="2198940"/>
         <a:ext cx="9906000" cy="463680"/>
       </dsp:txXfrm>
     </dsp:sp>
@@ -14190,8 +14235,8 @@
       </dsp:nvSpPr>
       <dsp:spPr>
         <a:xfrm>
-          <a:off x="0" y="2715226"/>
-          <a:ext cx="9906000" cy="671580"/>
+          <a:off x="0" y="2662621"/>
+          <a:ext cx="9906000" cy="638819"/>
         </a:xfrm>
         <a:prstGeom prst="roundRect">
           <a:avLst/>
@@ -14272,8 +14317,8 @@
         </a:p>
       </dsp:txBody>
       <dsp:txXfrm>
-        <a:off x="32784" y="2748010"/>
-        <a:ext cx="9840432" cy="606012"/>
+        <a:off x="31185" y="2693806"/>
+        <a:ext cx="9843630" cy="576449"/>
       </dsp:txXfrm>
     </dsp:sp>
   </dsp:spTree>
@@ -14339,12 +14384,12 @@
         <a:fontRef idx="minor"/>
       </dsp:style>
       <dsp:txBody>
-        <a:bodyPr spcFirstLastPara="0" vert="horz" wrap="square" lIns="99060" tIns="49530" rIns="99060" bIns="49530" numCol="1" spcCol="1270" anchor="ctr" anchorCtr="0">
+        <a:bodyPr spcFirstLastPara="0" vert="horz" wrap="square" lIns="102870" tIns="51435" rIns="102870" bIns="51435" numCol="1" spcCol="1270" anchor="ctr" anchorCtr="0">
           <a:noAutofit/>
         </a:bodyPr>
         <a:lstStyle/>
         <a:p>
-          <a:pPr marL="228600" lvl="1" indent="-228600" algn="l" defTabSz="1155700">
+          <a:pPr marL="228600" lvl="1" indent="-228600" algn="l" defTabSz="1200150">
             <a:lnSpc>
               <a:spcPct val="90000"/>
             </a:lnSpc>
@@ -14357,10 +14402,10 @@
             <a:buChar char="••"/>
           </a:pPr>
           <a:r>
-            <a:rPr lang="en-US" sz="2600" kern="1200" dirty="0" smtClean="0"/>
+            <a:rPr lang="en-US" sz="2700" kern="1200" dirty="0" smtClean="0"/>
             <a:t>Identical moves for players in simulation showed little improvement</a:t>
           </a:r>
-          <a:endParaRPr lang="en-US" sz="2600" kern="1200" dirty="0"/>
+          <a:endParaRPr lang="en-US" sz="2700" kern="1200" dirty="0"/>
         </a:p>
       </dsp:txBody>
       <dsp:txXfrm rot="-5400000">
@@ -14428,12 +14473,12 @@
         </a:fontRef>
       </dsp:style>
       <dsp:txBody>
-        <a:bodyPr spcFirstLastPara="0" vert="horz" wrap="square" lIns="129540" tIns="64770" rIns="129540" bIns="64770" numCol="1" spcCol="1270" anchor="ctr" anchorCtr="0">
+        <a:bodyPr spcFirstLastPara="0" vert="horz" wrap="square" lIns="133350" tIns="66675" rIns="133350" bIns="66675" numCol="1" spcCol="1270" anchor="ctr" anchorCtr="0">
           <a:noAutofit/>
         </a:bodyPr>
         <a:lstStyle/>
         <a:p>
-          <a:pPr lvl="0" algn="ctr" defTabSz="1511300">
+          <a:pPr lvl="0" algn="ctr" defTabSz="1555750">
             <a:lnSpc>
               <a:spcPct val="90000"/>
             </a:lnSpc>
@@ -14445,14 +14490,14 @@
             </a:spcAft>
           </a:pPr>
           <a:r>
-            <a:rPr lang="en-US" sz="3400" kern="1200" dirty="0" smtClean="0">
+            <a:rPr lang="en-US" sz="3500" kern="1200" dirty="0" smtClean="0">
               <a:solidFill>
                 <a:srgbClr val="000000"/>
               </a:solidFill>
             </a:rPr>
             <a:t>“Mirroring” Moves</a:t>
           </a:r>
-          <a:endParaRPr lang="en-US" sz="3400" kern="1200" dirty="0">
+          <a:endParaRPr lang="en-US" sz="3500" kern="1200" dirty="0">
             <a:solidFill>
               <a:srgbClr val="000000"/>
             </a:solidFill>
@@ -14515,12 +14560,12 @@
         <a:fontRef idx="minor"/>
       </dsp:style>
       <dsp:txBody>
-        <a:bodyPr spcFirstLastPara="0" vert="horz" wrap="square" lIns="99060" tIns="49530" rIns="99060" bIns="49530" numCol="1" spcCol="1270" anchor="ctr" anchorCtr="0">
+        <a:bodyPr spcFirstLastPara="0" vert="horz" wrap="square" lIns="102870" tIns="51435" rIns="102870" bIns="51435" numCol="1" spcCol="1270" anchor="ctr" anchorCtr="0">
           <a:noAutofit/>
         </a:bodyPr>
         <a:lstStyle/>
         <a:p>
-          <a:pPr marL="228600" lvl="1" indent="-228600" algn="l" defTabSz="1155700">
+          <a:pPr marL="228600" lvl="1" indent="-228600" algn="l" defTabSz="1200150">
             <a:lnSpc>
               <a:spcPct val="90000"/>
             </a:lnSpc>
@@ -14533,10 +14578,10 @@
             <a:buChar char="••"/>
           </a:pPr>
           <a:r>
-            <a:rPr lang="en-US" sz="2600" kern="1200" dirty="0" smtClean="0"/>
+            <a:rPr lang="en-US" sz="2700" kern="1200" dirty="0" smtClean="0"/>
             <a:t>Tried many combinations and calculations of criteria for determining utility of moves</a:t>
           </a:r>
-          <a:endParaRPr lang="en-US" sz="2600" kern="1200" dirty="0"/>
+          <a:endParaRPr lang="en-US" sz="2700" kern="1200" dirty="0"/>
         </a:p>
       </dsp:txBody>
       <dsp:txXfrm rot="-5400000">
@@ -14604,12 +14649,12 @@
         </a:fontRef>
       </dsp:style>
       <dsp:txBody>
-        <a:bodyPr spcFirstLastPara="0" vert="horz" wrap="square" lIns="129540" tIns="64770" rIns="129540" bIns="64770" numCol="1" spcCol="1270" anchor="ctr" anchorCtr="0">
+        <a:bodyPr spcFirstLastPara="0" vert="horz" wrap="square" lIns="133350" tIns="66675" rIns="133350" bIns="66675" numCol="1" spcCol="1270" anchor="ctr" anchorCtr="0">
           <a:noAutofit/>
         </a:bodyPr>
         <a:lstStyle/>
         <a:p>
-          <a:pPr lvl="0" algn="ctr" defTabSz="1511300">
+          <a:pPr lvl="0" algn="ctr" defTabSz="1555750">
             <a:lnSpc>
               <a:spcPct val="90000"/>
             </a:lnSpc>
@@ -14621,14 +14666,14 @@
             </a:spcAft>
           </a:pPr>
           <a:r>
-            <a:rPr lang="en-US" sz="3400" kern="1200" dirty="0" smtClean="0">
+            <a:rPr lang="en-US" sz="3500" kern="1200" dirty="0" smtClean="0">
               <a:solidFill>
                 <a:srgbClr val="000000"/>
               </a:solidFill>
             </a:rPr>
             <a:t>Confusing Utilities</a:t>
           </a:r>
-          <a:endParaRPr lang="en-US" sz="3400" kern="1200" dirty="0">
+          <a:endParaRPr lang="en-US" sz="3500" kern="1200" dirty="0">
             <a:solidFill>
               <a:srgbClr val="000000"/>
             </a:solidFill>
@@ -14691,12 +14736,12 @@
         <a:fontRef idx="minor"/>
       </dsp:style>
       <dsp:txBody>
-        <a:bodyPr spcFirstLastPara="0" vert="horz" wrap="square" lIns="99060" tIns="49530" rIns="99060" bIns="49530" numCol="1" spcCol="1270" anchor="ctr" anchorCtr="0">
+        <a:bodyPr spcFirstLastPara="0" vert="horz" wrap="square" lIns="102870" tIns="51435" rIns="102870" bIns="51435" numCol="1" spcCol="1270" anchor="ctr" anchorCtr="0">
           <a:noAutofit/>
         </a:bodyPr>
         <a:lstStyle/>
         <a:p>
-          <a:pPr marL="228600" lvl="1" indent="-228600" algn="l" defTabSz="1155700">
+          <a:pPr marL="228600" lvl="1" indent="-228600" algn="l" defTabSz="1200150">
             <a:lnSpc>
               <a:spcPct val="90000"/>
             </a:lnSpc>
@@ -14709,10 +14754,10 @@
             <a:buChar char="••"/>
           </a:pPr>
           <a:r>
-            <a:rPr lang="en-US" sz="2600" kern="1200" dirty="0" smtClean="0"/>
+            <a:rPr lang="en-US" sz="2700" kern="1200" dirty="0" smtClean="0"/>
             <a:t>Challenge of crossing over moves with different features</a:t>
           </a:r>
-          <a:endParaRPr lang="en-US" sz="2600" kern="1200" dirty="0"/>
+          <a:endParaRPr lang="en-US" sz="2700" kern="1200" dirty="0"/>
         </a:p>
       </dsp:txBody>
       <dsp:txXfrm rot="-5400000">
@@ -14780,12 +14825,12 @@
         </a:fontRef>
       </dsp:style>
       <dsp:txBody>
-        <a:bodyPr spcFirstLastPara="0" vert="horz" wrap="square" lIns="129540" tIns="64770" rIns="129540" bIns="64770" numCol="1" spcCol="1270" anchor="ctr" anchorCtr="0">
+        <a:bodyPr spcFirstLastPara="0" vert="horz" wrap="square" lIns="133350" tIns="66675" rIns="133350" bIns="66675" numCol="1" spcCol="1270" anchor="ctr" anchorCtr="0">
           <a:noAutofit/>
         </a:bodyPr>
         <a:lstStyle/>
         <a:p>
-          <a:pPr lvl="0" algn="ctr" defTabSz="1511300">
+          <a:pPr lvl="0" algn="ctr" defTabSz="1555750">
             <a:lnSpc>
               <a:spcPct val="90000"/>
             </a:lnSpc>
@@ -14797,14 +14842,14 @@
             </a:spcAft>
           </a:pPr>
           <a:r>
-            <a:rPr lang="en-US" sz="3400" kern="1200" dirty="0" smtClean="0">
+            <a:rPr lang="en-US" sz="3500" kern="1200" dirty="0" smtClean="0">
               <a:solidFill>
                 <a:srgbClr val="000000"/>
               </a:solidFill>
             </a:rPr>
             <a:t>Move Merging</a:t>
           </a:r>
-          <a:endParaRPr lang="en-US" sz="3400" kern="1200" dirty="0">
+          <a:endParaRPr lang="en-US" sz="3500" kern="1200" dirty="0">
             <a:solidFill>
               <a:srgbClr val="000000"/>
             </a:solidFill>
@@ -14835,8 +14880,8 @@
       </dsp:nvSpPr>
       <dsp:spPr>
         <a:xfrm>
-          <a:off x="0" y="43868"/>
-          <a:ext cx="9906000" cy="839474"/>
+          <a:off x="0" y="65063"/>
+          <a:ext cx="9906000" cy="844155"/>
         </a:xfrm>
         <a:prstGeom prst="roundRect">
           <a:avLst/>
@@ -14888,12 +14933,12 @@
         </a:fontRef>
       </dsp:style>
       <dsp:txBody>
-        <a:bodyPr spcFirstLastPara="0" vert="horz" wrap="square" lIns="133350" tIns="133350" rIns="133350" bIns="133350" numCol="1" spcCol="1270" anchor="ctr" anchorCtr="0">
+        <a:bodyPr spcFirstLastPara="0" vert="horz" wrap="square" lIns="140970" tIns="140970" rIns="140970" bIns="140970" numCol="1" spcCol="1270" anchor="ctr" anchorCtr="0">
           <a:noAutofit/>
         </a:bodyPr>
         <a:lstStyle/>
         <a:p>
-          <a:pPr lvl="0" algn="l" defTabSz="1555750">
+          <a:pPr lvl="0" algn="l" defTabSz="1644650">
             <a:lnSpc>
               <a:spcPct val="90000"/>
             </a:lnSpc>
@@ -14905,14 +14950,14 @@
             </a:spcAft>
           </a:pPr>
           <a:r>
-            <a:rPr lang="en-US" sz="3500" kern="1200" dirty="0" smtClean="0">
+            <a:rPr lang="en-US" sz="3700" kern="1200" dirty="0" smtClean="0">
               <a:solidFill>
                 <a:srgbClr val="000000"/>
               </a:solidFill>
             </a:rPr>
             <a:t>Short Term</a:t>
           </a:r>
-          <a:endParaRPr lang="en-US" sz="3500" kern="1200" dirty="0">
+          <a:endParaRPr lang="en-US" sz="3700" kern="1200" dirty="0">
             <a:solidFill>
               <a:srgbClr val="000000"/>
             </a:solidFill>
@@ -14920,8 +14965,8 @@
         </a:p>
       </dsp:txBody>
       <dsp:txXfrm>
-        <a:off x="40980" y="84848"/>
-        <a:ext cx="9824040" cy="757514"/>
+        <a:off x="41208" y="106271"/>
+        <a:ext cx="9823584" cy="761739"/>
       </dsp:txXfrm>
     </dsp:sp>
     <dsp:sp modelId="{7F072C46-BF5C-E74A-BDBA-A2316FA1CE02}">
@@ -14931,8 +14976,8 @@
       </dsp:nvSpPr>
       <dsp:spPr>
         <a:xfrm>
-          <a:off x="0" y="883343"/>
-          <a:ext cx="9906000" cy="923737"/>
+          <a:off x="0" y="909218"/>
+          <a:ext cx="9906000" cy="899932"/>
         </a:xfrm>
         <a:prstGeom prst="rect">
           <a:avLst/>
@@ -14956,12 +15001,12 @@
         <a:fontRef idx="minor"/>
       </dsp:style>
       <dsp:txBody>
-        <a:bodyPr spcFirstLastPara="0" vert="horz" wrap="square" lIns="314516" tIns="44450" rIns="248920" bIns="44450" numCol="1" spcCol="1270" anchor="t" anchorCtr="0">
+        <a:bodyPr spcFirstLastPara="0" vert="horz" wrap="square" lIns="314516" tIns="46990" rIns="263144" bIns="46990" numCol="1" spcCol="1270" anchor="t" anchorCtr="0">
           <a:noAutofit/>
         </a:bodyPr>
         <a:lstStyle/>
         <a:p>
-          <a:pPr marL="228600" lvl="1" indent="-228600" algn="l" defTabSz="1200150">
+          <a:pPr marL="285750" lvl="1" indent="-285750" algn="l" defTabSz="1289050">
             <a:lnSpc>
               <a:spcPct val="90000"/>
             </a:lnSpc>
@@ -14974,21 +15019,21 @@
             <a:buChar char="••"/>
           </a:pPr>
           <a:r>
-            <a:rPr lang="en-US" sz="2700" kern="1200" dirty="0" smtClean="0">
+            <a:rPr lang="en-US" sz="2900" kern="1200" dirty="0" smtClean="0">
               <a:solidFill>
                 <a:srgbClr val="FFFFFF"/>
               </a:solidFill>
             </a:rPr>
             <a:t>Using more parameters</a:t>
           </a:r>
-          <a:endParaRPr lang="en-US" sz="2700" kern="1200" dirty="0">
+          <a:endParaRPr lang="en-US" sz="2900" kern="1200" dirty="0">
             <a:solidFill>
               <a:srgbClr val="FFFFFF"/>
             </a:solidFill>
           </a:endParaRPr>
         </a:p>
         <a:p>
-          <a:pPr marL="228600" lvl="1" indent="-228600" algn="l" defTabSz="1200150">
+          <a:pPr marL="285750" lvl="1" indent="-285750" algn="l" defTabSz="1289050">
             <a:lnSpc>
               <a:spcPct val="90000"/>
             </a:lnSpc>
@@ -15001,14 +15046,14 @@
             <a:buChar char="••"/>
           </a:pPr>
           <a:r>
-            <a:rPr lang="en-US" sz="2700" kern="1200" dirty="0" smtClean="0">
+            <a:rPr lang="en-US" sz="2900" kern="1200" dirty="0" smtClean="0">
               <a:solidFill>
                 <a:srgbClr val="FFFFFF"/>
               </a:solidFill>
             </a:rPr>
             <a:t>Increasing attributes and types</a:t>
           </a:r>
-          <a:endParaRPr lang="en-US" sz="2700" kern="1200" dirty="0">
+          <a:endParaRPr lang="en-US" sz="2900" kern="1200" dirty="0">
             <a:solidFill>
               <a:srgbClr val="FFFFFF"/>
             </a:solidFill>
@@ -15016,8 +15061,8 @@
         </a:p>
       </dsp:txBody>
       <dsp:txXfrm>
-        <a:off x="0" y="883343"/>
-        <a:ext cx="9906000" cy="923737"/>
+        <a:off x="0" y="909218"/>
+        <a:ext cx="9906000" cy="899932"/>
       </dsp:txXfrm>
     </dsp:sp>
     <dsp:sp modelId="{2E506666-F2C7-594C-88A3-1989CAFB2CE9}">
@@ -15027,8 +15072,8 @@
       </dsp:nvSpPr>
       <dsp:spPr>
         <a:xfrm>
-          <a:off x="0" y="1807081"/>
-          <a:ext cx="9906000" cy="839474"/>
+          <a:off x="0" y="1809151"/>
+          <a:ext cx="9906000" cy="844155"/>
         </a:xfrm>
         <a:prstGeom prst="roundRect">
           <a:avLst/>
@@ -15080,12 +15125,12 @@
         </a:fontRef>
       </dsp:style>
       <dsp:txBody>
-        <a:bodyPr spcFirstLastPara="0" vert="horz" wrap="square" lIns="133350" tIns="133350" rIns="133350" bIns="133350" numCol="1" spcCol="1270" anchor="ctr" anchorCtr="0">
+        <a:bodyPr spcFirstLastPara="0" vert="horz" wrap="square" lIns="140970" tIns="140970" rIns="140970" bIns="140970" numCol="1" spcCol="1270" anchor="ctr" anchorCtr="0">
           <a:noAutofit/>
         </a:bodyPr>
         <a:lstStyle/>
         <a:p>
-          <a:pPr lvl="0" algn="l" defTabSz="1555750">
+          <a:pPr lvl="0" algn="l" defTabSz="1644650">
             <a:lnSpc>
               <a:spcPct val="90000"/>
             </a:lnSpc>
@@ -15097,14 +15142,14 @@
             </a:spcAft>
           </a:pPr>
           <a:r>
-            <a:rPr lang="en-US" sz="3500" kern="1200" dirty="0" smtClean="0">
+            <a:rPr lang="en-US" sz="3700" kern="1200" dirty="0" smtClean="0">
               <a:solidFill>
                 <a:srgbClr val="000000"/>
               </a:solidFill>
             </a:rPr>
             <a:t>Long Term</a:t>
           </a:r>
-          <a:endParaRPr lang="en-US" sz="3500" kern="1200" dirty="0">
+          <a:endParaRPr lang="en-US" sz="3700" kern="1200" dirty="0">
             <a:solidFill>
               <a:srgbClr val="000000"/>
             </a:solidFill>
@@ -15112,8 +15157,8 @@
         </a:p>
       </dsp:txBody>
       <dsp:txXfrm>
-        <a:off x="40980" y="1848061"/>
-        <a:ext cx="9824040" cy="757514"/>
+        <a:off x="41208" y="1850359"/>
+        <a:ext cx="9823584" cy="761739"/>
       </dsp:txXfrm>
     </dsp:sp>
     <dsp:sp modelId="{828E74BE-A4CA-DA48-94AF-69667114393F}">
@@ -15123,8 +15168,8 @@
       </dsp:nvSpPr>
       <dsp:spPr>
         <a:xfrm>
-          <a:off x="0" y="2646556"/>
-          <a:ext cx="9906000" cy="851287"/>
+          <a:off x="0" y="2653306"/>
+          <a:ext cx="9906000" cy="823342"/>
         </a:xfrm>
         <a:prstGeom prst="rect">
           <a:avLst/>
@@ -15148,12 +15193,12 @@
         <a:fontRef idx="minor"/>
       </dsp:style>
       <dsp:txBody>
-        <a:bodyPr spcFirstLastPara="0" vert="horz" wrap="square" lIns="314516" tIns="44450" rIns="248920" bIns="44450" numCol="1" spcCol="1270" anchor="t" anchorCtr="0">
+        <a:bodyPr spcFirstLastPara="0" vert="horz" wrap="square" lIns="314516" tIns="46990" rIns="263144" bIns="46990" numCol="1" spcCol="1270" anchor="t" anchorCtr="0">
           <a:noAutofit/>
         </a:bodyPr>
         <a:lstStyle/>
         <a:p>
-          <a:pPr marL="228600" lvl="1" indent="-228600" algn="l" defTabSz="1200150">
+          <a:pPr marL="285750" lvl="1" indent="-285750" algn="l" defTabSz="1289050">
             <a:lnSpc>
               <a:spcPct val="90000"/>
             </a:lnSpc>
@@ -15166,14 +15211,14 @@
             <a:buChar char="••"/>
           </a:pPr>
           <a:r>
-            <a:rPr lang="en-US" sz="2700" kern="1200" dirty="0" smtClean="0">
+            <a:rPr lang="en-US" sz="2900" kern="1200" dirty="0" smtClean="0">
               <a:solidFill>
                 <a:schemeClr val="tx1"/>
               </a:solidFill>
             </a:rPr>
             <a:t>Enhancements to Constrained Novelty Search: Two-Population Novelty Search for Generating Game Content (2013)</a:t>
           </a:r>
-          <a:endParaRPr lang="en-US" sz="2700" kern="1200" dirty="0">
+          <a:endParaRPr lang="en-US" sz="2900" kern="1200" dirty="0">
             <a:solidFill>
               <a:schemeClr val="tx1"/>
             </a:solidFill>
@@ -15181,8 +15226,8 @@
         </a:p>
       </dsp:txBody>
       <dsp:txXfrm>
-        <a:off x="0" y="2646556"/>
-        <a:ext cx="9906000" cy="851287"/>
+        <a:off x="0" y="2653306"/>
+        <a:ext cx="9906000" cy="823342"/>
       </dsp:txXfrm>
     </dsp:sp>
   </dsp:spTree>
@@ -28714,7 +28759,7 @@
           </a:prstGeom>
           <a:noFill/>
           <a:extLst>
-            <a:ext uri="{909E8E84-426E-40dd-AFC4-6F175D3DCCD1}">
+            <a:ext uri="{909E8E84-426E-40DD-AFC4-6F175D3DCCD1}">
               <a14:hiddenFill xmlns:a14="http://schemas.microsoft.com/office/drawing/2010/main">
                 <a:solidFill>
                   <a:srgbClr val="FFFFFF"/>
@@ -28773,7 +28818,7 @@
               <a:noFill/>
             </a:ln>
             <a:extLst>
-              <a:ext uri="{91240B29-F687-4f45-9708-019B960494DF}">
+              <a:ext uri="{91240B29-F687-4F45-9708-019B960494DF}">
                 <a14:hiddenLine xmlns:a14="http://schemas.microsoft.com/office/drawing/2010/main" w="9525">
                   <a:solidFill>
                     <a:srgbClr val="000000"/>
@@ -28863,7 +28908,7 @@
               <a:noFill/>
             </a:ln>
             <a:extLst>
-              <a:ext uri="{91240B29-F687-4f45-9708-019B960494DF}">
+              <a:ext uri="{91240B29-F687-4F45-9708-019B960494DF}">
                 <a14:hiddenLine xmlns:a14="http://schemas.microsoft.com/office/drawing/2010/main" w="9525">
                   <a:solidFill>
                     <a:srgbClr val="000000"/>
@@ -28953,7 +28998,7 @@
               <a:noFill/>
             </a:ln>
             <a:extLst>
-              <a:ext uri="{91240B29-F687-4f45-9708-019B960494DF}">
+              <a:ext uri="{91240B29-F687-4F45-9708-019B960494DF}">
                 <a14:hiddenLine xmlns:a14="http://schemas.microsoft.com/office/drawing/2010/main" w="9525">
                   <a:solidFill>
                     <a:srgbClr val="000000"/>
@@ -28987,7 +29032,7 @@
               <a:noFill/>
             </a:ln>
             <a:extLst>
-              <a:ext uri="{91240B29-F687-4f45-9708-019B960494DF}">
+              <a:ext uri="{91240B29-F687-4F45-9708-019B960494DF}">
                 <a14:hiddenLine xmlns:a14="http://schemas.microsoft.com/office/drawing/2010/main" w="9525">
                   <a:solidFill>
                     <a:srgbClr val="000000"/>
@@ -29077,7 +29122,7 @@
               <a:noFill/>
             </a:ln>
             <a:extLst>
-              <a:ext uri="{91240B29-F687-4f45-9708-019B960494DF}">
+              <a:ext uri="{91240B29-F687-4F45-9708-019B960494DF}">
                 <a14:hiddenLine xmlns:a14="http://schemas.microsoft.com/office/drawing/2010/main" w="9525">
                   <a:solidFill>
                     <a:srgbClr val="000000"/>
@@ -29139,7 +29184,7 @@
               <a:noFill/>
             </a:ln>
             <a:extLst>
-              <a:ext uri="{91240B29-F687-4f45-9708-019B960494DF}">
+              <a:ext uri="{91240B29-F687-4F45-9708-019B960494DF}">
                 <a14:hiddenLine xmlns:a14="http://schemas.microsoft.com/office/drawing/2010/main" w="9525">
                   <a:solidFill>
                     <a:srgbClr val="000000"/>
@@ -29201,7 +29246,7 @@
               <a:noFill/>
             </a:ln>
             <a:extLst>
-              <a:ext uri="{91240B29-F687-4f45-9708-019B960494DF}">
+              <a:ext uri="{91240B29-F687-4F45-9708-019B960494DF}">
                 <a14:hiddenLine xmlns:a14="http://schemas.microsoft.com/office/drawing/2010/main" w="9525">
                   <a:solidFill>
                     <a:srgbClr val="000000"/>
@@ -29291,7 +29336,7 @@
               <a:noFill/>
             </a:ln>
             <a:extLst>
-              <a:ext uri="{91240B29-F687-4f45-9708-019B960494DF}">
+              <a:ext uri="{91240B29-F687-4F45-9708-019B960494DF}">
                 <a14:hiddenLine xmlns:a14="http://schemas.microsoft.com/office/drawing/2010/main" w="9525">
                   <a:solidFill>
                     <a:srgbClr val="000000"/>
@@ -29353,7 +29398,7 @@
               <a:noFill/>
             </a:ln>
             <a:extLst>
-              <a:ext uri="{91240B29-F687-4f45-9708-019B960494DF}">
+              <a:ext uri="{91240B29-F687-4F45-9708-019B960494DF}">
                 <a14:hiddenLine xmlns:a14="http://schemas.microsoft.com/office/drawing/2010/main" w="9525">
                   <a:solidFill>
                     <a:srgbClr val="000000"/>
@@ -29415,7 +29460,7 @@
               <a:noFill/>
             </a:ln>
             <a:extLst>
-              <a:ext uri="{91240B29-F687-4f45-9708-019B960494DF}">
+              <a:ext uri="{91240B29-F687-4F45-9708-019B960494DF}">
                 <a14:hiddenLine xmlns:a14="http://schemas.microsoft.com/office/drawing/2010/main" w="9525">
                   <a:solidFill>
                     <a:srgbClr val="000000"/>
@@ -29505,7 +29550,7 @@
               <a:noFill/>
             </a:ln>
             <a:extLst>
-              <a:ext uri="{91240B29-F687-4f45-9708-019B960494DF}">
+              <a:ext uri="{91240B29-F687-4F45-9708-019B960494DF}">
                 <a14:hiddenLine xmlns:a14="http://schemas.microsoft.com/office/drawing/2010/main" w="9525">
                   <a:solidFill>
                     <a:srgbClr val="000000"/>
@@ -29595,7 +29640,7 @@
               <a:noFill/>
             </a:ln>
             <a:extLst>
-              <a:ext uri="{91240B29-F687-4f45-9708-019B960494DF}">
+              <a:ext uri="{91240B29-F687-4F45-9708-019B960494DF}">
                 <a14:hiddenLine xmlns:a14="http://schemas.microsoft.com/office/drawing/2010/main" w="9525">
                   <a:solidFill>
                     <a:srgbClr val="000000"/>
@@ -29657,7 +29702,7 @@
               <a:noFill/>
             </a:ln>
             <a:extLst>
-              <a:ext uri="{91240B29-F687-4f45-9708-019B960494DF}">
+              <a:ext uri="{91240B29-F687-4F45-9708-019B960494DF}">
                 <a14:hiddenLine xmlns:a14="http://schemas.microsoft.com/office/drawing/2010/main" w="9525">
                   <a:solidFill>
                     <a:srgbClr val="000000"/>
@@ -29767,7 +29812,7 @@
               <a:noFill/>
             </a:ln>
             <a:extLst>
-              <a:ext uri="{91240B29-F687-4f45-9708-019B960494DF}">
+              <a:ext uri="{91240B29-F687-4F45-9708-019B960494DF}">
                 <a14:hiddenLine xmlns:a14="http://schemas.microsoft.com/office/drawing/2010/main" w="9525">
                   <a:solidFill>
                     <a:srgbClr val="000000"/>
@@ -29829,7 +29874,7 @@
               <a:noFill/>
             </a:ln>
             <a:extLst>
-              <a:ext uri="{91240B29-F687-4f45-9708-019B960494DF}">
+              <a:ext uri="{91240B29-F687-4F45-9708-019B960494DF}">
                 <a14:hiddenLine xmlns:a14="http://schemas.microsoft.com/office/drawing/2010/main" w="9525">
                   <a:solidFill>
                     <a:srgbClr val="000000"/>
@@ -29919,7 +29964,7 @@
               <a:noFill/>
             </a:ln>
             <a:extLst>
-              <a:ext uri="{91240B29-F687-4f45-9708-019B960494DF}">
+              <a:ext uri="{91240B29-F687-4F45-9708-019B960494DF}">
                 <a14:hiddenLine xmlns:a14="http://schemas.microsoft.com/office/drawing/2010/main" w="9525">
                   <a:solidFill>
                     <a:srgbClr val="000000"/>
@@ -30009,7 +30054,7 @@
               <a:noFill/>
             </a:ln>
             <a:extLst>
-              <a:ext uri="{91240B29-F687-4f45-9708-019B960494DF}">
+              <a:ext uri="{91240B29-F687-4F45-9708-019B960494DF}">
                 <a14:hiddenLine xmlns:a14="http://schemas.microsoft.com/office/drawing/2010/main" w="9525">
                   <a:solidFill>
                     <a:srgbClr val="000000"/>
@@ -30071,7 +30116,7 @@
               <a:noFill/>
             </a:ln>
             <a:extLst>
-              <a:ext uri="{91240B29-F687-4f45-9708-019B960494DF}">
+              <a:ext uri="{91240B29-F687-4F45-9708-019B960494DF}">
                 <a14:hiddenLine xmlns:a14="http://schemas.microsoft.com/office/drawing/2010/main" w="9525">
                   <a:solidFill>
                     <a:srgbClr val="000000"/>
@@ -30161,7 +30206,7 @@
               <a:noFill/>
             </a:ln>
             <a:extLst>
-              <a:ext uri="{91240B29-F687-4f45-9708-019B960494DF}">
+              <a:ext uri="{91240B29-F687-4F45-9708-019B960494DF}">
                 <a14:hiddenLine xmlns:a14="http://schemas.microsoft.com/office/drawing/2010/main" w="9525">
                   <a:solidFill>
                     <a:srgbClr val="000000"/>
@@ -30251,7 +30296,7 @@
               <a:noFill/>
             </a:ln>
             <a:extLst>
-              <a:ext uri="{91240B29-F687-4f45-9708-019B960494DF}">
+              <a:ext uri="{91240B29-F687-4F45-9708-019B960494DF}">
                 <a14:hiddenLine xmlns:a14="http://schemas.microsoft.com/office/drawing/2010/main" w="9525">
                   <a:solidFill>
                     <a:srgbClr val="000000"/>
@@ -30307,7 +30352,7 @@
               <a:noFill/>
             </a:ln>
             <a:extLst>
-              <a:ext uri="{91240B29-F687-4f45-9708-019B960494DF}">
+              <a:ext uri="{91240B29-F687-4F45-9708-019B960494DF}">
                 <a14:hiddenLine xmlns:a14="http://schemas.microsoft.com/office/drawing/2010/main" w="9525">
                   <a:solidFill>
                     <a:srgbClr val="000000"/>
@@ -30397,7 +30442,7 @@
               <a:noFill/>
             </a:ln>
             <a:extLst>
-              <a:ext uri="{91240B29-F687-4f45-9708-019B960494DF}">
+              <a:ext uri="{91240B29-F687-4F45-9708-019B960494DF}">
                 <a14:hiddenLine xmlns:a14="http://schemas.microsoft.com/office/drawing/2010/main" w="9525">
                   <a:solidFill>
                     <a:srgbClr val="000000"/>
@@ -30453,7 +30498,7 @@
               <a:noFill/>
             </a:ln>
             <a:extLst>
-              <a:ext uri="{91240B29-F687-4f45-9708-019B960494DF}">
+              <a:ext uri="{91240B29-F687-4F45-9708-019B960494DF}">
                 <a14:hiddenLine xmlns:a14="http://schemas.microsoft.com/office/drawing/2010/main" w="9525">
                   <a:solidFill>
                     <a:srgbClr val="000000"/>
@@ -30543,7 +30588,7 @@
               <a:noFill/>
             </a:ln>
             <a:extLst>
-              <a:ext uri="{91240B29-F687-4f45-9708-019B960494DF}">
+              <a:ext uri="{91240B29-F687-4F45-9708-019B960494DF}">
                 <a14:hiddenLine xmlns:a14="http://schemas.microsoft.com/office/drawing/2010/main" w="9525">
                   <a:solidFill>
                     <a:srgbClr val="000000"/>
@@ -30611,7 +30656,7 @@
               <a:noFill/>
             </a:ln>
             <a:extLst>
-              <a:ext uri="{91240B29-F687-4f45-9708-019B960494DF}">
+              <a:ext uri="{91240B29-F687-4F45-9708-019B960494DF}">
                 <a14:hiddenLine xmlns:a14="http://schemas.microsoft.com/office/drawing/2010/main" w="9525">
                   <a:solidFill>
                     <a:srgbClr val="000000"/>
@@ -30701,7 +30746,7 @@
               <a:noFill/>
             </a:ln>
             <a:extLst>
-              <a:ext uri="{91240B29-F687-4f45-9708-019B960494DF}">
+              <a:ext uri="{91240B29-F687-4F45-9708-019B960494DF}">
                 <a14:hiddenLine xmlns:a14="http://schemas.microsoft.com/office/drawing/2010/main" w="9525">
                   <a:solidFill>
                     <a:srgbClr val="000000"/>
@@ -30769,7 +30814,7 @@
               <a:noFill/>
             </a:ln>
             <a:extLst>
-              <a:ext uri="{91240B29-F687-4f45-9708-019B960494DF}">
+              <a:ext uri="{91240B29-F687-4F45-9708-019B960494DF}">
                 <a14:hiddenLine xmlns:a14="http://schemas.microsoft.com/office/drawing/2010/main" w="9525">
                   <a:solidFill>
                     <a:srgbClr val="000000"/>
@@ -30859,7 +30904,7 @@
               <a:noFill/>
             </a:ln>
             <a:extLst>
-              <a:ext uri="{91240B29-F687-4f45-9708-019B960494DF}">
+              <a:ext uri="{91240B29-F687-4F45-9708-019B960494DF}">
                 <a14:hiddenLine xmlns:a14="http://schemas.microsoft.com/office/drawing/2010/main" w="9525">
                   <a:solidFill>
                     <a:srgbClr val="000000"/>
@@ -30893,7 +30938,7 @@
               <a:noFill/>
             </a:ln>
             <a:extLst>
-              <a:ext uri="{91240B29-F687-4f45-9708-019B960494DF}">
+              <a:ext uri="{91240B29-F687-4F45-9708-019B960494DF}">
                 <a14:hiddenLine xmlns:a14="http://schemas.microsoft.com/office/drawing/2010/main" w="9525">
                   <a:solidFill>
                     <a:srgbClr val="000000"/>
@@ -30983,7 +31028,7 @@
               <a:noFill/>
             </a:ln>
             <a:extLst>
-              <a:ext uri="{91240B29-F687-4f45-9708-019B960494DF}">
+              <a:ext uri="{91240B29-F687-4F45-9708-019B960494DF}">
                 <a14:hiddenLine xmlns:a14="http://schemas.microsoft.com/office/drawing/2010/main" w="9525">
                   <a:solidFill>
                     <a:srgbClr val="000000"/>
@@ -31045,7 +31090,7 @@
               <a:noFill/>
             </a:ln>
             <a:extLst>
-              <a:ext uri="{91240B29-F687-4f45-9708-019B960494DF}">
+              <a:ext uri="{91240B29-F687-4F45-9708-019B960494DF}">
                 <a14:hiddenLine xmlns:a14="http://schemas.microsoft.com/office/drawing/2010/main" w="9525">
                   <a:solidFill>
                     <a:srgbClr val="000000"/>
@@ -31107,7 +31152,7 @@
               <a:noFill/>
             </a:ln>
             <a:extLst>
-              <a:ext uri="{91240B29-F687-4f45-9708-019B960494DF}">
+              <a:ext uri="{91240B29-F687-4F45-9708-019B960494DF}">
                 <a14:hiddenLine xmlns:a14="http://schemas.microsoft.com/office/drawing/2010/main" w="9525">
                   <a:solidFill>
                     <a:srgbClr val="000000"/>
@@ -31197,7 +31242,7 @@
               <a:noFill/>
             </a:ln>
             <a:extLst>
-              <a:ext uri="{91240B29-F687-4f45-9708-019B960494DF}">
+              <a:ext uri="{91240B29-F687-4F45-9708-019B960494DF}">
                 <a14:hiddenLine xmlns:a14="http://schemas.microsoft.com/office/drawing/2010/main" w="9525">
                   <a:solidFill>
                     <a:srgbClr val="000000"/>
@@ -31265,7 +31310,7 @@
               <a:noFill/>
             </a:ln>
             <a:extLst>
-              <a:ext uri="{91240B29-F687-4f45-9708-019B960494DF}">
+              <a:ext uri="{91240B29-F687-4F45-9708-019B960494DF}">
                 <a14:hiddenLine xmlns:a14="http://schemas.microsoft.com/office/drawing/2010/main" w="9525">
                   <a:solidFill>
                     <a:srgbClr val="000000"/>
@@ -31327,7 +31372,7 @@
               <a:noFill/>
             </a:ln>
             <a:extLst>
-              <a:ext uri="{91240B29-F687-4f45-9708-019B960494DF}">
+              <a:ext uri="{91240B29-F687-4F45-9708-019B960494DF}">
                 <a14:hiddenLine xmlns:a14="http://schemas.microsoft.com/office/drawing/2010/main" w="9525">
                   <a:solidFill>
                     <a:srgbClr val="000000"/>
@@ -31417,7 +31462,7 @@
               <a:noFill/>
             </a:ln>
             <a:extLst>
-              <a:ext uri="{91240B29-F687-4f45-9708-019B960494DF}">
+              <a:ext uri="{91240B29-F687-4F45-9708-019B960494DF}">
                 <a14:hiddenLine xmlns:a14="http://schemas.microsoft.com/office/drawing/2010/main" w="9525">
                   <a:solidFill>
                     <a:srgbClr val="000000"/>
@@ -31479,7 +31524,7 @@
               <a:noFill/>
             </a:ln>
             <a:extLst>
-              <a:ext uri="{91240B29-F687-4f45-9708-019B960494DF}">
+              <a:ext uri="{91240B29-F687-4F45-9708-019B960494DF}">
                 <a14:hiddenLine xmlns:a14="http://schemas.microsoft.com/office/drawing/2010/main" w="9525">
                   <a:solidFill>
                     <a:srgbClr val="000000"/>
@@ -31569,7 +31614,7 @@
               <a:noFill/>
             </a:ln>
             <a:extLst>
-              <a:ext uri="{91240B29-F687-4f45-9708-019B960494DF}">
+              <a:ext uri="{91240B29-F687-4F45-9708-019B960494DF}">
                 <a14:hiddenLine xmlns:a14="http://schemas.microsoft.com/office/drawing/2010/main" w="9525">
                   <a:solidFill>
                     <a:srgbClr val="000000"/>
@@ -31631,7 +31676,7 @@
               <a:noFill/>
             </a:ln>
             <a:extLst>
-              <a:ext uri="{91240B29-F687-4f45-9708-019B960494DF}">
+              <a:ext uri="{91240B29-F687-4F45-9708-019B960494DF}">
                 <a14:hiddenLine xmlns:a14="http://schemas.microsoft.com/office/drawing/2010/main" w="9525">
                   <a:solidFill>
                     <a:srgbClr val="000000"/>
@@ -31721,7 +31766,7 @@
               <a:noFill/>
             </a:ln>
             <a:extLst>
-              <a:ext uri="{91240B29-F687-4f45-9708-019B960494DF}">
+              <a:ext uri="{91240B29-F687-4F45-9708-019B960494DF}">
                 <a14:hiddenLine xmlns:a14="http://schemas.microsoft.com/office/drawing/2010/main" w="9525">
                   <a:solidFill>
                     <a:srgbClr val="000000"/>
@@ -31755,7 +31800,7 @@
               <a:noFill/>
             </a:ln>
             <a:extLst>
-              <a:ext uri="{91240B29-F687-4f45-9708-019B960494DF}">
+              <a:ext uri="{91240B29-F687-4F45-9708-019B960494DF}">
                 <a14:hiddenLine xmlns:a14="http://schemas.microsoft.com/office/drawing/2010/main" w="9525">
                   <a:solidFill>
                     <a:srgbClr val="000000"/>
@@ -31820,7 +31865,7 @@
               <a:noFill/>
             </a:ln>
             <a:extLst>
-              <a:ext uri="{91240B29-F687-4f45-9708-019B960494DF}">
+              <a:ext uri="{91240B29-F687-4F45-9708-019B960494DF}">
                 <a14:hiddenLine xmlns:a14="http://schemas.microsoft.com/office/drawing/2010/main" w="9525">
                   <a:solidFill>
                     <a:srgbClr val="000000"/>
@@ -31910,7 +31955,7 @@
               <a:noFill/>
             </a:ln>
             <a:extLst>
-              <a:ext uri="{91240B29-F687-4f45-9708-019B960494DF}">
+              <a:ext uri="{91240B29-F687-4F45-9708-019B960494DF}">
                 <a14:hiddenLine xmlns:a14="http://schemas.microsoft.com/office/drawing/2010/main" w="9525">
                   <a:solidFill>
                     <a:srgbClr val="000000"/>
@@ -31972,7 +32017,7 @@
               <a:noFill/>
             </a:ln>
             <a:extLst>
-              <a:ext uri="{91240B29-F687-4f45-9708-019B960494DF}">
+              <a:ext uri="{91240B29-F687-4F45-9708-019B960494DF}">
                 <a14:hiddenLine xmlns:a14="http://schemas.microsoft.com/office/drawing/2010/main" w="9525">
                   <a:solidFill>
                     <a:srgbClr val="000000"/>
@@ -32062,7 +32107,7 @@
               <a:noFill/>
             </a:ln>
             <a:extLst>
-              <a:ext uri="{91240B29-F687-4f45-9708-019B960494DF}">
+              <a:ext uri="{91240B29-F687-4F45-9708-019B960494DF}">
                 <a14:hiddenLine xmlns:a14="http://schemas.microsoft.com/office/drawing/2010/main" w="9525">
                   <a:solidFill>
                     <a:srgbClr val="000000"/>
@@ -32152,7 +32197,7 @@
               <a:noFill/>
             </a:ln>
             <a:extLst>
-              <a:ext uri="{91240B29-F687-4f45-9708-019B960494DF}">
+              <a:ext uri="{91240B29-F687-4F45-9708-019B960494DF}">
                 <a14:hiddenLine xmlns:a14="http://schemas.microsoft.com/office/drawing/2010/main" w="9525">
                   <a:solidFill>
                     <a:srgbClr val="000000"/>
@@ -32217,7 +32262,7 @@
               <a:noFill/>
             </a:ln>
             <a:extLst>
-              <a:ext uri="{91240B29-F687-4f45-9708-019B960494DF}">
+              <a:ext uri="{91240B29-F687-4F45-9708-019B960494DF}">
                 <a14:hiddenLine xmlns:a14="http://schemas.microsoft.com/office/drawing/2010/main" w="9525">
                   <a:solidFill>
                     <a:srgbClr val="000000"/>
@@ -32279,7 +32324,7 @@
               <a:noFill/>
             </a:ln>
             <a:extLst>
-              <a:ext uri="{91240B29-F687-4f45-9708-019B960494DF}">
+              <a:ext uri="{91240B29-F687-4F45-9708-019B960494DF}">
                 <a14:hiddenLine xmlns:a14="http://schemas.microsoft.com/office/drawing/2010/main" w="9525">
                   <a:solidFill>
                     <a:srgbClr val="000000"/>
@@ -32369,7 +32414,7 @@
               <a:noFill/>
             </a:ln>
             <a:extLst>
-              <a:ext uri="{91240B29-F687-4f45-9708-019B960494DF}">
+              <a:ext uri="{91240B29-F687-4F45-9708-019B960494DF}">
                 <a14:hiddenLine xmlns:a14="http://schemas.microsoft.com/office/drawing/2010/main" w="9525">
                   <a:solidFill>
                     <a:srgbClr val="000000"/>
@@ -32459,7 +32504,7 @@
               <a:noFill/>
             </a:ln>
             <a:extLst>
-              <a:ext uri="{91240B29-F687-4f45-9708-019B960494DF}">
+              <a:ext uri="{91240B29-F687-4F45-9708-019B960494DF}">
                 <a14:hiddenLine xmlns:a14="http://schemas.microsoft.com/office/drawing/2010/main" w="9525">
                   <a:solidFill>
                     <a:srgbClr val="000000"/>
@@ -32521,7 +32566,7 @@
               <a:noFill/>
             </a:ln>
             <a:extLst>
-              <a:ext uri="{91240B29-F687-4f45-9708-019B960494DF}">
+              <a:ext uri="{91240B29-F687-4F45-9708-019B960494DF}">
                 <a14:hiddenLine xmlns:a14="http://schemas.microsoft.com/office/drawing/2010/main" w="9525">
                   <a:solidFill>
                     <a:srgbClr val="000000"/>
@@ -32641,7 +32686,7 @@
               <a:noFill/>
             </a:ln>
             <a:extLst>
-              <a:ext uri="{91240B29-F687-4f45-9708-019B960494DF}">
+              <a:ext uri="{91240B29-F687-4F45-9708-019B960494DF}">
                 <a14:hiddenLine xmlns:a14="http://schemas.microsoft.com/office/drawing/2010/main" w="9525">
                   <a:solidFill>
                     <a:srgbClr val="000000"/>
@@ -32709,7 +32754,7 @@
               <a:noFill/>
             </a:ln>
             <a:extLst>
-              <a:ext uri="{91240B29-F687-4f45-9708-019B960494DF}">
+              <a:ext uri="{91240B29-F687-4F45-9708-019B960494DF}">
                 <a14:hiddenLine xmlns:a14="http://schemas.microsoft.com/office/drawing/2010/main" w="9525">
                   <a:solidFill>
                     <a:srgbClr val="000000"/>
@@ -32799,7 +32844,7 @@
               <a:noFill/>
             </a:ln>
             <a:extLst>
-              <a:ext uri="{91240B29-F687-4f45-9708-019B960494DF}">
+              <a:ext uri="{91240B29-F687-4F45-9708-019B960494DF}">
                 <a14:hiddenLine xmlns:a14="http://schemas.microsoft.com/office/drawing/2010/main" w="9525">
                   <a:solidFill>
                     <a:srgbClr val="000000"/>
@@ -32940,7 +32985,7 @@
           <a:p>
             <a:fld id="{48A87A34-81AB-432B-8DAE-1953F412C126}" type="datetimeFigureOut">
               <a:rPr lang="en-US" smtClean="0"/>
-              <a:t>5/6/13</a:t>
+              <a:t>5/6/2013</a:t>
             </a:fld>
             <a:endParaRPr lang="en-US" dirty="0"/>
           </a:p>
@@ -33207,7 +33252,7 @@
           <a:p>
             <a:fld id="{48A87A34-81AB-432B-8DAE-1953F412C126}" type="datetimeFigureOut">
               <a:rPr lang="en-US" smtClean="0"/>
-              <a:t>5/6/13</a:t>
+              <a:t>5/6/2013</a:t>
             </a:fld>
             <a:endParaRPr lang="en-US" dirty="0"/>
           </a:p>
@@ -33403,7 +33448,7 @@
           <a:p>
             <a:fld id="{48A87A34-81AB-432B-8DAE-1953F412C126}" type="datetimeFigureOut">
               <a:rPr lang="en-US" smtClean="0"/>
-              <a:t>5/6/13</a:t>
+              <a:t>5/6/2013</a:t>
             </a:fld>
             <a:endParaRPr lang="en-US" dirty="0"/>
           </a:p>
@@ -33666,7 +33711,7 @@
           <a:p>
             <a:fld id="{48A87A34-81AB-432B-8DAE-1953F412C126}" type="datetimeFigureOut">
               <a:rPr lang="en-US" smtClean="0"/>
-              <a:t>5/6/13</a:t>
+              <a:t>5/6/2013</a:t>
             </a:fld>
             <a:endParaRPr lang="en-US" dirty="0"/>
           </a:p>
@@ -34100,7 +34145,7 @@
           <a:p>
             <a:fld id="{48A87A34-81AB-432B-8DAE-1953F412C126}" type="datetimeFigureOut">
               <a:rPr lang="en-US" smtClean="0"/>
-              <a:t>5/6/13</a:t>
+              <a:t>5/6/2013</a:t>
             </a:fld>
             <a:endParaRPr lang="en-US" dirty="0"/>
           </a:p>
@@ -34646,7 +34691,7 @@
           <a:p>
             <a:fld id="{48A87A34-81AB-432B-8DAE-1953F412C126}" type="datetimeFigureOut">
               <a:rPr lang="en-US" smtClean="0"/>
-              <a:t>5/6/13</a:t>
+              <a:t>5/6/2013</a:t>
             </a:fld>
             <a:endParaRPr lang="en-US" dirty="0"/>
           </a:p>
@@ -35366,7 +35411,7 @@
           <a:p>
             <a:fld id="{48A87A34-81AB-432B-8DAE-1953F412C126}" type="datetimeFigureOut">
               <a:rPr lang="en-US" smtClean="0"/>
-              <a:t>5/6/13</a:t>
+              <a:t>5/6/2013</a:t>
             </a:fld>
             <a:endParaRPr lang="en-US" dirty="0"/>
           </a:p>
@@ -35536,7 +35581,7 @@
           <a:p>
             <a:fld id="{48A87A34-81AB-432B-8DAE-1953F412C126}" type="datetimeFigureOut">
               <a:rPr lang="en-US" smtClean="0"/>
-              <a:t>5/6/13</a:t>
+              <a:t>5/6/2013</a:t>
             </a:fld>
             <a:endParaRPr lang="en-US" dirty="0"/>
           </a:p>
@@ -35716,7 +35761,7 @@
           <a:p>
             <a:fld id="{48A87A34-81AB-432B-8DAE-1953F412C126}" type="datetimeFigureOut">
               <a:rPr lang="en-US" smtClean="0"/>
-              <a:t>5/6/13</a:t>
+              <a:t>5/6/2013</a:t>
             </a:fld>
             <a:endParaRPr lang="en-US" dirty="0"/>
           </a:p>
@@ -35886,7 +35931,7 @@
           <a:p>
             <a:fld id="{48A87A34-81AB-432B-8DAE-1953F412C126}" type="datetimeFigureOut">
               <a:rPr lang="en-US" smtClean="0"/>
-              <a:t>5/6/13</a:t>
+              <a:t>5/6/2013</a:t>
             </a:fld>
             <a:endParaRPr lang="en-US" dirty="0"/>
           </a:p>
@@ -36136,7 +36181,7 @@
           <a:p>
             <a:fld id="{48A87A34-81AB-432B-8DAE-1953F412C126}" type="datetimeFigureOut">
               <a:rPr lang="en-US" smtClean="0"/>
-              <a:t>5/6/13</a:t>
+              <a:t>5/6/2013</a:t>
             </a:fld>
             <a:endParaRPr lang="en-US" dirty="0"/>
           </a:p>
@@ -36368,7 +36413,7 @@
           <a:p>
             <a:fld id="{48A87A34-81AB-432B-8DAE-1953F412C126}" type="datetimeFigureOut">
               <a:rPr lang="en-US" smtClean="0"/>
-              <a:t>5/6/13</a:t>
+              <a:t>5/6/2013</a:t>
             </a:fld>
             <a:endParaRPr lang="en-US" dirty="0"/>
           </a:p>
@@ -36749,7 +36794,7 @@
           <a:p>
             <a:fld id="{48A87A34-81AB-432B-8DAE-1953F412C126}" type="datetimeFigureOut">
               <a:rPr lang="en-US" smtClean="0"/>
-              <a:t>5/6/13</a:t>
+              <a:t>5/6/2013</a:t>
             </a:fld>
             <a:endParaRPr lang="en-US" dirty="0"/>
           </a:p>
@@ -36867,7 +36912,7 @@
           <a:p>
             <a:fld id="{48A87A34-81AB-432B-8DAE-1953F412C126}" type="datetimeFigureOut">
               <a:rPr lang="en-US" smtClean="0"/>
-              <a:t>5/6/13</a:t>
+              <a:t>5/6/2013</a:t>
             </a:fld>
             <a:endParaRPr lang="en-US" dirty="0"/>
           </a:p>
@@ -36962,7 +37007,7 @@
           <a:p>
             <a:fld id="{48A87A34-81AB-432B-8DAE-1953F412C126}" type="datetimeFigureOut">
               <a:rPr lang="en-US" smtClean="0"/>
-              <a:t>5/6/13</a:t>
+              <a:t>5/6/2013</a:t>
             </a:fld>
             <a:endParaRPr lang="en-US" dirty="0"/>
           </a:p>
@@ -37211,7 +37256,7 @@
           <a:p>
             <a:fld id="{48A87A34-81AB-432B-8DAE-1953F412C126}" type="datetimeFigureOut">
               <a:rPr lang="en-US" smtClean="0"/>
-              <a:t>5/6/13</a:t>
+              <a:t>5/6/2013</a:t>
             </a:fld>
             <a:endParaRPr lang="en-US" dirty="0"/>
           </a:p>
@@ -37491,7 +37536,7 @@
           <a:p>
             <a:fld id="{48A87A34-81AB-432B-8DAE-1953F412C126}" type="datetimeFigureOut">
               <a:rPr lang="en-US" smtClean="0"/>
-              <a:t>5/6/13</a:t>
+              <a:t>5/6/2013</a:t>
             </a:fld>
             <a:endParaRPr lang="en-US" dirty="0"/>
           </a:p>
@@ -37613,7 +37658,7 @@
           </a:prstGeom>
           <a:noFill/>
           <a:extLst>
-            <a:ext uri="{909E8E84-426E-40dd-AFC4-6F175D3DCCD1}">
+            <a:ext uri="{909E8E84-426E-40DD-AFC4-6F175D3DCCD1}">
               <a14:hiddenFill xmlns:a14="http://schemas.microsoft.com/office/drawing/2010/main">
                 <a:solidFill>
                   <a:srgbClr val="FFFFFF"/>
@@ -37687,7 +37732,7 @@
                 <a:noFill/>
               </a:ln>
               <a:extLst>
-                <a:ext uri="{91240B29-F687-4f45-9708-019B960494DF}">
+                <a:ext uri="{91240B29-F687-4F45-9708-019B960494DF}">
                   <a14:hiddenLine xmlns:a14="http://schemas.microsoft.com/office/drawing/2010/main" w="9525">
                     <a:solidFill>
                       <a:srgbClr val="000000"/>
@@ -37777,7 +37822,7 @@
                 <a:noFill/>
               </a:ln>
               <a:extLst>
-                <a:ext uri="{91240B29-F687-4f45-9708-019B960494DF}">
+                <a:ext uri="{91240B29-F687-4F45-9708-019B960494DF}">
                   <a14:hiddenLine xmlns:a14="http://schemas.microsoft.com/office/drawing/2010/main" w="9525">
                     <a:solidFill>
                       <a:srgbClr val="000000"/>
@@ -37867,7 +37912,7 @@
                 <a:noFill/>
               </a:ln>
               <a:extLst>
-                <a:ext uri="{91240B29-F687-4f45-9708-019B960494DF}">
+                <a:ext uri="{91240B29-F687-4F45-9708-019B960494DF}">
                   <a14:hiddenLine xmlns:a14="http://schemas.microsoft.com/office/drawing/2010/main" w="9525">
                     <a:solidFill>
                       <a:srgbClr val="000000"/>
@@ -37929,7 +37974,7 @@
                 <a:noFill/>
               </a:ln>
               <a:extLst>
-                <a:ext uri="{91240B29-F687-4f45-9708-019B960494DF}">
+                <a:ext uri="{91240B29-F687-4F45-9708-019B960494DF}">
                   <a14:hiddenLine xmlns:a14="http://schemas.microsoft.com/office/drawing/2010/main" w="9525">
                     <a:solidFill>
                       <a:srgbClr val="000000"/>
@@ -38019,7 +38064,7 @@
                 <a:noFill/>
               </a:ln>
               <a:extLst>
-                <a:ext uri="{91240B29-F687-4f45-9708-019B960494DF}">
+                <a:ext uri="{91240B29-F687-4F45-9708-019B960494DF}">
                   <a14:hiddenLine xmlns:a14="http://schemas.microsoft.com/office/drawing/2010/main" w="9525">
                     <a:solidFill>
                       <a:srgbClr val="000000"/>
@@ -38081,7 +38126,7 @@
                 <a:noFill/>
               </a:ln>
               <a:extLst>
-                <a:ext uri="{91240B29-F687-4f45-9708-019B960494DF}">
+                <a:ext uri="{91240B29-F687-4F45-9708-019B960494DF}">
                   <a14:hiddenLine xmlns:a14="http://schemas.microsoft.com/office/drawing/2010/main" w="9525">
                     <a:solidFill>
                       <a:srgbClr val="000000"/>
@@ -38143,7 +38188,7 @@
                 <a:noFill/>
               </a:ln>
               <a:extLst>
-                <a:ext uri="{91240B29-F687-4f45-9708-019B960494DF}">
+                <a:ext uri="{91240B29-F687-4F45-9708-019B960494DF}">
                   <a14:hiddenLine xmlns:a14="http://schemas.microsoft.com/office/drawing/2010/main" w="9525">
                     <a:solidFill>
                       <a:srgbClr val="000000"/>
@@ -38233,7 +38278,7 @@
                 <a:noFill/>
               </a:ln>
               <a:extLst>
-                <a:ext uri="{91240B29-F687-4f45-9708-019B960494DF}">
+                <a:ext uri="{91240B29-F687-4F45-9708-019B960494DF}">
                   <a14:hiddenLine xmlns:a14="http://schemas.microsoft.com/office/drawing/2010/main" w="9525">
                     <a:solidFill>
                       <a:srgbClr val="000000"/>
@@ -38323,7 +38368,7 @@
                 <a:noFill/>
               </a:ln>
               <a:extLst>
-                <a:ext uri="{91240B29-F687-4f45-9708-019B960494DF}">
+                <a:ext uri="{91240B29-F687-4F45-9708-019B960494DF}">
                   <a14:hiddenLine xmlns:a14="http://schemas.microsoft.com/office/drawing/2010/main" w="9525">
                     <a:solidFill>
                       <a:srgbClr val="000000"/>
@@ -38385,7 +38430,7 @@
                 <a:noFill/>
               </a:ln>
               <a:extLst>
-                <a:ext uri="{91240B29-F687-4f45-9708-019B960494DF}">
+                <a:ext uri="{91240B29-F687-4F45-9708-019B960494DF}">
                   <a14:hiddenLine xmlns:a14="http://schemas.microsoft.com/office/drawing/2010/main" w="9525">
                     <a:solidFill>
                       <a:srgbClr val="000000"/>
@@ -38495,7 +38540,7 @@
                 <a:noFill/>
               </a:ln>
               <a:extLst>
-                <a:ext uri="{91240B29-F687-4f45-9708-019B960494DF}">
+                <a:ext uri="{91240B29-F687-4F45-9708-019B960494DF}">
                   <a14:hiddenLine xmlns:a14="http://schemas.microsoft.com/office/drawing/2010/main" w="9525">
                     <a:solidFill>
                       <a:srgbClr val="000000"/>
@@ -38579,7 +38624,7 @@
                 <a:noFill/>
               </a:ln>
               <a:extLst>
-                <a:ext uri="{91240B29-F687-4f45-9708-019B960494DF}">
+                <a:ext uri="{91240B29-F687-4F45-9708-019B960494DF}">
                   <a14:hiddenLine xmlns:a14="http://schemas.microsoft.com/office/drawing/2010/main" w="9525">
                     <a:solidFill>
                       <a:srgbClr val="000000"/>
@@ -38641,7 +38686,7 @@
                 <a:noFill/>
               </a:ln>
               <a:extLst>
-                <a:ext uri="{91240B29-F687-4f45-9708-019B960494DF}">
+                <a:ext uri="{91240B29-F687-4F45-9708-019B960494DF}">
                   <a14:hiddenLine xmlns:a14="http://schemas.microsoft.com/office/drawing/2010/main" w="9525">
                     <a:solidFill>
                       <a:srgbClr val="000000"/>
@@ -38703,7 +38748,7 @@
                 <a:noFill/>
               </a:ln>
               <a:extLst>
-                <a:ext uri="{91240B29-F687-4f45-9708-019B960494DF}">
+                <a:ext uri="{91240B29-F687-4F45-9708-019B960494DF}">
                   <a14:hiddenLine xmlns:a14="http://schemas.microsoft.com/office/drawing/2010/main" w="9525">
                     <a:solidFill>
                       <a:srgbClr val="000000"/>
@@ -38793,7 +38838,7 @@
                 <a:noFill/>
               </a:ln>
               <a:extLst>
-                <a:ext uri="{91240B29-F687-4f45-9708-019B960494DF}">
+                <a:ext uri="{91240B29-F687-4F45-9708-019B960494DF}">
                   <a14:hiddenLine xmlns:a14="http://schemas.microsoft.com/office/drawing/2010/main" w="9525">
                     <a:solidFill>
                       <a:srgbClr val="000000"/>
@@ -38827,7 +38872,7 @@
                 <a:noFill/>
               </a:ln>
               <a:extLst>
-                <a:ext uri="{91240B29-F687-4f45-9708-019B960494DF}">
+                <a:ext uri="{91240B29-F687-4F45-9708-019B960494DF}">
                   <a14:hiddenLine xmlns:a14="http://schemas.microsoft.com/office/drawing/2010/main" w="9525">
                     <a:solidFill>
                       <a:srgbClr val="000000"/>
@@ -38892,7 +38937,7 @@
                 <a:noFill/>
               </a:ln>
               <a:extLst>
-                <a:ext uri="{91240B29-F687-4f45-9708-019B960494DF}">
+                <a:ext uri="{91240B29-F687-4F45-9708-019B960494DF}">
                   <a14:hiddenLine xmlns:a14="http://schemas.microsoft.com/office/drawing/2010/main" w="9525">
                     <a:solidFill>
                       <a:srgbClr val="000000"/>
@@ -38982,7 +39027,7 @@
                 <a:noFill/>
               </a:ln>
               <a:extLst>
-                <a:ext uri="{91240B29-F687-4f45-9708-019B960494DF}">
+                <a:ext uri="{91240B29-F687-4F45-9708-019B960494DF}">
                   <a14:hiddenLine xmlns:a14="http://schemas.microsoft.com/office/drawing/2010/main" w="9525">
                     <a:solidFill>
                       <a:srgbClr val="000000"/>
@@ -39044,7 +39089,7 @@
                 <a:noFill/>
               </a:ln>
               <a:extLst>
-                <a:ext uri="{91240B29-F687-4f45-9708-019B960494DF}">
+                <a:ext uri="{91240B29-F687-4F45-9708-019B960494DF}">
                   <a14:hiddenLine xmlns:a14="http://schemas.microsoft.com/office/drawing/2010/main" w="9525">
                     <a:solidFill>
                       <a:srgbClr val="000000"/>
@@ -39134,7 +39179,7 @@
                 <a:noFill/>
               </a:ln>
               <a:extLst>
-                <a:ext uri="{91240B29-F687-4f45-9708-019B960494DF}">
+                <a:ext uri="{91240B29-F687-4F45-9708-019B960494DF}">
                   <a14:hiddenLine xmlns:a14="http://schemas.microsoft.com/office/drawing/2010/main" w="9525">
                     <a:solidFill>
                       <a:srgbClr val="000000"/>
@@ -39199,7 +39244,7 @@
                 <a:noFill/>
               </a:ln>
               <a:extLst>
-                <a:ext uri="{91240B29-F687-4f45-9708-019B960494DF}">
+                <a:ext uri="{91240B29-F687-4F45-9708-019B960494DF}">
                   <a14:hiddenLine xmlns:a14="http://schemas.microsoft.com/office/drawing/2010/main" w="9525">
                     <a:solidFill>
                       <a:srgbClr val="000000"/>
@@ -39261,7 +39306,7 @@
                 <a:noFill/>
               </a:ln>
               <a:extLst>
-                <a:ext uri="{91240B29-F687-4f45-9708-019B960494DF}">
+                <a:ext uri="{91240B29-F687-4F45-9708-019B960494DF}">
                   <a14:hiddenLine xmlns:a14="http://schemas.microsoft.com/office/drawing/2010/main" w="9525">
                     <a:solidFill>
                       <a:srgbClr val="000000"/>
@@ -39351,7 +39396,7 @@
                 <a:noFill/>
               </a:ln>
               <a:extLst>
-                <a:ext uri="{91240B29-F687-4f45-9708-019B960494DF}">
+                <a:ext uri="{91240B29-F687-4F45-9708-019B960494DF}">
                   <a14:hiddenLine xmlns:a14="http://schemas.microsoft.com/office/drawing/2010/main" w="9525">
                     <a:solidFill>
                       <a:srgbClr val="000000"/>
@@ -39441,7 +39486,7 @@
                 <a:noFill/>
               </a:ln>
               <a:extLst>
-                <a:ext uri="{91240B29-F687-4f45-9708-019B960494DF}">
+                <a:ext uri="{91240B29-F687-4F45-9708-019B960494DF}">
                   <a14:hiddenLine xmlns:a14="http://schemas.microsoft.com/office/drawing/2010/main" w="9525">
                     <a:solidFill>
                       <a:srgbClr val="000000"/>
@@ -39506,7 +39551,7 @@
                 <a:noFill/>
               </a:ln>
               <a:extLst>
-                <a:ext uri="{91240B29-F687-4f45-9708-019B960494DF}">
+                <a:ext uri="{91240B29-F687-4F45-9708-019B960494DF}">
                   <a14:hiddenLine xmlns:a14="http://schemas.microsoft.com/office/drawing/2010/main" w="9525">
                     <a:solidFill>
                       <a:srgbClr val="000000"/>
@@ -39626,7 +39671,7 @@
                 <a:noFill/>
               </a:ln>
               <a:extLst>
-                <a:ext uri="{91240B29-F687-4f45-9708-019B960494DF}">
+                <a:ext uri="{91240B29-F687-4F45-9708-019B960494DF}">
                   <a14:hiddenLine xmlns:a14="http://schemas.microsoft.com/office/drawing/2010/main" w="9525">
                     <a:solidFill>
                       <a:srgbClr val="000000"/>
@@ -39707,7 +39752,7 @@
                 <a:noFill/>
               </a:ln>
               <a:extLst>
-                <a:ext uri="{91240B29-F687-4f45-9708-019B960494DF}">
+                <a:ext uri="{91240B29-F687-4F45-9708-019B960494DF}">
                   <a14:hiddenLine xmlns:a14="http://schemas.microsoft.com/office/drawing/2010/main" w="9525">
                     <a:solidFill>
                       <a:srgbClr val="000000"/>
@@ -39822,7 +39867,7 @@
                 <a:noFill/>
               </a:ln>
               <a:extLst>
-                <a:ext uri="{91240B29-F687-4f45-9708-019B960494DF}">
+                <a:ext uri="{91240B29-F687-4F45-9708-019B960494DF}">
                   <a14:hiddenLine xmlns:a14="http://schemas.microsoft.com/office/drawing/2010/main" w="9525">
                     <a:solidFill>
                       <a:srgbClr val="000000"/>
@@ -39912,7 +39957,7 @@
                 <a:noFill/>
               </a:ln>
               <a:extLst>
-                <a:ext uri="{91240B29-F687-4f45-9708-019B960494DF}">
+                <a:ext uri="{91240B29-F687-4F45-9708-019B960494DF}">
                   <a14:hiddenLine xmlns:a14="http://schemas.microsoft.com/office/drawing/2010/main" w="9525">
                     <a:solidFill>
                       <a:srgbClr val="000000"/>
@@ -39977,7 +40022,7 @@
                 <a:noFill/>
               </a:ln>
               <a:extLst>
-                <a:ext uri="{91240B29-F687-4f45-9708-019B960494DF}">
+                <a:ext uri="{91240B29-F687-4F45-9708-019B960494DF}">
                   <a14:hiddenLine xmlns:a14="http://schemas.microsoft.com/office/drawing/2010/main" w="9525">
                     <a:solidFill>
                       <a:srgbClr val="000000"/>
@@ -40067,7 +40112,7 @@
                 <a:noFill/>
               </a:ln>
               <a:extLst>
-                <a:ext uri="{91240B29-F687-4f45-9708-019B960494DF}">
+                <a:ext uri="{91240B29-F687-4F45-9708-019B960494DF}">
                   <a14:hiddenLine xmlns:a14="http://schemas.microsoft.com/office/drawing/2010/main" w="9525">
                     <a:solidFill>
                       <a:srgbClr val="000000"/>
@@ -40135,7 +40180,7 @@
                 <a:noFill/>
               </a:ln>
               <a:extLst>
-                <a:ext uri="{91240B29-F687-4f45-9708-019B960494DF}">
+                <a:ext uri="{91240B29-F687-4F45-9708-019B960494DF}">
                   <a14:hiddenLine xmlns:a14="http://schemas.microsoft.com/office/drawing/2010/main" w="9525">
                     <a:solidFill>
                       <a:srgbClr val="000000"/>
@@ -40225,7 +40270,7 @@
                 <a:noFill/>
               </a:ln>
               <a:extLst>
-                <a:ext uri="{91240B29-F687-4f45-9708-019B960494DF}">
+                <a:ext uri="{91240B29-F687-4F45-9708-019B960494DF}">
                   <a14:hiddenLine xmlns:a14="http://schemas.microsoft.com/office/drawing/2010/main" w="9525">
                     <a:solidFill>
                       <a:srgbClr val="000000"/>
@@ -40293,7 +40338,7 @@
                 <a:noFill/>
               </a:ln>
               <a:extLst>
-                <a:ext uri="{91240B29-F687-4f45-9708-019B960494DF}">
+                <a:ext uri="{91240B29-F687-4F45-9708-019B960494DF}">
                   <a14:hiddenLine xmlns:a14="http://schemas.microsoft.com/office/drawing/2010/main" w="9525">
                     <a:solidFill>
                       <a:srgbClr val="000000"/>
@@ -40383,7 +40428,7 @@
                 <a:noFill/>
               </a:ln>
               <a:extLst>
-                <a:ext uri="{91240B29-F687-4f45-9708-019B960494DF}">
+                <a:ext uri="{91240B29-F687-4F45-9708-019B960494DF}">
                   <a14:hiddenLine xmlns:a14="http://schemas.microsoft.com/office/drawing/2010/main" w="9525">
                     <a:solidFill>
                       <a:srgbClr val="000000"/>
@@ -40417,7 +40462,7 @@
                 <a:noFill/>
               </a:ln>
               <a:extLst>
-                <a:ext uri="{91240B29-F687-4f45-9708-019B960494DF}">
+                <a:ext uri="{91240B29-F687-4F45-9708-019B960494DF}">
                   <a14:hiddenLine xmlns:a14="http://schemas.microsoft.com/office/drawing/2010/main" w="9525">
                     <a:solidFill>
                       <a:srgbClr val="000000"/>
@@ -40559,7 +40604,7 @@
             <a:fld id="{48A87A34-81AB-432B-8DAE-1953F412C126}" type="datetimeFigureOut">
               <a:rPr lang="en-US" smtClean="0"/>
               <a:pPr/>
-              <a:t>5/6/13</a:t>
+              <a:t>5/6/2013</a:t>
             </a:fld>
             <a:endParaRPr lang="en-US" dirty="0"/>
           </a:p>
@@ -41082,6 +41127,247 @@
           <a:p>
             <a:r>
               <a:rPr lang="en-US" dirty="0" smtClean="0"/>
+              <a:t>Cross-over is Not very effective</a:t>
+            </a:r>
+            <a:endParaRPr lang="en-US" dirty="0"/>
+          </a:p>
+        </p:txBody>
+      </p:sp>
+      <p:pic>
+        <p:nvPicPr>
+          <p:cNvPr id="5" name="Content Placeholder 4"/>
+          <p:cNvPicPr>
+            <a:picLocks noGrp="1" noChangeAspect="1"/>
+          </p:cNvPicPr>
+          <p:nvPr>
+            <p:ph sz="half" idx="1"/>
+          </p:nvPr>
+        </p:nvPicPr>
+        <p:blipFill>
+          <a:blip r:embed="rId2">
+            <a:extLst>
+              <a:ext uri="{28A0092B-C50C-407E-A947-70E740481C1C}">
+                <a14:useLocalDpi xmlns:a14="http://schemas.microsoft.com/office/drawing/2010/main" val="0"/>
+              </a:ext>
+            </a:extLst>
+          </a:blip>
+          <a:stretch>
+            <a:fillRect/>
+          </a:stretch>
+        </p:blipFill>
+        <p:spPr>
+          <a:xfrm>
+            <a:off x="3075962" y="2253241"/>
+            <a:ext cx="6040077" cy="3878619"/>
+          </a:xfrm>
+        </p:spPr>
+      </p:pic>
+    </p:spTree>
+    <p:extLst>
+      <p:ext uri="{BB962C8B-B14F-4D97-AF65-F5344CB8AC3E}">
+        <p14:creationId xmlns:p14="http://schemas.microsoft.com/office/powerpoint/2010/main" val="245483932"/>
+      </p:ext>
+    </p:extLst>
+  </p:cSld>
+  <p:clrMapOvr>
+    <a:masterClrMapping/>
+  </p:clrMapOvr>
+</p:sld>
+</file>
+
+<file path=ppt/slides/slide11.xml><?xml version="1.0" encoding="utf-8"?>
+<p:sld xmlns:a="http://schemas.openxmlformats.org/drawingml/2006/main" xmlns:r="http://schemas.openxmlformats.org/officeDocument/2006/relationships" xmlns:p="http://schemas.openxmlformats.org/presentationml/2006/main">
+  <p:cSld>
+    <p:spTree>
+      <p:nvGrpSpPr>
+        <p:cNvPr id="1" name=""/>
+        <p:cNvGrpSpPr/>
+        <p:nvPr/>
+      </p:nvGrpSpPr>
+      <p:grpSpPr>
+        <a:xfrm>
+          <a:off x="0" y="0"/>
+          <a:ext cx="0" cy="0"/>
+          <a:chOff x="0" y="0"/>
+          <a:chExt cx="0" cy="0"/>
+        </a:xfrm>
+      </p:grpSpPr>
+      <p:sp>
+        <p:nvSpPr>
+          <p:cNvPr id="2" name="Title 1"/>
+          <p:cNvSpPr>
+            <a:spLocks noGrp="1"/>
+          </p:cNvSpPr>
+          <p:nvPr>
+            <p:ph type="title"/>
+          </p:nvPr>
+        </p:nvSpPr>
+        <p:spPr/>
+        <p:txBody>
+          <a:bodyPr/>
+          <a:lstStyle/>
+          <a:p>
+            <a:r>
+              <a:rPr lang="en-US" dirty="0"/>
+              <a:t>Method 2 - Linear Transformations</a:t>
+            </a:r>
+          </a:p>
+        </p:txBody>
+      </p:sp>
+      <p:graphicFrame>
+        <p:nvGraphicFramePr>
+          <p:cNvPr id="4" name="Content Placeholder 3"/>
+          <p:cNvGraphicFramePr>
+            <a:graphicFrameLocks noGrp="1"/>
+          </p:cNvGraphicFramePr>
+          <p:nvPr>
+            <p:ph idx="1"/>
+            <p:extLst>
+              <p:ext uri="{D42A27DB-BD31-4B8C-83A1-F6EECF244321}">
+                <p14:modId xmlns:p14="http://schemas.microsoft.com/office/powerpoint/2010/main" val="2238619301"/>
+              </p:ext>
+            </p:extLst>
+          </p:nvPr>
+        </p:nvGraphicFramePr>
+        <p:xfrm>
+          <a:off x="1141413" y="2249488"/>
+          <a:ext cx="9906000" cy="3541712"/>
+        </p:xfrm>
+        <a:graphic>
+          <a:graphicData uri="http://schemas.openxmlformats.org/drawingml/2006/diagram">
+            <dgm:relIds xmlns:dgm="http://schemas.openxmlformats.org/drawingml/2006/diagram" xmlns:r="http://schemas.openxmlformats.org/officeDocument/2006/relationships" r:dm="rId2" r:lo="rId3" r:qs="rId4" r:cs="rId5"/>
+          </a:graphicData>
+        </a:graphic>
+      </p:graphicFrame>
+    </p:spTree>
+    <p:extLst>
+      <p:ext uri="{BB962C8B-B14F-4D97-AF65-F5344CB8AC3E}">
+        <p14:creationId xmlns:p14="http://schemas.microsoft.com/office/powerpoint/2010/main" val="4228261841"/>
+      </p:ext>
+    </p:extLst>
+  </p:cSld>
+  <p:clrMapOvr>
+    <a:masterClrMapping/>
+  </p:clrMapOvr>
+</p:sld>
+</file>
+
+<file path=ppt/slides/slide12.xml><?xml version="1.0" encoding="utf-8"?>
+<p:sld xmlns:a="http://schemas.openxmlformats.org/drawingml/2006/main" xmlns:r="http://schemas.openxmlformats.org/officeDocument/2006/relationships" xmlns:p="http://schemas.openxmlformats.org/presentationml/2006/main">
+  <p:cSld>
+    <p:spTree>
+      <p:nvGrpSpPr>
+        <p:cNvPr id="1" name=""/>
+        <p:cNvGrpSpPr/>
+        <p:nvPr/>
+      </p:nvGrpSpPr>
+      <p:grpSpPr>
+        <a:xfrm>
+          <a:off x="0" y="0"/>
+          <a:ext cx="0" cy="0"/>
+          <a:chOff x="0" y="0"/>
+          <a:chExt cx="0" cy="0"/>
+        </a:xfrm>
+      </p:grpSpPr>
+      <p:sp>
+        <p:nvSpPr>
+          <p:cNvPr id="2" name="Title 1"/>
+          <p:cNvSpPr>
+            <a:spLocks noGrp="1"/>
+          </p:cNvSpPr>
+          <p:nvPr>
+            <p:ph type="title"/>
+          </p:nvPr>
+        </p:nvSpPr>
+        <p:spPr/>
+        <p:txBody>
+          <a:bodyPr/>
+          <a:lstStyle/>
+          <a:p>
+            <a:r>
+              <a:rPr lang="en-US" dirty="0" smtClean="0"/>
+              <a:t>Much finer state exploration</a:t>
+            </a:r>
+            <a:endParaRPr lang="en-US" dirty="0"/>
+          </a:p>
+        </p:txBody>
+      </p:sp>
+      <p:pic>
+        <p:nvPicPr>
+          <p:cNvPr id="4" name="Content Placeholder 3"/>
+          <p:cNvPicPr>
+            <a:picLocks noGrp="1" noChangeAspect="1"/>
+          </p:cNvPicPr>
+          <p:nvPr>
+            <p:ph idx="1"/>
+          </p:nvPr>
+        </p:nvPicPr>
+        <p:blipFill>
+          <a:blip r:embed="rId2">
+            <a:extLst>
+              <a:ext uri="{28A0092B-C50C-407E-A947-70E740481C1C}">
+                <a14:useLocalDpi xmlns:a14="http://schemas.microsoft.com/office/drawing/2010/main" val="0"/>
+              </a:ext>
+            </a:extLst>
+          </a:blip>
+          <a:stretch>
+            <a:fillRect/>
+          </a:stretch>
+        </p:blipFill>
+        <p:spPr>
+          <a:xfrm>
+            <a:off x="3292289" y="1944821"/>
+            <a:ext cx="5607423" cy="4310552"/>
+          </a:xfrm>
+        </p:spPr>
+      </p:pic>
+    </p:spTree>
+    <p:extLst>
+      <p:ext uri="{BB962C8B-B14F-4D97-AF65-F5344CB8AC3E}">
+        <p14:creationId xmlns:p14="http://schemas.microsoft.com/office/powerpoint/2010/main" val="3219730001"/>
+      </p:ext>
+    </p:extLst>
+  </p:cSld>
+  <p:clrMapOvr>
+    <a:masterClrMapping/>
+  </p:clrMapOvr>
+</p:sld>
+</file>
+
+<file path=ppt/slides/slide13.xml><?xml version="1.0" encoding="utf-8"?>
+<p:sld xmlns:a="http://schemas.openxmlformats.org/drawingml/2006/main" xmlns:r="http://schemas.openxmlformats.org/officeDocument/2006/relationships" xmlns:p="http://schemas.openxmlformats.org/presentationml/2006/main">
+  <p:cSld>
+    <p:spTree>
+      <p:nvGrpSpPr>
+        <p:cNvPr id="1" name=""/>
+        <p:cNvGrpSpPr/>
+        <p:nvPr/>
+      </p:nvGrpSpPr>
+      <p:grpSpPr>
+        <a:xfrm>
+          <a:off x="0" y="0"/>
+          <a:ext cx="0" cy="0"/>
+          <a:chOff x="0" y="0"/>
+          <a:chExt cx="0" cy="0"/>
+        </a:xfrm>
+      </p:grpSpPr>
+      <p:sp>
+        <p:nvSpPr>
+          <p:cNvPr id="2" name="Title 1"/>
+          <p:cNvSpPr>
+            <a:spLocks noGrp="1"/>
+          </p:cNvSpPr>
+          <p:nvPr>
+            <p:ph type="title"/>
+          </p:nvPr>
+        </p:nvSpPr>
+        <p:spPr/>
+        <p:txBody>
+          <a:bodyPr/>
+          <a:lstStyle/>
+          <a:p>
+            <a:r>
+              <a:rPr lang="en-US" dirty="0" smtClean="0"/>
               <a:t>Results</a:t>
             </a:r>
             <a:endParaRPr lang="en-US" dirty="0"/>
@@ -41124,7 +41410,7 @@
 </p:sld>
 </file>
 
-<file path=ppt/slides/slide11.xml><?xml version="1.0" encoding="utf-8"?>
+<file path=ppt/slides/slide14.xml><?xml version="1.0" encoding="utf-8"?>
 <p:sld xmlns:a="http://schemas.openxmlformats.org/drawingml/2006/main" xmlns:r="http://schemas.openxmlformats.org/officeDocument/2006/relationships" xmlns:p="http://schemas.openxmlformats.org/presentationml/2006/main">
   <p:cSld>
     <p:spTree>
@@ -41202,7 +41488,7 @@
 </p:sld>
 </file>
 
-<file path=ppt/slides/slide12.xml><?xml version="1.0" encoding="utf-8"?>
+<file path=ppt/slides/slide15.xml><?xml version="1.0" encoding="utf-8"?>
 <p:sld xmlns:a="http://schemas.openxmlformats.org/drawingml/2006/main" xmlns:r="http://schemas.openxmlformats.org/officeDocument/2006/relationships" xmlns:p="http://schemas.openxmlformats.org/presentationml/2006/main">
   <p:cSld>
     <p:spTree>
@@ -41280,7 +41566,7 @@
 </p:sld>
 </file>
 
-<file path=ppt/slides/slide13.xml><?xml version="1.0" encoding="utf-8"?>
+<file path=ppt/slides/slide16.xml><?xml version="1.0" encoding="utf-8"?>
 <p:sld xmlns:a="http://schemas.openxmlformats.org/drawingml/2006/main" xmlns:r="http://schemas.openxmlformats.org/officeDocument/2006/relationships" xmlns:p="http://schemas.openxmlformats.org/presentationml/2006/main">
   <p:cSld>
     <p:spTree>
@@ -41925,14 +42211,14 @@
             </a:outerShdw>
           </a:effectLst>
           <a:extLst>
-            <a:ext uri="{909E8E84-426E-40dd-AFC4-6F175D3DCCD1}">
+            <a:ext uri="{909E8E84-426E-40DD-AFC4-6F175D3DCCD1}">
               <a14:hiddenFill xmlns:a14="http://schemas.microsoft.com/office/drawing/2010/main">
                 <a:solidFill>
                   <a:schemeClr val="accent1"/>
                 </a:solidFill>
               </a14:hiddenFill>
             </a:ext>
-            <a:ext uri="{91240B29-F687-4f45-9708-019B960494DF}">
+            <a:ext uri="{91240B29-F687-4F45-9708-019B960494DF}">
               <a14:hiddenLine xmlns:a14="http://schemas.microsoft.com/office/drawing/2010/main" w="9525">
                 <a:solidFill>
                   <a:schemeClr val="tx1"/>
@@ -42100,7 +42386,7 @@
       </p:grpSpPr>
       <p:sp>
         <p:nvSpPr>
-          <p:cNvPr id="2" name="Title 1"/>
+          <p:cNvPr id="4" name="Title 3"/>
           <p:cNvSpPr>
             <a:spLocks noGrp="1"/>
           </p:cNvSpPr>
@@ -42114,41 +42400,75 @@
           <a:lstStyle/>
           <a:p>
             <a:r>
-              <a:rPr lang="en-US" dirty="0"/>
-              <a:t>Method 2 - Linear Transformations</a:t>
+              <a:rPr lang="en-US" dirty="0" smtClean="0"/>
+              <a:t>But does this actually make sense?</a:t>
             </a:r>
+            <a:endParaRPr lang="en-US" dirty="0"/>
           </a:p>
         </p:txBody>
       </p:sp>
-      <p:graphicFrame>
-        <p:nvGraphicFramePr>
-          <p:cNvPr id="4" name="Content Placeholder 3"/>
-          <p:cNvGraphicFramePr>
-            <a:graphicFrameLocks noGrp="1"/>
-          </p:cNvGraphicFramePr>
+      <p:pic>
+        <p:nvPicPr>
+          <p:cNvPr id="7" name="Content Placeholder 6"/>
+          <p:cNvPicPr>
+            <a:picLocks noGrp="1" noChangeAspect="1"/>
+          </p:cNvPicPr>
           <p:nvPr>
-            <p:ph idx="1"/>
-            <p:extLst>
-              <p:ext uri="{D42A27DB-BD31-4B8C-83A1-F6EECF244321}">
-                <p14:modId xmlns:p14="http://schemas.microsoft.com/office/powerpoint/2010/main" val="2238619301"/>
-              </p:ext>
-            </p:extLst>
+            <p:ph sz="half" idx="1"/>
           </p:nvPr>
-        </p:nvGraphicFramePr>
-        <p:xfrm>
-          <a:off x="1141413" y="2249488"/>
-          <a:ext cx="9906000" cy="3541712"/>
-        </p:xfrm>
-        <a:graphic>
-          <a:graphicData uri="http://schemas.openxmlformats.org/drawingml/2006/diagram">
-            <dgm:relIds xmlns:dgm="http://schemas.openxmlformats.org/drawingml/2006/diagram" xmlns:r="http://schemas.openxmlformats.org/officeDocument/2006/relationships" r:dm="rId2" r:lo="rId3" r:qs="rId4" r:cs="rId5"/>
-          </a:graphicData>
-        </a:graphic>
-      </p:graphicFrame>
+        </p:nvPicPr>
+        <p:blipFill>
+          <a:blip r:embed="rId2">
+            <a:extLst>
+              <a:ext uri="{28A0092B-C50C-407E-A947-70E740481C1C}">
+                <a14:useLocalDpi xmlns:a14="http://schemas.microsoft.com/office/drawing/2010/main" val="0"/>
+              </a:ext>
+            </a:extLst>
+          </a:blip>
+          <a:stretch>
+            <a:fillRect/>
+          </a:stretch>
+        </p:blipFill>
+        <p:spPr>
+          <a:xfrm>
+            <a:off x="684512" y="1936376"/>
+            <a:ext cx="4910594" cy="3854178"/>
+          </a:xfrm>
+        </p:spPr>
+      </p:pic>
+      <p:pic>
+        <p:nvPicPr>
+          <p:cNvPr id="8" name="Content Placeholder 7"/>
+          <p:cNvPicPr>
+            <a:picLocks noGrp="1" noChangeAspect="1"/>
+          </p:cNvPicPr>
+          <p:nvPr>
+            <p:ph sz="half" idx="2"/>
+          </p:nvPr>
+        </p:nvPicPr>
+        <p:blipFill>
+          <a:blip r:embed="rId3">
+            <a:extLst>
+              <a:ext uri="{28A0092B-C50C-407E-A947-70E740481C1C}">
+                <a14:useLocalDpi xmlns:a14="http://schemas.microsoft.com/office/drawing/2010/main" val="0"/>
+              </a:ext>
+            </a:extLst>
+          </a:blip>
+          <a:stretch>
+            <a:fillRect/>
+          </a:stretch>
+        </p:blipFill>
+        <p:spPr>
+          <a:xfrm>
+            <a:off x="6279618" y="1842247"/>
+            <a:ext cx="5227871" cy="4053327"/>
+          </a:xfrm>
+        </p:spPr>
+      </p:pic>
     </p:spTree>
     <p:extLst>
       <p:ext uri="{BB962C8B-B14F-4D97-AF65-F5344CB8AC3E}">
-        <p14:creationId xmlns:p14="http://schemas.microsoft.com/office/powerpoint/2010/main" val="4228261841"/>
+        <p14:creationId xmlns:p14="http://schemas.microsoft.com/office/powerpoint/2010/main" val="3907965190"/>
       </p:ext>
     </p:extLst>
   </p:cSld>
@@ -42403,7 +42723,7 @@
   <a:extraClrSchemeLst/>
   <a:extLst>
     <a:ext uri="{05A4C25C-085E-4340-85A3-A5531E510DB2}">
-      <thm15:themeFamily xmlns:thm15="http://schemas.microsoft.com/office/thememl/2012/main" xmlns="" name="Circuit" id="{0AC2F7E7-15F5-431C-B2A2-456FE929F56C}" vid="{142578CA-DEC9-49C3-80AF-C113973CC9A9}"/>
+      <thm15:themeFamily xmlns="" xmlns:thm15="http://schemas.microsoft.com/office/thememl/2012/main" name="Circuit" id="{0AC2F7E7-15F5-431C-B2A2-456FE929F56C}" vid="{142578CA-DEC9-49C3-80AF-C113973CC9A9}"/>
     </a:ext>
   </a:extLst>
 </a:theme>

</xml_diff>

<commit_message>
Added preliminary results to PP
</commit_message>
<xml_diff>
--- a/presentation/Attribute Learning System Presentation.pptx
+++ b/presentation/Attribute Learning System Presentation.pptx
@@ -18,9 +18,11 @@
     <p:sldId id="272" r:id="rId12"/>
     <p:sldId id="277" r:id="rId13"/>
     <p:sldId id="264" r:id="rId14"/>
-    <p:sldId id="262" r:id="rId15"/>
-    <p:sldId id="274" r:id="rId16"/>
-    <p:sldId id="270" r:id="rId17"/>
+    <p:sldId id="279" r:id="rId15"/>
+    <p:sldId id="278" r:id="rId16"/>
+    <p:sldId id="262" r:id="rId17"/>
+    <p:sldId id="274" r:id="rId18"/>
+    <p:sldId id="270" r:id="rId19"/>
   </p:sldIdLst>
   <p:sldSz cx="12192000" cy="6858000"/>
   <p:notesSz cx="6858000" cy="9144000"/>
@@ -121,7 +123,7 @@
   </p:defaultTextStyle>
   <p:extLst>
     <p:ext uri="{EFAFB233-063F-42B5-8137-9DF3F51BA10A}">
-      <p15:sldGuideLst xmlns="" xmlns:p15="http://schemas.microsoft.com/office/powerpoint/2012/main">
+      <p15:sldGuideLst xmlns:p15="http://schemas.microsoft.com/office/powerpoint/2012/main" xmlns="">
         <p15:guide id="1" orient="horz" pos="2160">
           <p15:clr>
             <a:srgbClr val="A4A3A4"/>
@@ -9977,17 +9979,17 @@
     </dgm:pt>
   </dgm:ptLst>
   <dgm:cxnLst>
-    <dgm:cxn modelId="{AEF3B3B9-D627-6D4A-B214-406C9624D6CF}" srcId="{7E040981-7CE3-774D-8C6F-2BC906473FAB}" destId="{6783BD06-83D4-DB4E-9499-7C43E0AA64C7}" srcOrd="0" destOrd="0" parTransId="{134D0CC3-1D33-B64C-A21E-9AA946744840}" sibTransId="{B2C80D16-7558-B440-8ED6-DFBE7449FA42}"/>
-    <dgm:cxn modelId="{9CA9D8AF-64BE-E041-94C5-59282579C544}" srcId="{6783BD06-83D4-DB4E-9499-7C43E0AA64C7}" destId="{232535A5-43C3-7A4C-8182-5EE8E311AF2A}" srcOrd="0" destOrd="0" parTransId="{D7E2F479-3B62-C748-8407-A4526B702630}" sibTransId="{AA215D0C-6C5C-5C42-899F-8E61F52C0156}"/>
     <dgm:cxn modelId="{49609C54-9BFC-F045-AC5F-3B3A1D563C99}" type="presOf" srcId="{EFFA916E-4F76-8048-A184-2BBA466BB661}" destId="{828E74BE-A4CA-DA48-94AF-69667114393F}" srcOrd="0" destOrd="0" presId="urn:microsoft.com/office/officeart/2005/8/layout/vList2"/>
     <dgm:cxn modelId="{3290FC1D-15CD-314E-BE15-2FBF5BEAD6FD}" type="presOf" srcId="{232535A5-43C3-7A4C-8182-5EE8E311AF2A}" destId="{7F072C46-BF5C-E74A-BDBA-A2316FA1CE02}" srcOrd="0" destOrd="0" presId="urn:microsoft.com/office/officeart/2005/8/layout/vList2"/>
+    <dgm:cxn modelId="{878CBE81-C078-E64C-98BD-0336A78B9031}" type="presOf" srcId="{2F8811AE-3AB0-1648-A7CD-877961003617}" destId="{7F072C46-BF5C-E74A-BDBA-A2316FA1CE02}" srcOrd="0" destOrd="1" presId="urn:microsoft.com/office/officeart/2005/8/layout/vList2"/>
     <dgm:cxn modelId="{C8230DF7-9FAA-8145-954E-4DE18C6E5962}" srcId="{CFCF1C09-80B6-9D43-9C3D-1BC2C3E510C9}" destId="{EFFA916E-4F76-8048-A184-2BBA466BB661}" srcOrd="0" destOrd="0" parTransId="{F12842DE-315F-D443-AC85-990609EEC187}" sibTransId="{6436388D-8658-F147-8348-EA3DD289011D}"/>
-    <dgm:cxn modelId="{878CBE81-C078-E64C-98BD-0336A78B9031}" type="presOf" srcId="{2F8811AE-3AB0-1648-A7CD-877961003617}" destId="{7F072C46-BF5C-E74A-BDBA-A2316FA1CE02}" srcOrd="0" destOrd="1" presId="urn:microsoft.com/office/officeart/2005/8/layout/vList2"/>
+    <dgm:cxn modelId="{74FE3A4F-6393-3F40-869C-57BBD44AA112}" type="presOf" srcId="{7E040981-7CE3-774D-8C6F-2BC906473FAB}" destId="{636379C9-8B6B-A640-8821-6D45637590C2}" srcOrd="0" destOrd="0" presId="urn:microsoft.com/office/officeart/2005/8/layout/vList2"/>
+    <dgm:cxn modelId="{AEF3B3B9-D627-6D4A-B214-406C9624D6CF}" srcId="{7E040981-7CE3-774D-8C6F-2BC906473FAB}" destId="{6783BD06-83D4-DB4E-9499-7C43E0AA64C7}" srcOrd="0" destOrd="0" parTransId="{134D0CC3-1D33-B64C-A21E-9AA946744840}" sibTransId="{B2C80D16-7558-B440-8ED6-DFBE7449FA42}"/>
+    <dgm:cxn modelId="{F74B8BFB-6CB7-3144-8F7D-23014B4CF3D8}" type="presOf" srcId="{CFCF1C09-80B6-9D43-9C3D-1BC2C3E510C9}" destId="{2E506666-F2C7-594C-88A3-1989CAFB2CE9}" srcOrd="0" destOrd="0" presId="urn:microsoft.com/office/officeart/2005/8/layout/vList2"/>
+    <dgm:cxn modelId="{3C97EC6F-4544-624C-B51E-92D8D23E54F5}" srcId="{7E040981-7CE3-774D-8C6F-2BC906473FAB}" destId="{CFCF1C09-80B6-9D43-9C3D-1BC2C3E510C9}" srcOrd="1" destOrd="0" parTransId="{EBB1D5CB-3DDB-ED44-8722-1953E41A9E33}" sibTransId="{6FB62A41-4360-FA4C-B374-BB9ED8522367}"/>
     <dgm:cxn modelId="{93330E4C-0735-154C-B384-B86CC3BB6A40}" type="presOf" srcId="{6783BD06-83D4-DB4E-9499-7C43E0AA64C7}" destId="{F57962A2-0320-3D4F-B361-F11EAE206643}" srcOrd="0" destOrd="0" presId="urn:microsoft.com/office/officeart/2005/8/layout/vList2"/>
-    <dgm:cxn modelId="{F74B8BFB-6CB7-3144-8F7D-23014B4CF3D8}" type="presOf" srcId="{CFCF1C09-80B6-9D43-9C3D-1BC2C3E510C9}" destId="{2E506666-F2C7-594C-88A3-1989CAFB2CE9}" srcOrd="0" destOrd="0" presId="urn:microsoft.com/office/officeart/2005/8/layout/vList2"/>
     <dgm:cxn modelId="{53B1FC09-A894-454F-867A-510F9B7D2B89}" srcId="{6783BD06-83D4-DB4E-9499-7C43E0AA64C7}" destId="{2F8811AE-3AB0-1648-A7CD-877961003617}" srcOrd="1" destOrd="0" parTransId="{710D0221-55D0-6B40-BBFA-61AB8F210E01}" sibTransId="{7C95FB20-DBC0-2A47-8AB7-9BE78A187FDB}"/>
-    <dgm:cxn modelId="{74FE3A4F-6393-3F40-869C-57BBD44AA112}" type="presOf" srcId="{7E040981-7CE3-774D-8C6F-2BC906473FAB}" destId="{636379C9-8B6B-A640-8821-6D45637590C2}" srcOrd="0" destOrd="0" presId="urn:microsoft.com/office/officeart/2005/8/layout/vList2"/>
-    <dgm:cxn modelId="{3C97EC6F-4544-624C-B51E-92D8D23E54F5}" srcId="{7E040981-7CE3-774D-8C6F-2BC906473FAB}" destId="{CFCF1C09-80B6-9D43-9C3D-1BC2C3E510C9}" srcOrd="1" destOrd="0" parTransId="{EBB1D5CB-3DDB-ED44-8722-1953E41A9E33}" sibTransId="{6FB62A41-4360-FA4C-B374-BB9ED8522367}"/>
+    <dgm:cxn modelId="{9CA9D8AF-64BE-E041-94C5-59282579C544}" srcId="{6783BD06-83D4-DB4E-9499-7C43E0AA64C7}" destId="{232535A5-43C3-7A4C-8182-5EE8E311AF2A}" srcOrd="0" destOrd="0" parTransId="{D7E2F479-3B62-C748-8407-A4526B702630}" sibTransId="{AA215D0C-6C5C-5C42-899F-8E61F52C0156}"/>
     <dgm:cxn modelId="{8D47B376-508C-4D46-91F5-6FCD9F007555}" type="presParOf" srcId="{636379C9-8B6B-A640-8821-6D45637590C2}" destId="{F57962A2-0320-3D4F-B361-F11EAE206643}" srcOrd="0" destOrd="0" presId="urn:microsoft.com/office/officeart/2005/8/layout/vList2"/>
     <dgm:cxn modelId="{AD26FD55-9E0F-194E-B084-E5349676E33B}" type="presParOf" srcId="{636379C9-8B6B-A640-8821-6D45637590C2}" destId="{7F072C46-BF5C-E74A-BDBA-A2316FA1CE02}" srcOrd="1" destOrd="0" presId="urn:microsoft.com/office/officeart/2005/8/layout/vList2"/>
     <dgm:cxn modelId="{C54AD420-B180-744B-9FFC-0B2F9C3A27AF}" type="presParOf" srcId="{636379C9-8B6B-A640-8821-6D45637590C2}" destId="{2E506666-F2C7-594C-88A3-1989CAFB2CE9}" srcOrd="2" destOrd="0" presId="urn:microsoft.com/office/officeart/2005/8/layout/vList2"/>
@@ -41331,6 +41333,13 @@
   <p:clrMapOvr>
     <a:masterClrMapping/>
   </p:clrMapOvr>
+  <p:timing>
+    <p:tnLst>
+      <p:par>
+        <p:cTn id="1" dur="indefinite" restart="never" nodeType="tmRoot"/>
+      </p:par>
+    </p:tnLst>
+  </p:timing>
 </p:sld>
 </file>
 
@@ -41368,32 +41377,76 @@
           <a:p>
             <a:r>
               <a:rPr lang="en-US" dirty="0" smtClean="0"/>
+              <a:t>Preliminary</a:t>
+            </a:r>
+            <a:br>
+              <a:rPr lang="en-US" dirty="0" smtClean="0"/>
+            </a:br>
+            <a:r>
+              <a:rPr lang="en-US" dirty="0" smtClean="0"/>
               <a:t>Results</a:t>
             </a:r>
             <a:endParaRPr lang="en-US" dirty="0"/>
           </a:p>
         </p:txBody>
       </p:sp>
+      <p:pic>
+        <p:nvPicPr>
+          <p:cNvPr id="7" name="Picture 6"/>
+          <p:cNvPicPr>
+            <a:picLocks noChangeAspect="1"/>
+          </p:cNvPicPr>
+          <p:nvPr/>
+        </p:nvPicPr>
+        <p:blipFill>
+          <a:blip r:embed="rId2">
+            <a:extLst>
+              <a:ext uri="{28A0092B-C50C-407E-A947-70E740481C1C}">
+                <a14:useLocalDpi xmlns:a14="http://schemas.microsoft.com/office/drawing/2010/main" val="0"/>
+              </a:ext>
+            </a:extLst>
+          </a:blip>
+          <a:stretch>
+            <a:fillRect/>
+          </a:stretch>
+        </p:blipFill>
+        <p:spPr>
+          <a:xfrm>
+            <a:off x="3976861" y="928164"/>
+            <a:ext cx="6700102" cy="5001673"/>
+          </a:xfrm>
+          <a:prstGeom prst="rect">
+            <a:avLst/>
+          </a:prstGeom>
+        </p:spPr>
+      </p:pic>
       <p:sp>
         <p:nvSpPr>
-          <p:cNvPr id="3" name="Content Placeholder 2"/>
-          <p:cNvSpPr>
-            <a:spLocks noGrp="1"/>
-          </p:cNvSpPr>
-          <p:nvPr>
-            <p:ph idx="1"/>
-          </p:nvPr>
+          <p:cNvPr id="8" name="TextBox 7"/>
+          <p:cNvSpPr txBox="1"/>
+          <p:nvPr/>
         </p:nvSpPr>
-        <p:spPr/>
+        <p:spPr>
+          <a:xfrm>
+            <a:off x="1129553" y="3082917"/>
+            <a:ext cx="2407023" cy="1200329"/>
+          </a:xfrm>
+          <a:prstGeom prst="rect">
+            <a:avLst/>
+          </a:prstGeom>
+          <a:noFill/>
+        </p:spPr>
         <p:txBody>
-          <a:bodyPr/>
+          <a:bodyPr wrap="square" rtlCol="0">
+            <a:spAutoFit/>
+          </a:bodyPr>
           <a:lstStyle/>
           <a:p>
             <a:r>
-              <a:rPr lang="en-US" dirty="0" smtClean="0"/>
-              <a:t>Preliminary findings indicate that there seems to be some good results from these methods</a:t>
+              <a:rPr lang="en-US" sz="2400" dirty="0" smtClean="0"/>
+              <a:t>Vector outperformed Tree</a:t>
             </a:r>
-            <a:endParaRPr lang="en-US" dirty="0"/>
+            <a:endParaRPr lang="en-US" sz="2400" dirty="0"/>
           </a:p>
         </p:txBody>
       </p:sp>
@@ -41407,10 +41460,274 @@
   <p:clrMapOvr>
     <a:masterClrMapping/>
   </p:clrMapOvr>
+  <p:timing>
+    <p:tnLst>
+      <p:par>
+        <p:cTn id="1" dur="indefinite" restart="never" nodeType="tmRoot"/>
+      </p:par>
+    </p:tnLst>
+  </p:timing>
 </p:sld>
 </file>
 
 <file path=ppt/slides/slide14.xml><?xml version="1.0" encoding="utf-8"?>
+<p:sld xmlns:a="http://schemas.openxmlformats.org/drawingml/2006/main" xmlns:r="http://schemas.openxmlformats.org/officeDocument/2006/relationships" xmlns:p="http://schemas.openxmlformats.org/presentationml/2006/main">
+  <p:cSld>
+    <p:spTree>
+      <p:nvGrpSpPr>
+        <p:cNvPr id="1" name=""/>
+        <p:cNvGrpSpPr/>
+        <p:nvPr/>
+      </p:nvGrpSpPr>
+      <p:grpSpPr>
+        <a:xfrm>
+          <a:off x="0" y="0"/>
+          <a:ext cx="0" cy="0"/>
+          <a:chOff x="0" y="0"/>
+          <a:chExt cx="0" cy="0"/>
+        </a:xfrm>
+      </p:grpSpPr>
+      <p:sp>
+        <p:nvSpPr>
+          <p:cNvPr id="2" name="Title 1"/>
+          <p:cNvSpPr>
+            <a:spLocks noGrp="1"/>
+          </p:cNvSpPr>
+          <p:nvPr>
+            <p:ph type="title"/>
+          </p:nvPr>
+        </p:nvSpPr>
+        <p:spPr/>
+        <p:txBody>
+          <a:bodyPr/>
+          <a:lstStyle/>
+          <a:p>
+            <a:r>
+              <a:rPr lang="en-US" dirty="0"/>
+              <a:t>Preliminary</a:t>
+            </a:r>
+            <a:br>
+              <a:rPr lang="en-US" dirty="0"/>
+            </a:br>
+            <a:r>
+              <a:rPr lang="en-US" dirty="0"/>
+              <a:t>Results</a:t>
+            </a:r>
+            <a:endParaRPr lang="en-US" dirty="0"/>
+          </a:p>
+        </p:txBody>
+      </p:sp>
+      <p:pic>
+        <p:nvPicPr>
+          <p:cNvPr id="4" name="Picture 3"/>
+          <p:cNvPicPr>
+            <a:picLocks noChangeAspect="1"/>
+          </p:cNvPicPr>
+          <p:nvPr/>
+        </p:nvPicPr>
+        <p:blipFill>
+          <a:blip r:embed="rId2">
+            <a:extLst>
+              <a:ext uri="{28A0092B-C50C-407E-A947-70E740481C1C}">
+                <a14:useLocalDpi xmlns:a14="http://schemas.microsoft.com/office/drawing/2010/main" val="0"/>
+              </a:ext>
+            </a:extLst>
+          </a:blip>
+          <a:stretch>
+            <a:fillRect/>
+          </a:stretch>
+        </p:blipFill>
+        <p:spPr>
+          <a:xfrm>
+            <a:off x="3976861" y="928164"/>
+            <a:ext cx="6700102" cy="5001673"/>
+          </a:xfrm>
+          <a:prstGeom prst="rect">
+            <a:avLst/>
+          </a:prstGeom>
+        </p:spPr>
+      </p:pic>
+      <p:sp>
+        <p:nvSpPr>
+          <p:cNvPr id="9" name="TextBox 8"/>
+          <p:cNvSpPr txBox="1"/>
+          <p:nvPr/>
+        </p:nvSpPr>
+        <p:spPr>
+          <a:xfrm>
+            <a:off x="1129553" y="3082917"/>
+            <a:ext cx="2407023" cy="1200329"/>
+          </a:xfrm>
+          <a:prstGeom prst="rect">
+            <a:avLst/>
+          </a:prstGeom>
+          <a:noFill/>
+        </p:spPr>
+        <p:txBody>
+          <a:bodyPr wrap="square" rtlCol="0">
+            <a:spAutoFit/>
+          </a:bodyPr>
+          <a:lstStyle/>
+          <a:p>
+            <a:r>
+              <a:rPr lang="en-US" sz="2400" dirty="0" smtClean="0"/>
+              <a:t>Mutation had an important impact on trees</a:t>
+            </a:r>
+          </a:p>
+        </p:txBody>
+      </p:sp>
+    </p:spTree>
+    <p:extLst>
+      <p:ext uri="{BB962C8B-B14F-4D97-AF65-F5344CB8AC3E}">
+        <p14:creationId xmlns:p14="http://schemas.microsoft.com/office/powerpoint/2010/main" val="2748252250"/>
+      </p:ext>
+    </p:extLst>
+  </p:cSld>
+  <p:clrMapOvr>
+    <a:masterClrMapping/>
+  </p:clrMapOvr>
+  <p:timing>
+    <p:tnLst>
+      <p:par>
+        <p:cTn id="1" dur="indefinite" restart="never" nodeType="tmRoot"/>
+      </p:par>
+    </p:tnLst>
+  </p:timing>
+</p:sld>
+</file>
+
+<file path=ppt/slides/slide15.xml><?xml version="1.0" encoding="utf-8"?>
+<p:sld xmlns:a="http://schemas.openxmlformats.org/drawingml/2006/main" xmlns:r="http://schemas.openxmlformats.org/officeDocument/2006/relationships" xmlns:p="http://schemas.openxmlformats.org/presentationml/2006/main">
+  <p:cSld>
+    <p:spTree>
+      <p:nvGrpSpPr>
+        <p:cNvPr id="1" name=""/>
+        <p:cNvGrpSpPr/>
+        <p:nvPr/>
+      </p:nvGrpSpPr>
+      <p:grpSpPr>
+        <a:xfrm>
+          <a:off x="0" y="0"/>
+          <a:ext cx="0" cy="0"/>
+          <a:chOff x="0" y="0"/>
+          <a:chExt cx="0" cy="0"/>
+        </a:xfrm>
+      </p:grpSpPr>
+      <p:sp>
+        <p:nvSpPr>
+          <p:cNvPr id="2" name="Title 1"/>
+          <p:cNvSpPr>
+            <a:spLocks noGrp="1"/>
+          </p:cNvSpPr>
+          <p:nvPr>
+            <p:ph type="title"/>
+          </p:nvPr>
+        </p:nvSpPr>
+        <p:spPr/>
+        <p:txBody>
+          <a:bodyPr/>
+          <a:lstStyle/>
+          <a:p>
+            <a:r>
+              <a:rPr lang="en-US" dirty="0"/>
+              <a:t>Preliminary</a:t>
+            </a:r>
+            <a:br>
+              <a:rPr lang="en-US" dirty="0"/>
+            </a:br>
+            <a:r>
+              <a:rPr lang="en-US" dirty="0"/>
+              <a:t>Results</a:t>
+            </a:r>
+            <a:endParaRPr lang="en-US" dirty="0"/>
+          </a:p>
+        </p:txBody>
+      </p:sp>
+      <p:pic>
+        <p:nvPicPr>
+          <p:cNvPr id="6" name="Picture 5"/>
+          <p:cNvPicPr>
+            <a:picLocks noChangeAspect="1"/>
+          </p:cNvPicPr>
+          <p:nvPr/>
+        </p:nvPicPr>
+        <p:blipFill>
+          <a:blip r:embed="rId2">
+            <a:extLst>
+              <a:ext uri="{28A0092B-C50C-407E-A947-70E740481C1C}">
+                <a14:useLocalDpi xmlns:a14="http://schemas.microsoft.com/office/drawing/2010/main" val="0"/>
+              </a:ext>
+            </a:extLst>
+          </a:blip>
+          <a:stretch>
+            <a:fillRect/>
+          </a:stretch>
+        </p:blipFill>
+        <p:spPr>
+          <a:xfrm>
+            <a:off x="3976861" y="928164"/>
+            <a:ext cx="6700102" cy="5001673"/>
+          </a:xfrm>
+          <a:prstGeom prst="rect">
+            <a:avLst/>
+          </a:prstGeom>
+        </p:spPr>
+      </p:pic>
+      <p:sp>
+        <p:nvSpPr>
+          <p:cNvPr id="9" name="TextBox 8"/>
+          <p:cNvSpPr txBox="1"/>
+          <p:nvPr/>
+        </p:nvSpPr>
+        <p:spPr>
+          <a:xfrm>
+            <a:off x="1129553" y="3082917"/>
+            <a:ext cx="2407023" cy="1200329"/>
+          </a:xfrm>
+          <a:prstGeom prst="rect">
+            <a:avLst/>
+          </a:prstGeom>
+          <a:noFill/>
+        </p:spPr>
+        <p:txBody>
+          <a:bodyPr wrap="square" rtlCol="0">
+            <a:spAutoFit/>
+          </a:bodyPr>
+          <a:lstStyle/>
+          <a:p>
+            <a:r>
+              <a:rPr lang="en-US" sz="2400" dirty="0" smtClean="0"/>
+              <a:t>But cross-over was key to </a:t>
+            </a:r>
+            <a:r>
+              <a:rPr lang="en-US" sz="2400" smtClean="0"/>
+              <a:t>improving vectors</a:t>
+            </a:r>
+            <a:endParaRPr lang="en-US" sz="2400" dirty="0"/>
+          </a:p>
+        </p:txBody>
+      </p:sp>
+    </p:spTree>
+    <p:extLst>
+      <p:ext uri="{BB962C8B-B14F-4D97-AF65-F5344CB8AC3E}">
+        <p14:creationId xmlns:p14="http://schemas.microsoft.com/office/powerpoint/2010/main" val="1077901650"/>
+      </p:ext>
+    </p:extLst>
+  </p:cSld>
+  <p:clrMapOvr>
+    <a:masterClrMapping/>
+  </p:clrMapOvr>
+  <p:timing>
+    <p:tnLst>
+      <p:par>
+        <p:cTn id="1" dur="indefinite" restart="never" nodeType="tmRoot"/>
+      </p:par>
+    </p:tnLst>
+  </p:timing>
+</p:sld>
+</file>
+
+<file path=ppt/slides/slide16.xml><?xml version="1.0" encoding="utf-8"?>
 <p:sld xmlns:a="http://schemas.openxmlformats.org/drawingml/2006/main" xmlns:r="http://schemas.openxmlformats.org/officeDocument/2006/relationships" xmlns:p="http://schemas.openxmlformats.org/presentationml/2006/main">
   <p:cSld>
     <p:spTree>
@@ -41485,10 +41802,17 @@
   <p:clrMapOvr>
     <a:masterClrMapping/>
   </p:clrMapOvr>
+  <p:timing>
+    <p:tnLst>
+      <p:par>
+        <p:cTn id="1" dur="indefinite" restart="never" nodeType="tmRoot"/>
+      </p:par>
+    </p:tnLst>
+  </p:timing>
 </p:sld>
 </file>
 
-<file path=ppt/slides/slide15.xml><?xml version="1.0" encoding="utf-8"?>
+<file path=ppt/slides/slide17.xml><?xml version="1.0" encoding="utf-8"?>
 <p:sld xmlns:a="http://schemas.openxmlformats.org/drawingml/2006/main" xmlns:r="http://schemas.openxmlformats.org/officeDocument/2006/relationships" xmlns:p="http://schemas.openxmlformats.org/presentationml/2006/main">
   <p:cSld>
     <p:spTree>
@@ -41563,10 +41887,17 @@
   <p:clrMapOvr>
     <a:masterClrMapping/>
   </p:clrMapOvr>
+  <p:timing>
+    <p:tnLst>
+      <p:par>
+        <p:cTn id="1" dur="indefinite" restart="never" nodeType="tmRoot"/>
+      </p:par>
+    </p:tnLst>
+  </p:timing>
 </p:sld>
 </file>
 
-<file path=ppt/slides/slide16.xml><?xml version="1.0" encoding="utf-8"?>
+<file path=ppt/slides/slide18.xml><?xml version="1.0" encoding="utf-8"?>
 <p:sld xmlns:a="http://schemas.openxmlformats.org/drawingml/2006/main" xmlns:r="http://schemas.openxmlformats.org/officeDocument/2006/relationships" xmlns:p="http://schemas.openxmlformats.org/presentationml/2006/main">
   <p:cSld>
     <p:spTree>
@@ -42723,7 +43054,7 @@
   <a:extraClrSchemeLst/>
   <a:extLst>
     <a:ext uri="{05A4C25C-085E-4340-85A3-A5531E510DB2}">
-      <thm15:themeFamily xmlns="" xmlns:thm15="http://schemas.microsoft.com/office/thememl/2012/main" name="Circuit" id="{0AC2F7E7-15F5-431C-B2A2-456FE929F56C}" vid="{142578CA-DEC9-49C3-80AF-C113973CC9A9}"/>
+      <thm15:themeFamily xmlns:thm15="http://schemas.microsoft.com/office/thememl/2012/main" xmlns="" name="Circuit" id="{0AC2F7E7-15F5-431C-B2A2-456FE929F56C}" vid="{142578CA-DEC9-49C3-80AF-C113973CC9A9}"/>
     </a:ext>
   </a:extLst>
 </a:theme>

</xml_diff>